<commit_message>
Updated Day6 slides to include correct homework information
</commit_message>
<xml_diff>
--- a/day06/slides/Day6_slides.pptx
+++ b/day06/slides/Day6_slides.pptx
@@ -10572,25 +10572,25 @@
             <a:r>
               <a:t/>
             </a:r>
-            <a:endParaRPr/>
+            <a:endParaRPr sz="2000"/>
           </a:p>
           <a:p>
-            <a:pPr indent="-368300" lvl="0" marL="457200" rtl="0" algn="l">
-              <a:spcBef>
-                <a:spcPts val="0"/>
-              </a:spcBef>
-              <a:spcAft>
-                <a:spcPts val="0"/>
-              </a:spcAft>
-              <a:buSzPts val="2200"/>
+            <a:pPr indent="-381000" lvl="0" marL="457200" rtl="0" algn="l">
+              <a:spcBef>
+                <a:spcPts val="0"/>
+              </a:spcBef>
+              <a:spcAft>
+                <a:spcPts val="0"/>
+              </a:spcAft>
+              <a:buSzPts val="2400"/>
               <a:buChar char="●"/>
             </a:pPr>
             <a:r>
-              <a:rPr lang="en"/>
+              <a:rPr lang="en" sz="2000"/>
               <a:t>Create a new R script based on the </a:t>
             </a:r>
             <a:r>
-              <a:rPr lang="en">
+              <a:rPr lang="en" sz="2000">
                 <a:solidFill>
                   <a:srgbClr val="1155CC"/>
                 </a:solidFill>
@@ -10602,10 +10602,10 @@
               <a:t>Learning_R.R</a:t>
             </a:r>
             <a:r>
-              <a:rPr lang="en"/>
+              <a:rPr lang="en" sz="2000"/>
               <a:t> script</a:t>
             </a:r>
-            <a:endParaRPr/>
+            <a:endParaRPr sz="2000"/>
           </a:p>
           <a:p>
             <a:pPr indent="-317500" lvl="1" marL="914400" rtl="0" algn="l">
@@ -10619,19 +10619,19 @@
               <a:buChar char="○"/>
             </a:pPr>
             <a:r>
-              <a:rPr lang="en"/>
+              <a:rPr lang="en" sz="1600"/>
               <a:t>Include the </a:t>
             </a:r>
             <a:r>
-              <a:rPr i="1" lang="en"/>
+              <a:rPr i="1" lang="en" sz="1600"/>
               <a:t>“Manipulating mtcars”</a:t>
             </a:r>
             <a:r>
-              <a:rPr lang="en"/>
+              <a:rPr lang="en" sz="1600"/>
               <a:t> section in to a script called </a:t>
             </a:r>
             <a:r>
-              <a:rPr lang="en" sz="1600">
+              <a:rPr lang="en" sz="1800">
                 <a:solidFill>
                   <a:srgbClr val="1155CC"/>
                 </a:solidFill>
@@ -10642,59 +10642,59 @@
               </a:rPr>
               <a:t>Learning_R_submit_aws.R</a:t>
             </a:r>
-            <a:endParaRPr sz="1200"/>
+            <a:endParaRPr/>
           </a:p>
           <a:p>
-            <a:pPr indent="-317500" lvl="1" marL="914400" rtl="0" algn="l">
-              <a:spcBef>
-                <a:spcPts val="0"/>
-              </a:spcBef>
-              <a:spcAft>
-                <a:spcPts val="0"/>
-              </a:spcAft>
-              <a:buSzPts val="1400"/>
+            <a:pPr indent="-330200" lvl="1" marL="914400" rtl="0" algn="l">
+              <a:spcBef>
+                <a:spcPts val="0"/>
+              </a:spcBef>
+              <a:spcAft>
+                <a:spcPts val="0"/>
+              </a:spcAft>
+              <a:buSzPts val="1600"/>
               <a:buChar char="○"/>
             </a:pPr>
             <a:r>
-              <a:rPr lang="en"/>
+              <a:rPr lang="en" sz="1600"/>
               <a:t>Save plots and tables to a working directory in the script</a:t>
             </a:r>
-            <a:endParaRPr/>
+            <a:endParaRPr sz="1600"/>
           </a:p>
           <a:p>
-            <a:pPr indent="-342900" lvl="0" marL="457200" rtl="0" algn="l">
-              <a:spcBef>
-                <a:spcPts val="0"/>
-              </a:spcBef>
-              <a:spcAft>
-                <a:spcPts val="0"/>
-              </a:spcAft>
-              <a:buSzPts val="1800"/>
+            <a:pPr indent="-355600" lvl="0" marL="457200" rtl="0" algn="l">
+              <a:spcBef>
+                <a:spcPts val="0"/>
+              </a:spcBef>
+              <a:spcAft>
+                <a:spcPts val="0"/>
+              </a:spcAft>
+              <a:buSzPts val="2000"/>
               <a:buChar char="●"/>
             </a:pPr>
             <a:r>
-              <a:rPr lang="en"/>
+              <a:rPr lang="en" sz="2000"/>
               <a:t>Run the R script as a job on AWS</a:t>
             </a:r>
-            <a:endParaRPr/>
+            <a:endParaRPr sz="2000"/>
           </a:p>
           <a:p>
-            <a:pPr indent="-317500" lvl="1" marL="914400" rtl="0" algn="l">
-              <a:spcBef>
-                <a:spcPts val="0"/>
-              </a:spcBef>
-              <a:spcAft>
-                <a:spcPts val="0"/>
-              </a:spcAft>
-              <a:buSzPts val="1400"/>
+            <a:pPr indent="-330200" lvl="1" marL="914400" rtl="0" algn="l">
+              <a:spcBef>
+                <a:spcPts val="0"/>
+              </a:spcBef>
+              <a:spcAft>
+                <a:spcPts val="0"/>
+              </a:spcAft>
+              <a:buSzPts val="1600"/>
               <a:buChar char="○"/>
             </a:pPr>
             <a:r>
-              <a:rPr lang="en"/>
+              <a:rPr lang="en" sz="1600"/>
               <a:t>Use the </a:t>
             </a:r>
             <a:r>
-              <a:rPr lang="en">
+              <a:rPr lang="en" sz="1600">
                 <a:solidFill>
                   <a:srgbClr val="1155CC"/>
                 </a:solidFill>
@@ -10706,10 +10706,10 @@
               <a:t>RScript</a:t>
             </a:r>
             <a:r>
-              <a:rPr lang="en"/>
+              <a:rPr lang="en" sz="1600"/>
               <a:t> command to call your script</a:t>
             </a:r>
-            <a:endParaRPr/>
+            <a:endParaRPr sz="1600"/>
           </a:p>
         </p:txBody>
       </p:sp>
@@ -10790,7 +10790,7 @@
           </a:bodyPr>
           <a:lstStyle/>
           <a:p>
-            <a:pPr indent="-349250" lvl="0" marL="457200" marR="0" rtl="0" algn="l">
+            <a:pPr indent="-355600" lvl="0" marL="457200" marR="0" rtl="0" algn="l">
               <a:lnSpc>
                 <a:spcPct val="200000"/>
               </a:lnSpc>
@@ -10803,12 +10803,12 @@
               <a:buClr>
                 <a:srgbClr val="141313"/>
               </a:buClr>
-              <a:buSzPts val="1900"/>
+              <a:buSzPts val="2000"/>
               <a:buFont typeface="Arial"/>
               <a:buChar char="•"/>
             </a:pPr>
             <a:r>
-              <a:rPr b="0" i="0" lang="en" sz="1900" u="none" cap="none" strike="noStrike">
+              <a:rPr b="0" i="0" lang="en" sz="2000" u="none" cap="none" strike="noStrike">
                 <a:solidFill>
                   <a:srgbClr val="141313"/>
                 </a:solidFill>
@@ -10820,7 +10820,7 @@
               <a:t>ggplot2 website </a:t>
             </a:r>
             <a:r>
-              <a:rPr b="0" i="0" lang="en" sz="1900" u="sng" cap="none" strike="noStrike">
+              <a:rPr b="0" i="0" lang="en" sz="2000" u="sng" cap="none" strike="noStrike">
                 <a:solidFill>
                   <a:srgbClr val="0000FF"/>
                 </a:solidFill>
@@ -10838,7 +10838,7 @@
               </a:rPr>
               <a:t>https://ggplot2.tidyverse.org/</a:t>
             </a:r>
-            <a:endParaRPr b="0" i="0" sz="1900" u="none" cap="none" strike="noStrike">
+            <a:endParaRPr b="0" i="0" sz="2000" u="none" cap="none" strike="noStrike">
               <a:solidFill>
                 <a:srgbClr val="141313"/>
               </a:solidFill>
@@ -10849,7 +10849,7 @@
             </a:endParaRPr>
           </a:p>
           <a:p>
-            <a:pPr indent="-349250" lvl="0" marL="457200" marR="0" rtl="0" algn="l">
+            <a:pPr indent="-355600" lvl="0" marL="457200" marR="0" rtl="0" algn="l">
               <a:lnSpc>
                 <a:spcPct val="200000"/>
               </a:lnSpc>
@@ -10862,12 +10862,12 @@
               <a:buClr>
                 <a:srgbClr val="141313"/>
               </a:buClr>
-              <a:buSzPts val="1900"/>
+              <a:buSzPts val="2000"/>
               <a:buFont typeface="Arial"/>
               <a:buChar char="•"/>
             </a:pPr>
             <a:r>
-              <a:rPr b="0" i="0" lang="en" sz="1900" u="none" cap="none" strike="noStrike">
+              <a:rPr b="0" i="0" lang="en" sz="2000" u="none" cap="none" strike="noStrike">
                 <a:solidFill>
                   <a:srgbClr val="141313"/>
                 </a:solidFill>
@@ -10879,7 +10879,7 @@
               <a:t>R-bloggers </a:t>
             </a:r>
             <a:r>
-              <a:rPr b="0" i="0" lang="en" sz="1900" u="sng" cap="none" strike="noStrike">
+              <a:rPr b="0" i="0" lang="en" sz="2000" u="sng" cap="none" strike="noStrike">
                 <a:solidFill>
                   <a:srgbClr val="0000FF"/>
                 </a:solidFill>
@@ -10897,7 +10897,7 @@
               </a:rPr>
               <a:t>https://www.r-bloggers.com/</a:t>
             </a:r>
-            <a:endParaRPr b="0" i="0" sz="1900" u="none" cap="none" strike="noStrike">
+            <a:endParaRPr b="0" i="0" sz="2000" u="none" cap="none" strike="noStrike">
               <a:solidFill>
                 <a:srgbClr val="141313"/>
               </a:solidFill>
@@ -10908,7 +10908,7 @@
             </a:endParaRPr>
           </a:p>
           <a:p>
-            <a:pPr indent="-349250" lvl="0" marL="457200" marR="0" rtl="0" algn="l">
+            <a:pPr indent="-355600" lvl="0" marL="457200" marR="0" rtl="0" algn="l">
               <a:lnSpc>
                 <a:spcPct val="200000"/>
               </a:lnSpc>
@@ -10921,12 +10921,12 @@
               <a:buClr>
                 <a:srgbClr val="141313"/>
               </a:buClr>
-              <a:buSzPts val="1900"/>
+              <a:buSzPts val="2000"/>
               <a:buFont typeface="Arial"/>
               <a:buChar char="•"/>
             </a:pPr>
             <a:r>
-              <a:rPr b="0" i="0" lang="en" sz="1900" u="none" cap="none" strike="noStrike">
+              <a:rPr b="0" i="0" lang="en" sz="2000" u="none" cap="none" strike="noStrike">
                 <a:solidFill>
                   <a:srgbClr val="141313"/>
                 </a:solidFill>
@@ -10938,7 +10938,7 @@
               <a:t>Quick-R </a:t>
             </a:r>
             <a:r>
-              <a:rPr b="0" i="0" lang="en" sz="1900" u="sng" cap="none" strike="noStrike">
+              <a:rPr b="0" i="0" lang="en" sz="2000" u="sng" cap="none" strike="noStrike">
                 <a:solidFill>
                   <a:srgbClr val="0000FF"/>
                 </a:solidFill>
@@ -10956,7 +10956,7 @@
               </a:rPr>
               <a:t>https://www.statmethods.net/</a:t>
             </a:r>
-            <a:endParaRPr b="0" i="0" sz="1900" u="none" cap="none" strike="noStrike">
+            <a:endParaRPr b="0" i="0" sz="2000" u="none" cap="none" strike="noStrike">
               <a:solidFill>
                 <a:srgbClr val="141313"/>
               </a:solidFill>
@@ -10967,7 +10967,7 @@
             </a:endParaRPr>
           </a:p>
           <a:p>
-            <a:pPr indent="-349250" lvl="0" marL="457200" marR="0" rtl="0" algn="l">
+            <a:pPr indent="-355600" lvl="0" marL="457200" marR="0" rtl="0" algn="l">
               <a:lnSpc>
                 <a:spcPct val="100000"/>
               </a:lnSpc>
@@ -10980,12 +10980,12 @@
               <a:buClr>
                 <a:srgbClr val="141313"/>
               </a:buClr>
-              <a:buSzPts val="1900"/>
+              <a:buSzPts val="2000"/>
               <a:buFont typeface="Arial"/>
               <a:buChar char="•"/>
             </a:pPr>
             <a:r>
-              <a:rPr b="0" i="0" lang="en" sz="1900" u="none" cap="none" strike="noStrike">
+              <a:rPr b="0" i="0" lang="en" sz="2000" u="none" cap="none" strike="noStrike">
                 <a:solidFill>
                   <a:srgbClr val="141313"/>
                 </a:solidFill>
@@ -10997,7 +10997,7 @@
               <a:t>R for Data Science (by Hadley Wickham &amp; Garrett Grolemund) </a:t>
             </a:r>
             <a:r>
-              <a:rPr b="0" i="0" lang="en" sz="1900" u="sng" cap="none" strike="noStrike">
+              <a:rPr b="0" i="0" lang="en" sz="2000" u="sng" cap="none" strike="noStrike">
                 <a:solidFill>
                   <a:srgbClr val="0000FF"/>
                 </a:solidFill>
@@ -11016,7 +11016,7 @@
               <a:t>http://r4ds.had.co.nz/</a:t>
             </a:r>
             <a:r>
-              <a:rPr b="0" i="0" lang="en" sz="1900" u="none" cap="none" strike="noStrike">
+              <a:rPr b="0" i="0" lang="en" sz="2000" u="none" cap="none" strike="noStrike">
                 <a:solidFill>
                   <a:srgbClr val="141313"/>
                 </a:solidFill>
@@ -11027,7 +11027,7 @@
               </a:rPr>
               <a:t> </a:t>
             </a:r>
-            <a:endParaRPr b="0" i="0" sz="1900" u="none" cap="none" strike="noStrike">
+            <a:endParaRPr b="0" i="0" sz="2000" u="none" cap="none" strike="noStrike">
               <a:solidFill>
                 <a:srgbClr val="141313"/>
               </a:solidFill>
@@ -11108,8 +11108,8 @@
         </p:blipFill>
         <p:spPr>
           <a:xfrm>
-            <a:off x="7694725" y="2998605"/>
-            <a:ext cx="1421375" cy="2094950"/>
+            <a:off x="7979275" y="3328320"/>
+            <a:ext cx="1164725" cy="1716680"/>
           </a:xfrm>
           <a:prstGeom prst="rect">
             <a:avLst/>
@@ -11278,8 +11278,8 @@
         </p:nvSpPr>
         <p:spPr>
           <a:xfrm>
-            <a:off x="311700" y="1041500"/>
-            <a:ext cx="8520600" cy="3416400"/>
+            <a:off x="311700" y="736700"/>
+            <a:ext cx="8520600" cy="3838800"/>
           </a:xfrm>
           <a:prstGeom prst="rect">
             <a:avLst/>
@@ -11291,29 +11291,29 @@
         </p:spPr>
         <p:txBody>
           <a:bodyPr anchorCtr="0" anchor="t" bIns="91425" lIns="91425" spcFirstLastPara="1" rIns="91425" wrap="square" tIns="91425">
-            <a:normAutofit fontScale="85000" lnSpcReduction="20000"/>
+            <a:noAutofit/>
           </a:bodyPr>
           <a:lstStyle/>
           <a:p>
-            <a:pPr indent="-325755" lvl="0" marL="457200" rtl="0" algn="l">
-              <a:lnSpc>
-                <a:spcPct val="115000"/>
-              </a:lnSpc>
-              <a:spcBef>
-                <a:spcPts val="0"/>
-              </a:spcBef>
-              <a:spcAft>
-                <a:spcPts val="0"/>
-              </a:spcAft>
-              <a:buSzPct val="100000"/>
+            <a:pPr indent="-338455" lvl="0" marL="457200" rtl="0" algn="l">
+              <a:lnSpc>
+                <a:spcPct val="95000"/>
+              </a:lnSpc>
+              <a:spcBef>
+                <a:spcPts val="0"/>
+              </a:spcBef>
+              <a:spcAft>
+                <a:spcPts val="0"/>
+              </a:spcAft>
+              <a:buSzPts val="1730"/>
               <a:buAutoNum type="arabicPeriod"/>
             </a:pPr>
             <a:r>
-              <a:rPr lang="en"/>
+              <a:rPr lang="en" sz="1729"/>
               <a:t>Complete the </a:t>
             </a:r>
             <a:r>
-              <a:rPr lang="en">
+              <a:rPr lang="en" sz="1729">
                 <a:solidFill>
                   <a:srgbClr val="1155CC"/>
                 </a:solidFill>
@@ -11324,7 +11324,7 @@
               </a:rPr>
               <a:t>Learning_R_Additional_Practice.R</a:t>
             </a:r>
-            <a:endParaRPr>
+            <a:endParaRPr sz="1729">
               <a:solidFill>
                 <a:srgbClr val="1155CC"/>
               </a:solidFill>
@@ -11337,7 +11337,7 @@
           <a:p>
             <a:pPr indent="0" lvl="0" marL="0" rtl="0" algn="l">
               <a:lnSpc>
-                <a:spcPct val="115000"/>
+                <a:spcPct val="95000"/>
               </a:lnSpc>
               <a:spcBef>
                 <a:spcPts val="1200"/>
@@ -11345,32 +11345,35 @@
               <a:spcAft>
                 <a:spcPts val="0"/>
               </a:spcAft>
-              <a:buSzPct val="100000"/>
+              <a:buSzPts val="1530"/>
               <a:buNone/>
             </a:pPr>
             <a:r>
-              <a:rPr lang="en"/>
+              <a:rPr lang="en" sz="1729"/>
               <a:t>This homework will go over most of the topics covered today, but on a different dataset. There will be more advanced questions that build on what was in the inclass session. </a:t>
             </a:r>
-            <a:endParaRPr/>
+            <a:endParaRPr sz="1729"/>
           </a:p>
           <a:p>
-            <a:pPr indent="-325755" lvl="0" marL="457200" rtl="0" algn="l">
+            <a:pPr indent="-338455" lvl="0" marL="457200" rtl="0" algn="l">
+              <a:lnSpc>
+                <a:spcPct val="95000"/>
+              </a:lnSpc>
               <a:spcBef>
                 <a:spcPts val="1200"/>
               </a:spcBef>
               <a:spcAft>
                 <a:spcPts val="0"/>
               </a:spcAft>
-              <a:buSzPct val="100000"/>
+              <a:buSzPts val="1730"/>
               <a:buAutoNum type="arabicPeriod"/>
             </a:pPr>
             <a:r>
-              <a:rPr lang="en"/>
+              <a:rPr lang="en" sz="1729"/>
               <a:t>Install </a:t>
             </a:r>
             <a:r>
-              <a:rPr lang="en">
+              <a:rPr lang="en" sz="1729">
                 <a:solidFill>
                   <a:srgbClr val="1155CC"/>
                 </a:solidFill>
@@ -11381,7 +11384,7 @@
               </a:rPr>
               <a:t>rsubread</a:t>
             </a:r>
-            <a:endParaRPr>
+            <a:endParaRPr sz="1729">
               <a:solidFill>
                 <a:srgbClr val="1155CC"/>
               </a:solidFill>
@@ -11393,19 +11396,31 @@
           </a:p>
           <a:p>
             <a:pPr indent="0" lvl="0" marL="0" rtl="0" algn="l">
+              <a:lnSpc>
+                <a:spcPct val="95000"/>
+              </a:lnSpc>
               <a:spcBef>
                 <a:spcPts val="1200"/>
               </a:spcBef>
               <a:spcAft>
                 <a:spcPts val="0"/>
               </a:spcAft>
+              <a:buSzPts val="935"/>
               <a:buNone/>
             </a:pPr>
             <a:r>
-              <a:rPr lang="en"/>
-              <a:t>A library for counting reads from bam files over genome features such as genes. Install this on both AWS and your local machine.</a:t>
+              <a:rPr lang="en" sz="1729"/>
+              <a:t>A library for counting reads from bam files over genome features such as genes. </a:t>
             </a:r>
-            <a:endParaRPr>
+            <a:r>
+              <a:rPr i="1" lang="en" sz="1729"/>
+              <a:t>Install this in the R on AWS</a:t>
+            </a:r>
+            <a:r>
+              <a:rPr lang="en" sz="1729"/>
+              <a:t>.</a:t>
+            </a:r>
+            <a:endParaRPr sz="1729">
               <a:solidFill>
                 <a:srgbClr val="1155CC"/>
               </a:solidFill>
@@ -11416,9 +11431,9 @@
             </a:endParaRPr>
           </a:p>
           <a:p>
-            <a:pPr indent="-325755" lvl="0" marL="457200" rtl="0" algn="l">
-              <a:lnSpc>
-                <a:spcPct val="115000"/>
+            <a:pPr indent="-338455" lvl="0" marL="457200" rtl="0" algn="l">
+              <a:lnSpc>
+                <a:spcPct val="95000"/>
               </a:lnSpc>
               <a:spcBef>
                 <a:spcPts val="1200"/>
@@ -11426,15 +11441,15 @@
               <a:spcAft>
                 <a:spcPts val="0"/>
               </a:spcAft>
-              <a:buSzPct val="100000"/>
+              <a:buSzPts val="1730"/>
               <a:buAutoNum type="arabicPeriod"/>
             </a:pPr>
             <a:r>
-              <a:rPr lang="en"/>
+              <a:rPr lang="en" sz="1729"/>
               <a:t>Install </a:t>
             </a:r>
             <a:r>
-              <a:rPr lang="en">
+              <a:rPr lang="en" sz="1729">
                 <a:solidFill>
                   <a:srgbClr val="1155CC"/>
                 </a:solidFill>
@@ -11445,7 +11460,7 @@
               </a:rPr>
               <a:t>DESeq2</a:t>
             </a:r>
-            <a:endParaRPr>
+            <a:endParaRPr sz="1729">
               <a:solidFill>
                 <a:srgbClr val="1155CC"/>
               </a:solidFill>
@@ -11458,7 +11473,7 @@
           <a:p>
             <a:pPr indent="0" lvl="0" marL="0" rtl="0" algn="l">
               <a:lnSpc>
-                <a:spcPct val="115000"/>
+                <a:spcPct val="95000"/>
               </a:lnSpc>
               <a:spcBef>
                 <a:spcPts val="1200"/>
@@ -11466,33 +11481,64 @@
               <a:spcAft>
                 <a:spcPts val="0"/>
               </a:spcAft>
-              <a:buSzPct val="100000"/>
+              <a:buSzPts val="1530"/>
               <a:buNone/>
             </a:pPr>
             <a:r>
-              <a:rPr lang="en"/>
-              <a:t> This library takes in counts as input and performs differential gene expression analyses on the input features. You will be using this library in Day7. Install this on your local machine too.</a:t>
+              <a:rPr lang="en" sz="1729"/>
+              <a:t> This library takes in counts as input and performs differential gene expression analyses on the input features. You will be using this library in Day7. </a:t>
             </a:r>
-            <a:endParaRPr/>
+            <a:r>
+              <a:rPr i="1" lang="en" sz="1729"/>
+              <a:t>Install this on your local machine</a:t>
+            </a:r>
+            <a:r>
+              <a:rPr lang="en" sz="1729"/>
+              <a:t>. </a:t>
+            </a:r>
+            <a:br>
+              <a:rPr lang="en" sz="1729"/>
+            </a:br>
+            <a:endParaRPr sz="1729"/>
           </a:p>
           <a:p>
             <a:pPr indent="0" lvl="0" marL="0" rtl="0" algn="l">
               <a:lnSpc>
-                <a:spcPct val="115000"/>
+                <a:spcPct val="95000"/>
               </a:lnSpc>
               <a:spcBef>
                 <a:spcPts val="1200"/>
               </a:spcBef>
               <a:spcAft>
+                <a:spcPts val="0"/>
+              </a:spcAft>
+              <a:buSzPts val="1530"/>
+              <a:buNone/>
+            </a:pPr>
+            <a:r>
+              <a:rPr lang="en" sz="1729"/>
+              <a:t>This takes a long time, so get this installed before Day7.</a:t>
+            </a:r>
+            <a:endParaRPr sz="1729"/>
+          </a:p>
+          <a:p>
+            <a:pPr indent="0" lvl="0" marL="0" rtl="0" algn="l">
+              <a:lnSpc>
+                <a:spcPct val="95000"/>
+              </a:lnSpc>
+              <a:spcBef>
                 <a:spcPts val="1200"/>
-              </a:spcAft>
-              <a:buSzPct val="100000"/>
+              </a:spcBef>
+              <a:spcAft>
+                <a:spcPts val="1200"/>
+              </a:spcAft>
+              <a:buSzPts val="1530"/>
               <a:buNone/>
             </a:pPr>
             <a:r>
               <a:t/>
             </a:r>
-            <a:endParaRPr/>
+            <a:endParaRPr sz="1729"/>
           </a:p>
         </p:txBody>
       </p:sp>
@@ -11596,7 +11642,7 @@
           </a:bodyPr>
           <a:lstStyle/>
           <a:p>
-            <a:pPr indent="-342900" lvl="0" marL="457200" rtl="0" algn="l">
+            <a:pPr indent="-355600" lvl="0" marL="457200" rtl="0" algn="l">
               <a:lnSpc>
                 <a:spcPct val="150000"/>
               </a:lnSpc>
@@ -11606,15 +11652,15 @@
               <a:spcAft>
                 <a:spcPts val="0"/>
               </a:spcAft>
-              <a:buSzPts val="1800"/>
+              <a:buSzPts val="2000"/>
               <a:buAutoNum type="arabicPeriod"/>
             </a:pPr>
             <a:r>
-              <a:rPr lang="en"/>
+              <a:rPr lang="en" sz="2000"/>
               <a:t>Running </a:t>
             </a:r>
             <a:r>
-              <a:rPr lang="en">
+              <a:rPr lang="en" sz="2000">
                 <a:solidFill>
                   <a:schemeClr val="accent1"/>
                 </a:solidFill>
@@ -11626,13 +11672,13 @@
               <a:t>R</a:t>
             </a:r>
             <a:r>
-              <a:rPr lang="en"/>
+              <a:rPr lang="en" sz="2000"/>
               <a:t> in the terminal</a:t>
             </a:r>
-            <a:endParaRPr/>
+            <a:endParaRPr sz="2000"/>
           </a:p>
           <a:p>
-            <a:pPr indent="-342900" lvl="0" marL="457200" rtl="0" algn="l">
+            <a:pPr indent="-355600" lvl="0" marL="457200" rtl="0" algn="l">
               <a:lnSpc>
                 <a:spcPct val="150000"/>
               </a:lnSpc>
@@ -11642,15 +11688,15 @@
               <a:spcAft>
                 <a:spcPts val="0"/>
               </a:spcAft>
-              <a:buSzPts val="1800"/>
+              <a:buSzPts val="2000"/>
               <a:buAutoNum type="arabicPeriod"/>
             </a:pPr>
             <a:r>
-              <a:rPr lang="en"/>
+              <a:rPr lang="en" sz="2000"/>
               <a:t>Running </a:t>
             </a:r>
             <a:r>
-              <a:rPr lang="en">
+              <a:rPr lang="en" sz="2000">
                 <a:solidFill>
                   <a:schemeClr val="accent1"/>
                 </a:solidFill>
@@ -11662,11 +11708,11 @@
               <a:t>R </a:t>
             </a:r>
             <a:r>
-              <a:rPr lang="en"/>
+              <a:rPr lang="en" sz="2000"/>
               <a:t>in</a:t>
             </a:r>
             <a:r>
-              <a:rPr lang="en">
+              <a:rPr lang="en" sz="2000">
                 <a:solidFill>
                   <a:schemeClr val="accent1"/>
                 </a:solidFill>
@@ -11678,13 +11724,13 @@
               <a:t> RStudio</a:t>
             </a:r>
             <a:r>
-              <a:rPr lang="en"/>
+              <a:rPr lang="en" sz="2000"/>
               <a:t> </a:t>
             </a:r>
-            <a:endParaRPr/>
+            <a:endParaRPr sz="2000"/>
           </a:p>
           <a:p>
-            <a:pPr indent="-342900" lvl="0" marL="457200" rtl="0" algn="l">
+            <a:pPr indent="-355600" lvl="0" marL="457200" rtl="0" algn="l">
               <a:lnSpc>
                 <a:spcPct val="150000"/>
               </a:lnSpc>
@@ -11694,15 +11740,15 @@
               <a:spcAft>
                 <a:spcPts val="0"/>
               </a:spcAft>
-              <a:buSzPts val="1800"/>
+              <a:buSzPts val="2000"/>
               <a:buAutoNum type="arabicPeriod"/>
             </a:pPr>
             <a:r>
-              <a:rPr lang="en"/>
+              <a:rPr lang="en" sz="2000"/>
               <a:t>Submitting </a:t>
             </a:r>
             <a:r>
-              <a:rPr lang="en">
+              <a:rPr lang="en" sz="2000">
                 <a:solidFill>
                   <a:schemeClr val="accent1"/>
                 </a:solidFill>
@@ -11714,10 +11760,10 @@
               <a:t>R script</a:t>
             </a:r>
             <a:r>
-              <a:rPr lang="en"/>
+              <a:rPr lang="en" sz="2000"/>
               <a:t> as an sbatch job</a:t>
             </a:r>
-            <a:endParaRPr>
+            <a:endParaRPr sz="2000">
               <a:solidFill>
                 <a:schemeClr val="accent1"/>
               </a:solidFill>
@@ -11937,7 +11983,7 @@
         </p:blipFill>
         <p:spPr>
           <a:xfrm>
-            <a:off x="4409001" y="2893740"/>
+            <a:off x="4400251" y="2893740"/>
             <a:ext cx="1679322" cy="1194681"/>
           </a:xfrm>
           <a:prstGeom prst="rect">
@@ -13909,7 +13955,7 @@
           </a:bodyPr>
           <a:lstStyle/>
           <a:p>
-            <a:pPr indent="-342900" lvl="0" marL="457200" rtl="0" algn="l">
+            <a:pPr indent="-355600" lvl="0" marL="457200" rtl="0" algn="l">
               <a:lnSpc>
                 <a:spcPct val="115000"/>
               </a:lnSpc>
@@ -13919,15 +13965,15 @@
               <a:spcAft>
                 <a:spcPts val="0"/>
               </a:spcAft>
-              <a:buSzPts val="1800"/>
+              <a:buSzPts val="2000"/>
               <a:buChar char="●"/>
             </a:pPr>
             <a:r>
-              <a:rPr lang="en"/>
+              <a:rPr lang="en" sz="2000"/>
               <a:t>Let us go over the </a:t>
             </a:r>
             <a:r>
-              <a:rPr lang="en">
+              <a:rPr lang="en" sz="2000">
                 <a:solidFill>
                   <a:srgbClr val="1155CC"/>
                 </a:solidFill>
@@ -13939,13 +13985,13 @@
               <a:t>Day6_worksheet_learning_r</a:t>
             </a:r>
             <a:r>
-              <a:rPr lang="en"/>
+              <a:rPr lang="en" sz="2000"/>
               <a:t> worksheet:</a:t>
             </a:r>
-            <a:endParaRPr/>
+            <a:endParaRPr sz="2000"/>
           </a:p>
           <a:p>
-            <a:pPr indent="-342900" lvl="1" marL="914400" rtl="0" algn="l">
+            <a:pPr indent="-355600" lvl="1" marL="914400" rtl="0" algn="l">
               <a:lnSpc>
                 <a:spcPct val="115000"/>
               </a:lnSpc>
@@ -13955,17 +14001,17 @@
               <a:spcAft>
                 <a:spcPts val="0"/>
               </a:spcAft>
-              <a:buSzPts val="1800"/>
+              <a:buSzPts val="2000"/>
               <a:buChar char="○"/>
             </a:pPr>
             <a:r>
-              <a:rPr lang="en" sz="1800"/>
+              <a:rPr lang="en" sz="2000"/>
               <a:t>Introduction to R in the terminal</a:t>
             </a:r>
-            <a:endParaRPr sz="1800"/>
+            <a:endParaRPr sz="2000"/>
           </a:p>
           <a:p>
-            <a:pPr indent="-342900" lvl="1" marL="914400" rtl="0" algn="l">
+            <a:pPr indent="-355600" lvl="1" marL="914400" rtl="0" algn="l">
               <a:lnSpc>
                 <a:spcPct val="115000"/>
               </a:lnSpc>
@@ -13975,14 +14021,14 @@
               <a:spcAft>
                 <a:spcPts val="0"/>
               </a:spcAft>
-              <a:buSzPts val="1800"/>
+              <a:buSzPts val="2000"/>
               <a:buChar char="○"/>
             </a:pPr>
             <a:r>
-              <a:rPr lang="en" sz="1800"/>
+              <a:rPr lang="en" sz="2000"/>
               <a:t>Learn basic R commands</a:t>
             </a:r>
-            <a:endParaRPr sz="1800"/>
+            <a:endParaRPr sz="2000"/>
           </a:p>
         </p:txBody>
       </p:sp>
@@ -14161,7 +14207,7 @@
           </a:bodyPr>
           <a:lstStyle/>
           <a:p>
-            <a:pPr indent="-342900" lvl="0" marL="457200" rtl="0" algn="l">
+            <a:pPr indent="-355600" lvl="0" marL="457200" rtl="0" algn="l">
               <a:lnSpc>
                 <a:spcPct val="115000"/>
               </a:lnSpc>
@@ -14171,15 +14217,15 @@
               <a:spcAft>
                 <a:spcPts val="0"/>
               </a:spcAft>
-              <a:buSzPts val="1800"/>
+              <a:buSzPts val="2000"/>
               <a:buChar char="●"/>
             </a:pPr>
             <a:r>
-              <a:rPr lang="en"/>
+              <a:rPr lang="en" sz="2000"/>
               <a:t>Let us go over the </a:t>
             </a:r>
             <a:r>
-              <a:rPr lang="en">
+              <a:rPr lang="en" sz="2000">
                 <a:solidFill>
                   <a:srgbClr val="1155CC"/>
                 </a:solidFill>
@@ -14191,13 +14237,13 @@
               <a:t>Learning_R.R</a:t>
             </a:r>
             <a:r>
-              <a:rPr lang="en"/>
+              <a:rPr lang="en" sz="2000"/>
               <a:t> worksheet in R Studio:</a:t>
             </a:r>
-            <a:endParaRPr/>
+            <a:endParaRPr sz="2000"/>
           </a:p>
           <a:p>
-            <a:pPr indent="-342900" lvl="1" marL="914400" rtl="0" algn="l">
+            <a:pPr indent="-355600" lvl="1" marL="914400" rtl="0" algn="l">
               <a:lnSpc>
                 <a:spcPct val="115000"/>
               </a:lnSpc>
@@ -14207,17 +14253,17 @@
               <a:spcAft>
                 <a:spcPts val="0"/>
               </a:spcAft>
-              <a:buSzPts val="1800"/>
+              <a:buSzPts val="2000"/>
               <a:buChar char="○"/>
             </a:pPr>
             <a:r>
-              <a:rPr lang="en" sz="1800"/>
+              <a:rPr lang="en" sz="2000"/>
               <a:t>Introduction to R and R Markdown</a:t>
             </a:r>
-            <a:endParaRPr sz="1800"/>
+            <a:endParaRPr sz="2000"/>
           </a:p>
           <a:p>
-            <a:pPr indent="-342900" lvl="1" marL="914400" rtl="0" algn="l">
+            <a:pPr indent="-355600" lvl="1" marL="914400" rtl="0" algn="l">
               <a:lnSpc>
                 <a:spcPct val="115000"/>
               </a:lnSpc>
@@ -14227,17 +14273,17 @@
               <a:spcAft>
                 <a:spcPts val="0"/>
               </a:spcAft>
-              <a:buSzPts val="1800"/>
+              <a:buSzPts val="2000"/>
               <a:buChar char="○"/>
             </a:pPr>
             <a:r>
-              <a:rPr lang="en" sz="1800"/>
+              <a:rPr lang="en" sz="2000"/>
               <a:t>Introduction to the iris dataset</a:t>
             </a:r>
-            <a:endParaRPr sz="1800"/>
+            <a:endParaRPr sz="2000"/>
           </a:p>
           <a:p>
-            <a:pPr indent="-342900" lvl="1" marL="914400" rtl="0" algn="l">
+            <a:pPr indent="-355600" lvl="1" marL="914400" rtl="0" algn="l">
               <a:lnSpc>
                 <a:spcPct val="115000"/>
               </a:lnSpc>
@@ -14247,17 +14293,17 @@
               <a:spcAft>
                 <a:spcPts val="0"/>
               </a:spcAft>
-              <a:buSzPts val="1800"/>
+              <a:buSzPts val="2000"/>
               <a:buChar char="○"/>
             </a:pPr>
             <a:r>
-              <a:rPr lang="en" sz="1800"/>
+              <a:rPr lang="en" sz="2000"/>
               <a:t>Installing and loading libraries</a:t>
             </a:r>
-            <a:endParaRPr sz="1800"/>
+            <a:endParaRPr sz="2000"/>
           </a:p>
           <a:p>
-            <a:pPr indent="-342900" lvl="2" marL="1371600" rtl="0" algn="l">
+            <a:pPr indent="-355600" lvl="2" marL="1371600" rtl="0" algn="l">
               <a:lnSpc>
                 <a:spcPct val="115000"/>
               </a:lnSpc>
@@ -14267,17 +14313,17 @@
               <a:spcAft>
                 <a:spcPts val="0"/>
               </a:spcAft>
-              <a:buSzPts val="1800"/>
+              <a:buSzPts val="2000"/>
               <a:buChar char="■"/>
             </a:pPr>
             <a:r>
-              <a:rPr lang="en" sz="1800"/>
+              <a:rPr lang="en" sz="2000"/>
               <a:t>tidyverse</a:t>
             </a:r>
-            <a:endParaRPr sz="1800"/>
+            <a:endParaRPr sz="2000"/>
           </a:p>
           <a:p>
-            <a:pPr indent="-342900" lvl="1" marL="914400" rtl="0" algn="l">
+            <a:pPr indent="-355600" lvl="1" marL="914400" rtl="0" algn="l">
               <a:lnSpc>
                 <a:spcPct val="115000"/>
               </a:lnSpc>
@@ -14287,17 +14333,17 @@
               <a:spcAft>
                 <a:spcPts val="0"/>
               </a:spcAft>
-              <a:buSzPts val="1800"/>
+              <a:buSzPts val="2000"/>
               <a:buChar char="○"/>
             </a:pPr>
             <a:r>
-              <a:rPr lang="en" sz="1800"/>
+              <a:rPr lang="en" sz="2000"/>
               <a:t>Generating summary statistic in R</a:t>
             </a:r>
-            <a:endParaRPr sz="1800"/>
+            <a:endParaRPr sz="2000"/>
           </a:p>
           <a:p>
-            <a:pPr indent="-342900" lvl="1" marL="914400" rtl="0" algn="l">
+            <a:pPr indent="-355600" lvl="1" marL="914400" rtl="0" algn="l">
               <a:lnSpc>
                 <a:spcPct val="115000"/>
               </a:lnSpc>
@@ -14307,17 +14353,17 @@
               <a:spcAft>
                 <a:spcPts val="0"/>
               </a:spcAft>
-              <a:buSzPts val="1800"/>
+              <a:buSzPts val="2000"/>
               <a:buChar char="○"/>
             </a:pPr>
             <a:r>
-              <a:rPr lang="en" sz="1800"/>
+              <a:rPr lang="en" sz="2000"/>
               <a:t>Making plots with ggplot2</a:t>
             </a:r>
-            <a:endParaRPr sz="1800"/>
+            <a:endParaRPr sz="2000"/>
           </a:p>
           <a:p>
-            <a:pPr indent="-342900" lvl="1" marL="914400" rtl="0" algn="l">
+            <a:pPr indent="-355600" lvl="1" marL="914400" rtl="0" algn="l">
               <a:lnSpc>
                 <a:spcPct val="115000"/>
               </a:lnSpc>
@@ -14327,14 +14373,14 @@
               <a:spcAft>
                 <a:spcPts val="0"/>
               </a:spcAft>
-              <a:buSzPts val="1800"/>
+              <a:buSzPts val="2000"/>
               <a:buChar char="○"/>
             </a:pPr>
             <a:r>
-              <a:rPr lang="en" sz="1800"/>
+              <a:rPr lang="en" sz="2000"/>
               <a:t>Manipulating data.frames</a:t>
             </a:r>
-            <a:endParaRPr sz="1800"/>
+            <a:endParaRPr sz="2000"/>
           </a:p>
         </p:txBody>
       </p:sp>
@@ -14562,6 +14608,285 @@
 </file>
 
 <file path=ppt/theme/theme1.xml><?xml version="1.0" encoding="utf-8"?>
+<a:theme xmlns:a="http://schemas.openxmlformats.org/drawingml/2006/main" xmlns:r="http://schemas.openxmlformats.org/officeDocument/2006/relationships" name="Simple Light">
+  <a:themeElements>
+    <a:clrScheme name="Simple Light">
+      <a:dk1>
+        <a:srgbClr val="000000"/>
+      </a:dk1>
+      <a:lt1>
+        <a:srgbClr val="FFFFFF"/>
+      </a:lt1>
+      <a:dk2>
+        <a:srgbClr val="595959"/>
+      </a:dk2>
+      <a:lt2>
+        <a:srgbClr val="EEEEEE"/>
+      </a:lt2>
+      <a:accent1>
+        <a:srgbClr val="4285F4"/>
+      </a:accent1>
+      <a:accent2>
+        <a:srgbClr val="212121"/>
+      </a:accent2>
+      <a:accent3>
+        <a:srgbClr val="78909C"/>
+      </a:accent3>
+      <a:accent4>
+        <a:srgbClr val="FFAB40"/>
+      </a:accent4>
+      <a:accent5>
+        <a:srgbClr val="0097A7"/>
+      </a:accent5>
+      <a:accent6>
+        <a:srgbClr val="EEFF41"/>
+      </a:accent6>
+      <a:hlink>
+        <a:srgbClr val="0097A7"/>
+      </a:hlink>
+      <a:folHlink>
+        <a:srgbClr val="0097A7"/>
+      </a:folHlink>
+    </a:clrScheme>
+    <a:fontScheme name="Office">
+      <a:majorFont>
+        <a:latin typeface="Arial"/>
+        <a:ea typeface=""/>
+        <a:cs typeface=""/>
+        <a:font script="Jpan" typeface="ＭＳ Ｐゴシック"/>
+        <a:font script="Hang" typeface="맑은 고딕"/>
+        <a:font script="Hans" typeface="宋体"/>
+        <a:font script="Hant" typeface="新細明體"/>
+        <a:font script="Arab" typeface="Times New Roman"/>
+        <a:font script="Hebr" typeface="Times New Roman"/>
+        <a:font script="Thai" typeface="Angsana New"/>
+        <a:font script="Ethi" typeface="Nyala"/>
+        <a:font script="Beng" typeface="Vrinda"/>
+        <a:font script="Gujr" typeface="Shruti"/>
+        <a:font script="Khmr" typeface="MoolBoran"/>
+        <a:font script="Knda" typeface="Tunga"/>
+        <a:font script="Guru" typeface="Raavi"/>
+        <a:font script="Cans" typeface="Euphemia"/>
+        <a:font script="Cher" typeface="Plantagenet Cherokee"/>
+        <a:font script="Yiii" typeface="Microsoft Yi Baiti"/>
+        <a:font script="Tibt" typeface="Microsoft Himalaya"/>
+        <a:font script="Thaa" typeface="MV Boli"/>
+        <a:font script="Deva" typeface="Mangal"/>
+        <a:font script="Telu" typeface="Gautami"/>
+        <a:font script="Taml" typeface="Latha"/>
+        <a:font script="Syrc" typeface="Estrangelo Edessa"/>
+        <a:font script="Orya" typeface="Kalinga"/>
+        <a:font script="Mlym" typeface="Kartika"/>
+        <a:font script="Laoo" typeface="DokChampa"/>
+        <a:font script="Sinh" typeface="Iskoola Pota"/>
+        <a:font script="Mong" typeface="Mongolian Baiti"/>
+        <a:font script="Viet" typeface="Times New Roman"/>
+        <a:font script="Uigh" typeface="Microsoft Uighur"/>
+        <a:font script="Geor" typeface="Sylfaen"/>
+      </a:majorFont>
+      <a:minorFont>
+        <a:latin typeface="Arial"/>
+        <a:ea typeface=""/>
+        <a:cs typeface=""/>
+        <a:font script="Jpan" typeface="ＭＳ Ｐゴシック"/>
+        <a:font script="Hang" typeface="맑은 고딕"/>
+        <a:font script="Hans" typeface="宋体"/>
+        <a:font script="Hant" typeface="新細明體"/>
+        <a:font script="Arab" typeface="Arial"/>
+        <a:font script="Hebr" typeface="Arial"/>
+        <a:font script="Thai" typeface="Cordia New"/>
+        <a:font script="Ethi" typeface="Nyala"/>
+        <a:font script="Beng" typeface="Vrinda"/>
+        <a:font script="Gujr" typeface="Shruti"/>
+        <a:font script="Khmr" typeface="DaunPenh"/>
+        <a:font script="Knda" typeface="Tunga"/>
+        <a:font script="Guru" typeface="Raavi"/>
+        <a:font script="Cans" typeface="Euphemia"/>
+        <a:font script="Cher" typeface="Plantagenet Cherokee"/>
+        <a:font script="Yiii" typeface="Microsoft Yi Baiti"/>
+        <a:font script="Tibt" typeface="Microsoft Himalaya"/>
+        <a:font script="Thaa" typeface="MV Boli"/>
+        <a:font script="Deva" typeface="Mangal"/>
+        <a:font script="Telu" typeface="Gautami"/>
+        <a:font script="Taml" typeface="Latha"/>
+        <a:font script="Syrc" typeface="Estrangelo Edessa"/>
+        <a:font script="Orya" typeface="Kalinga"/>
+        <a:font script="Mlym" typeface="Kartika"/>
+        <a:font script="Laoo" typeface="DokChampa"/>
+        <a:font script="Sinh" typeface="Iskoola Pota"/>
+        <a:font script="Mong" typeface="Mongolian Baiti"/>
+        <a:font script="Viet" typeface="Arial"/>
+        <a:font script="Uigh" typeface="Microsoft Uighur"/>
+        <a:font script="Geor" typeface="Sylfaen"/>
+      </a:minorFont>
+    </a:fontScheme>
+    <a:fmtScheme name="Office">
+      <a:fillStyleLst>
+        <a:solidFill>
+          <a:schemeClr val="phClr"/>
+        </a:solidFill>
+        <a:gradFill rotWithShape="1">
+          <a:gsLst>
+            <a:gs pos="0">
+              <a:schemeClr val="phClr">
+                <a:tint val="50000"/>
+                <a:satMod val="300000"/>
+              </a:schemeClr>
+            </a:gs>
+            <a:gs pos="35000">
+              <a:schemeClr val="phClr">
+                <a:tint val="37000"/>
+                <a:satMod val="300000"/>
+              </a:schemeClr>
+            </a:gs>
+            <a:gs pos="100000">
+              <a:schemeClr val="phClr">
+                <a:tint val="15000"/>
+                <a:satMod val="350000"/>
+              </a:schemeClr>
+            </a:gs>
+          </a:gsLst>
+          <a:lin ang="16200000" scaled="1"/>
+        </a:gradFill>
+        <a:gradFill rotWithShape="1">
+          <a:gsLst>
+            <a:gs pos="0">
+              <a:schemeClr val="phClr">
+                <a:tint val="100000"/>
+                <a:shade val="100000"/>
+                <a:satMod val="130000"/>
+              </a:schemeClr>
+            </a:gs>
+            <a:gs pos="100000">
+              <a:schemeClr val="phClr">
+                <a:tint val="50000"/>
+                <a:shade val="100000"/>
+                <a:satMod val="350000"/>
+              </a:schemeClr>
+            </a:gs>
+          </a:gsLst>
+          <a:lin ang="16200000" scaled="0"/>
+        </a:gradFill>
+      </a:fillStyleLst>
+      <a:lnStyleLst>
+        <a:ln w="9525" cap="flat" cmpd="sng" algn="ctr">
+          <a:solidFill>
+            <a:schemeClr val="phClr">
+              <a:shade val="95000"/>
+              <a:satMod val="105000"/>
+            </a:schemeClr>
+          </a:solidFill>
+          <a:prstDash val="solid"/>
+        </a:ln>
+        <a:ln w="25400" cap="flat" cmpd="sng" algn="ctr">
+          <a:solidFill>
+            <a:schemeClr val="phClr"/>
+          </a:solidFill>
+          <a:prstDash val="solid"/>
+        </a:ln>
+        <a:ln w="38100" cap="flat" cmpd="sng" algn="ctr">
+          <a:solidFill>
+            <a:schemeClr val="phClr"/>
+          </a:solidFill>
+          <a:prstDash val="solid"/>
+        </a:ln>
+      </a:lnStyleLst>
+      <a:effectStyleLst>
+        <a:effectStyle>
+          <a:effectLst>
+            <a:outerShdw blurRad="40000" dist="20000" dir="5400000" rotWithShape="0">
+              <a:srgbClr val="000000">
+                <a:alpha val="38000"/>
+              </a:srgbClr>
+            </a:outerShdw>
+          </a:effectLst>
+        </a:effectStyle>
+        <a:effectStyle>
+          <a:effectLst>
+            <a:outerShdw blurRad="40000" dist="23000" dir="5400000" rotWithShape="0">
+              <a:srgbClr val="000000">
+                <a:alpha val="35000"/>
+              </a:srgbClr>
+            </a:outerShdw>
+          </a:effectLst>
+        </a:effectStyle>
+        <a:effectStyle>
+          <a:effectLst>
+            <a:outerShdw blurRad="40000" dist="23000" dir="5400000" rotWithShape="0">
+              <a:srgbClr val="000000">
+                <a:alpha val="35000"/>
+              </a:srgbClr>
+            </a:outerShdw>
+          </a:effectLst>
+          <a:scene3d>
+            <a:camera prst="orthographicFront">
+              <a:rot lat="0" lon="0" rev="0"/>
+            </a:camera>
+            <a:lightRig rig="threePt" dir="t">
+              <a:rot lat="0" lon="0" rev="1200000"/>
+            </a:lightRig>
+          </a:scene3d>
+          <a:sp3d>
+            <a:bevelT w="63500" h="25400"/>
+          </a:sp3d>
+        </a:effectStyle>
+      </a:effectStyleLst>
+      <a:bgFillStyleLst>
+        <a:solidFill>
+          <a:schemeClr val="phClr"/>
+        </a:solidFill>
+        <a:gradFill rotWithShape="1">
+          <a:gsLst>
+            <a:gs pos="0">
+              <a:schemeClr val="phClr">
+                <a:tint val="40000"/>
+                <a:satMod val="350000"/>
+              </a:schemeClr>
+            </a:gs>
+            <a:gs pos="40000">
+              <a:schemeClr val="phClr">
+                <a:tint val="45000"/>
+                <a:shade val="99000"/>
+                <a:satMod val="350000"/>
+              </a:schemeClr>
+            </a:gs>
+            <a:gs pos="100000">
+              <a:schemeClr val="phClr">
+                <a:shade val="20000"/>
+                <a:satMod val="255000"/>
+              </a:schemeClr>
+            </a:gs>
+          </a:gsLst>
+          <a:path path="circle">
+            <a:fillToRect l="50000" t="-80000" r="50000" b="180000"/>
+          </a:path>
+        </a:gradFill>
+        <a:gradFill rotWithShape="1">
+          <a:gsLst>
+            <a:gs pos="0">
+              <a:schemeClr val="phClr">
+                <a:tint val="80000"/>
+                <a:satMod val="300000"/>
+              </a:schemeClr>
+            </a:gs>
+            <a:gs pos="100000">
+              <a:schemeClr val="phClr">
+                <a:shade val="30000"/>
+                <a:satMod val="200000"/>
+              </a:schemeClr>
+            </a:gs>
+          </a:gsLst>
+          <a:path path="circle">
+            <a:fillToRect l="50000" t="50000" r="50000" b="50000"/>
+          </a:path>
+        </a:gradFill>
+      </a:bgFillStyleLst>
+    </a:fmtScheme>
+  </a:themeElements>
+</a:theme>
+</file>
+
+<file path=ppt/theme/theme2.xml><?xml version="1.0" encoding="utf-8"?>
 <a:theme xmlns:a="http://schemas.openxmlformats.org/drawingml/2006/main" xmlns:r="http://schemas.openxmlformats.org/officeDocument/2006/relationships">
   <a:themeElements>
     <a:clrScheme name="Default">
@@ -14838,283 +15163,4 @@
     </a:fmtScheme>
   </a:themeElements>
 </a:theme>
-</file>
-
-<file path=ppt/theme/theme2.xml><?xml version="1.0" encoding="utf-8"?>
-<a:theme xmlns:a="http://schemas.openxmlformats.org/drawingml/2006/main" xmlns:r="http://schemas.openxmlformats.org/officeDocument/2006/relationships" name="Simple Light">
-  <a:themeElements>
-    <a:clrScheme name="Simple Light">
-      <a:dk1>
-        <a:srgbClr val="000000"/>
-      </a:dk1>
-      <a:lt1>
-        <a:srgbClr val="FFFFFF"/>
-      </a:lt1>
-      <a:dk2>
-        <a:srgbClr val="595959"/>
-      </a:dk2>
-      <a:lt2>
-        <a:srgbClr val="EEEEEE"/>
-      </a:lt2>
-      <a:accent1>
-        <a:srgbClr val="4285F4"/>
-      </a:accent1>
-      <a:accent2>
-        <a:srgbClr val="212121"/>
-      </a:accent2>
-      <a:accent3>
-        <a:srgbClr val="78909C"/>
-      </a:accent3>
-      <a:accent4>
-        <a:srgbClr val="FFAB40"/>
-      </a:accent4>
-      <a:accent5>
-        <a:srgbClr val="0097A7"/>
-      </a:accent5>
-      <a:accent6>
-        <a:srgbClr val="EEFF41"/>
-      </a:accent6>
-      <a:hlink>
-        <a:srgbClr val="0097A7"/>
-      </a:hlink>
-      <a:folHlink>
-        <a:srgbClr val="0097A7"/>
-      </a:folHlink>
-    </a:clrScheme>
-    <a:fontScheme name="Office">
-      <a:majorFont>
-        <a:latin typeface="Arial"/>
-        <a:ea typeface=""/>
-        <a:cs typeface=""/>
-        <a:font script="Jpan" typeface="ＭＳ Ｐゴシック"/>
-        <a:font script="Hang" typeface="맑은 고딕"/>
-        <a:font script="Hans" typeface="宋体"/>
-        <a:font script="Hant" typeface="新細明體"/>
-        <a:font script="Arab" typeface="Times New Roman"/>
-        <a:font script="Hebr" typeface="Times New Roman"/>
-        <a:font script="Thai" typeface="Angsana New"/>
-        <a:font script="Ethi" typeface="Nyala"/>
-        <a:font script="Beng" typeface="Vrinda"/>
-        <a:font script="Gujr" typeface="Shruti"/>
-        <a:font script="Khmr" typeface="MoolBoran"/>
-        <a:font script="Knda" typeface="Tunga"/>
-        <a:font script="Guru" typeface="Raavi"/>
-        <a:font script="Cans" typeface="Euphemia"/>
-        <a:font script="Cher" typeface="Plantagenet Cherokee"/>
-        <a:font script="Yiii" typeface="Microsoft Yi Baiti"/>
-        <a:font script="Tibt" typeface="Microsoft Himalaya"/>
-        <a:font script="Thaa" typeface="MV Boli"/>
-        <a:font script="Deva" typeface="Mangal"/>
-        <a:font script="Telu" typeface="Gautami"/>
-        <a:font script="Taml" typeface="Latha"/>
-        <a:font script="Syrc" typeface="Estrangelo Edessa"/>
-        <a:font script="Orya" typeface="Kalinga"/>
-        <a:font script="Mlym" typeface="Kartika"/>
-        <a:font script="Laoo" typeface="DokChampa"/>
-        <a:font script="Sinh" typeface="Iskoola Pota"/>
-        <a:font script="Mong" typeface="Mongolian Baiti"/>
-        <a:font script="Viet" typeface="Times New Roman"/>
-        <a:font script="Uigh" typeface="Microsoft Uighur"/>
-        <a:font script="Geor" typeface="Sylfaen"/>
-      </a:majorFont>
-      <a:minorFont>
-        <a:latin typeface="Arial"/>
-        <a:ea typeface=""/>
-        <a:cs typeface=""/>
-        <a:font script="Jpan" typeface="ＭＳ Ｐゴシック"/>
-        <a:font script="Hang" typeface="맑은 고딕"/>
-        <a:font script="Hans" typeface="宋体"/>
-        <a:font script="Hant" typeface="新細明體"/>
-        <a:font script="Arab" typeface="Arial"/>
-        <a:font script="Hebr" typeface="Arial"/>
-        <a:font script="Thai" typeface="Cordia New"/>
-        <a:font script="Ethi" typeface="Nyala"/>
-        <a:font script="Beng" typeface="Vrinda"/>
-        <a:font script="Gujr" typeface="Shruti"/>
-        <a:font script="Khmr" typeface="DaunPenh"/>
-        <a:font script="Knda" typeface="Tunga"/>
-        <a:font script="Guru" typeface="Raavi"/>
-        <a:font script="Cans" typeface="Euphemia"/>
-        <a:font script="Cher" typeface="Plantagenet Cherokee"/>
-        <a:font script="Yiii" typeface="Microsoft Yi Baiti"/>
-        <a:font script="Tibt" typeface="Microsoft Himalaya"/>
-        <a:font script="Thaa" typeface="MV Boli"/>
-        <a:font script="Deva" typeface="Mangal"/>
-        <a:font script="Telu" typeface="Gautami"/>
-        <a:font script="Taml" typeface="Latha"/>
-        <a:font script="Syrc" typeface="Estrangelo Edessa"/>
-        <a:font script="Orya" typeface="Kalinga"/>
-        <a:font script="Mlym" typeface="Kartika"/>
-        <a:font script="Laoo" typeface="DokChampa"/>
-        <a:font script="Sinh" typeface="Iskoola Pota"/>
-        <a:font script="Mong" typeface="Mongolian Baiti"/>
-        <a:font script="Viet" typeface="Arial"/>
-        <a:font script="Uigh" typeface="Microsoft Uighur"/>
-        <a:font script="Geor" typeface="Sylfaen"/>
-      </a:minorFont>
-    </a:fontScheme>
-    <a:fmtScheme name="Office">
-      <a:fillStyleLst>
-        <a:solidFill>
-          <a:schemeClr val="phClr"/>
-        </a:solidFill>
-        <a:gradFill rotWithShape="1">
-          <a:gsLst>
-            <a:gs pos="0">
-              <a:schemeClr val="phClr">
-                <a:tint val="50000"/>
-                <a:satMod val="300000"/>
-              </a:schemeClr>
-            </a:gs>
-            <a:gs pos="35000">
-              <a:schemeClr val="phClr">
-                <a:tint val="37000"/>
-                <a:satMod val="300000"/>
-              </a:schemeClr>
-            </a:gs>
-            <a:gs pos="100000">
-              <a:schemeClr val="phClr">
-                <a:tint val="15000"/>
-                <a:satMod val="350000"/>
-              </a:schemeClr>
-            </a:gs>
-          </a:gsLst>
-          <a:lin ang="16200000" scaled="1"/>
-        </a:gradFill>
-        <a:gradFill rotWithShape="1">
-          <a:gsLst>
-            <a:gs pos="0">
-              <a:schemeClr val="phClr">
-                <a:tint val="100000"/>
-                <a:shade val="100000"/>
-                <a:satMod val="130000"/>
-              </a:schemeClr>
-            </a:gs>
-            <a:gs pos="100000">
-              <a:schemeClr val="phClr">
-                <a:tint val="50000"/>
-                <a:shade val="100000"/>
-                <a:satMod val="350000"/>
-              </a:schemeClr>
-            </a:gs>
-          </a:gsLst>
-          <a:lin ang="16200000" scaled="0"/>
-        </a:gradFill>
-      </a:fillStyleLst>
-      <a:lnStyleLst>
-        <a:ln w="9525" cap="flat" cmpd="sng" algn="ctr">
-          <a:solidFill>
-            <a:schemeClr val="phClr">
-              <a:shade val="95000"/>
-              <a:satMod val="105000"/>
-            </a:schemeClr>
-          </a:solidFill>
-          <a:prstDash val="solid"/>
-        </a:ln>
-        <a:ln w="25400" cap="flat" cmpd="sng" algn="ctr">
-          <a:solidFill>
-            <a:schemeClr val="phClr"/>
-          </a:solidFill>
-          <a:prstDash val="solid"/>
-        </a:ln>
-        <a:ln w="38100" cap="flat" cmpd="sng" algn="ctr">
-          <a:solidFill>
-            <a:schemeClr val="phClr"/>
-          </a:solidFill>
-          <a:prstDash val="solid"/>
-        </a:ln>
-      </a:lnStyleLst>
-      <a:effectStyleLst>
-        <a:effectStyle>
-          <a:effectLst>
-            <a:outerShdw blurRad="40000" dist="20000" dir="5400000" rotWithShape="0">
-              <a:srgbClr val="000000">
-                <a:alpha val="38000"/>
-              </a:srgbClr>
-            </a:outerShdw>
-          </a:effectLst>
-        </a:effectStyle>
-        <a:effectStyle>
-          <a:effectLst>
-            <a:outerShdw blurRad="40000" dist="23000" dir="5400000" rotWithShape="0">
-              <a:srgbClr val="000000">
-                <a:alpha val="35000"/>
-              </a:srgbClr>
-            </a:outerShdw>
-          </a:effectLst>
-        </a:effectStyle>
-        <a:effectStyle>
-          <a:effectLst>
-            <a:outerShdw blurRad="40000" dist="23000" dir="5400000" rotWithShape="0">
-              <a:srgbClr val="000000">
-                <a:alpha val="35000"/>
-              </a:srgbClr>
-            </a:outerShdw>
-          </a:effectLst>
-          <a:scene3d>
-            <a:camera prst="orthographicFront">
-              <a:rot lat="0" lon="0" rev="0"/>
-            </a:camera>
-            <a:lightRig rig="threePt" dir="t">
-              <a:rot lat="0" lon="0" rev="1200000"/>
-            </a:lightRig>
-          </a:scene3d>
-          <a:sp3d>
-            <a:bevelT w="63500" h="25400"/>
-          </a:sp3d>
-        </a:effectStyle>
-      </a:effectStyleLst>
-      <a:bgFillStyleLst>
-        <a:solidFill>
-          <a:schemeClr val="phClr"/>
-        </a:solidFill>
-        <a:gradFill rotWithShape="1">
-          <a:gsLst>
-            <a:gs pos="0">
-              <a:schemeClr val="phClr">
-                <a:tint val="40000"/>
-                <a:satMod val="350000"/>
-              </a:schemeClr>
-            </a:gs>
-            <a:gs pos="40000">
-              <a:schemeClr val="phClr">
-                <a:tint val="45000"/>
-                <a:shade val="99000"/>
-                <a:satMod val="350000"/>
-              </a:schemeClr>
-            </a:gs>
-            <a:gs pos="100000">
-              <a:schemeClr val="phClr">
-                <a:shade val="20000"/>
-                <a:satMod val="255000"/>
-              </a:schemeClr>
-            </a:gs>
-          </a:gsLst>
-          <a:path path="circle">
-            <a:fillToRect l="50000" t="-80000" r="50000" b="180000"/>
-          </a:path>
-        </a:gradFill>
-        <a:gradFill rotWithShape="1">
-          <a:gsLst>
-            <a:gs pos="0">
-              <a:schemeClr val="phClr">
-                <a:tint val="80000"/>
-                <a:satMod val="300000"/>
-              </a:schemeClr>
-            </a:gs>
-            <a:gs pos="100000">
-              <a:schemeClr val="phClr">
-                <a:shade val="30000"/>
-                <a:satMod val="200000"/>
-              </a:schemeClr>
-            </a:gs>
-          </a:gsLst>
-          <a:path path="circle">
-            <a:fillToRect l="50000" t="50000" r="50000" b="50000"/>
-          </a:path>
-        </a:gradFill>
-      </a:bgFillStyleLst>
-    </a:fmtScheme>
-  </a:themeElements>
-</a:theme>
 </file>
</xml_diff>

<commit_message>
Cleaning slides for day6 and day7
</commit_message>
<xml_diff>
--- a/day06/slides/Day6_slides.pptx
+++ b/day06/slides/Day6_slides.pptx
@@ -21,6 +21,7 @@
     <p:sldId id="266" r:id="rId16"/>
     <p:sldId id="267" r:id="rId17"/>
     <p:sldId id="268" r:id="rId18"/>
+    <p:sldId id="269" r:id="rId19"/>
   </p:sldIdLst>
   <p:sldSz cy="5143500" cx="9144000"/>
   <p:notesSz cx="6858000" cy="9144000"/>
@@ -269,7 +270,7 @@
       </p15:sldGuideLst>
     </p:ext>
     <p:ext uri="GoogleSlidesCustomDataVersion2">
-      <go:slidesCustomData xmlns:go="http://customooxmlschemas.google.com/" r:id="rId19" roundtripDataSignature="AMtx7mhf0bLvDHBYi12bMKguiBuF0y5QpQ=="/>
+      <go:slidesCustomData xmlns:go="http://customooxmlschemas.google.com/" r:id="rId20" roundtripDataSignature="AMtx7mhZZP/TlKqV0CMWp0gedXoCsAp76w=="/>
     </p:ext>
   </p:extLst>
 </p:presentation>
@@ -965,7 +966,7 @@
   <p:cSld>
     <p:spTree>
       <p:nvGrpSpPr>
-        <p:cNvPr id="145" name="Shape 145"/>
+        <p:cNvPr id="143" name="Shape 143"/>
         <p:cNvGrpSpPr/>
         <p:nvPr/>
       </p:nvGrpSpPr>
@@ -979,7 +980,124 @@
       </p:grpSpPr>
       <p:sp>
         <p:nvSpPr>
-          <p:cNvPr id="146" name="Google Shape;146;g255c330574c_0_61:notes"/>
+          <p:cNvPr id="144" name="Google Shape;144;g255c330574c_0_0:notes"/>
+          <p:cNvSpPr/>
+          <p:nvPr>
+            <p:ph idx="2" type="sldImg"/>
+          </p:nvPr>
+        </p:nvSpPr>
+        <p:spPr>
+          <a:xfrm>
+            <a:off x="381000" y="685800"/>
+            <a:ext cx="6096000" cy="3429000"/>
+          </a:xfrm>
+          <a:custGeom>
+            <a:rect b="b" l="l" r="r" t="t"/>
+            <a:pathLst>
+              <a:path extrusionOk="0" h="120000" w="120000">
+                <a:moveTo>
+                  <a:pt x="0" y="0"/>
+                </a:moveTo>
+                <a:lnTo>
+                  <a:pt x="120000" y="0"/>
+                </a:lnTo>
+                <a:lnTo>
+                  <a:pt x="120000" y="120000"/>
+                </a:lnTo>
+                <a:lnTo>
+                  <a:pt x="0" y="120000"/>
+                </a:lnTo>
+                <a:close/>
+              </a:path>
+            </a:pathLst>
+          </a:custGeom>
+          <a:noFill/>
+          <a:ln cap="flat" cmpd="sng" w="9525">
+            <a:solidFill>
+              <a:srgbClr val="000000"/>
+            </a:solidFill>
+            <a:prstDash val="solid"/>
+            <a:round/>
+            <a:headEnd len="sm" w="sm" type="none"/>
+            <a:tailEnd len="sm" w="sm" type="none"/>
+          </a:ln>
+        </p:spPr>
+      </p:sp>
+      <p:sp>
+        <p:nvSpPr>
+          <p:cNvPr id="145" name="Google Shape;145;g255c330574c_0_0:notes"/>
+          <p:cNvSpPr txBox="1"/>
+          <p:nvPr>
+            <p:ph idx="1" type="body"/>
+          </p:nvPr>
+        </p:nvSpPr>
+        <p:spPr>
+          <a:xfrm>
+            <a:off x="685800" y="4343400"/>
+            <a:ext cx="5486400" cy="4114800"/>
+          </a:xfrm>
+          <a:prstGeom prst="rect">
+            <a:avLst/>
+          </a:prstGeom>
+          <a:noFill/>
+          <a:ln>
+            <a:noFill/>
+          </a:ln>
+        </p:spPr>
+        <p:txBody>
+          <a:bodyPr anchorCtr="0" anchor="t" bIns="91425" lIns="91425" spcFirstLastPara="1" rIns="91425" wrap="square" tIns="91425">
+            <a:noAutofit/>
+          </a:bodyPr>
+          <a:lstStyle/>
+          <a:p>
+            <a:pPr indent="0" lvl="0" marL="0" rtl="0" algn="l">
+              <a:lnSpc>
+                <a:spcPct val="100000"/>
+              </a:lnSpc>
+              <a:spcBef>
+                <a:spcPts val="0"/>
+              </a:spcBef>
+              <a:spcAft>
+                <a:spcPts val="0"/>
+              </a:spcAft>
+              <a:buSzPts val="1100"/>
+              <a:buNone/>
+            </a:pPr>
+            <a:r>
+              <a:t/>
+            </a:r>
+            <a:endParaRPr/>
+          </a:p>
+        </p:txBody>
+      </p:sp>
+    </p:spTree>
+  </p:cSld>
+  <p:clrMapOvr>
+    <a:masterClrMapping/>
+  </p:clrMapOvr>
+</p:notes>
+</file>
+
+<file path=ppt/notesSlides/notesSlide11.xml><?xml version="1.0" encoding="utf-8"?>
+<p:notes xmlns:a="http://schemas.openxmlformats.org/drawingml/2006/main" xmlns:r="http://schemas.openxmlformats.org/officeDocument/2006/relationships" xmlns:mc="http://schemas.openxmlformats.org/markup-compatibility/2006" xmlns:mv="urn:schemas-microsoft-com:mac:vml" xmlns:p="http://schemas.openxmlformats.org/presentationml/2006/main" xmlns:c="http://schemas.openxmlformats.org/drawingml/2006/chart" xmlns:dgm="http://schemas.openxmlformats.org/drawingml/2006/diagram" xmlns:o="urn:schemas-microsoft-com:office:office" xmlns:v="urn:schemas-microsoft-com:vml" xmlns:pvml="urn:schemas-microsoft-com:office:powerpoint" xmlns:com="http://schemas.openxmlformats.org/drawingml/2006/compatibility" xmlns:p14="http://schemas.microsoft.com/office/powerpoint/2010/main" xmlns:p15="http://schemas.microsoft.com/office/powerpoint/2012/main" xmlns:ahyp="http://schemas.microsoft.com/office/drawing/2018/hyperlinkcolor" showMasterPhAnim="0" showMasterSp="0">
+  <p:cSld>
+    <p:spTree>
+      <p:nvGrpSpPr>
+        <p:cNvPr id="151" name="Shape 151"/>
+        <p:cNvGrpSpPr/>
+        <p:nvPr/>
+      </p:nvGrpSpPr>
+      <p:grpSpPr>
+        <a:xfrm>
+          <a:off x="0" y="0"/>
+          <a:ext cx="0" cy="0"/>
+          <a:chOff x="0" y="0"/>
+          <a:chExt cx="0" cy="0"/>
+        </a:xfrm>
+      </p:grpSpPr>
+      <p:sp>
+        <p:nvSpPr>
+          <p:cNvPr id="152" name="Google Shape;152;g255c330574c_0_61:notes"/>
           <p:cNvSpPr/>
           <p:nvPr>
             <p:ph idx="2" type="sldImg"/>
@@ -1024,7 +1142,7 @@
       </p:sp>
       <p:sp>
         <p:nvSpPr>
-          <p:cNvPr id="147" name="Google Shape;147;g255c330574c_0_61:notes"/>
+          <p:cNvPr id="153" name="Google Shape;153;g255c330574c_0_61:notes"/>
           <p:cNvSpPr txBox="1"/>
           <p:nvPr>
             <p:ph idx="1" type="body"/>
@@ -1077,12 +1195,12 @@
 </p:notes>
 </file>
 
-<file path=ppt/notesSlides/notesSlide11.xml><?xml version="1.0" encoding="utf-8"?>
+<file path=ppt/notesSlides/notesSlide12.xml><?xml version="1.0" encoding="utf-8"?>
 <p:notes xmlns:a="http://schemas.openxmlformats.org/drawingml/2006/main" xmlns:r="http://schemas.openxmlformats.org/officeDocument/2006/relationships" xmlns:mc="http://schemas.openxmlformats.org/markup-compatibility/2006" xmlns:mv="urn:schemas-microsoft-com:mac:vml" xmlns:p="http://schemas.openxmlformats.org/presentationml/2006/main" xmlns:c="http://schemas.openxmlformats.org/drawingml/2006/chart" xmlns:dgm="http://schemas.openxmlformats.org/drawingml/2006/diagram" xmlns:o="urn:schemas-microsoft-com:office:office" xmlns:v="urn:schemas-microsoft-com:vml" xmlns:pvml="urn:schemas-microsoft-com:office:powerpoint" xmlns:com="http://schemas.openxmlformats.org/drawingml/2006/compatibility" xmlns:p14="http://schemas.microsoft.com/office/powerpoint/2010/main" xmlns:p15="http://schemas.microsoft.com/office/powerpoint/2012/main" xmlns:ahyp="http://schemas.microsoft.com/office/drawing/2018/hyperlinkcolor" showMasterPhAnim="0" showMasterSp="0">
   <p:cSld>
     <p:spTree>
       <p:nvGrpSpPr>
-        <p:cNvPr id="151" name="Shape 151"/>
+        <p:cNvPr id="157" name="Shape 157"/>
         <p:cNvGrpSpPr/>
         <p:nvPr/>
       </p:nvGrpSpPr>
@@ -1096,7 +1214,7 @@
       </p:grpSpPr>
       <p:sp>
         <p:nvSpPr>
-          <p:cNvPr id="152" name="Google Shape;152;g255c330574c_0_11:notes"/>
+          <p:cNvPr id="158" name="Google Shape;158;g255c330574c_0_11:notes"/>
           <p:cNvSpPr/>
           <p:nvPr>
             <p:ph idx="2" type="sldImg"/>
@@ -1141,7 +1259,7 @@
       </p:sp>
       <p:sp>
         <p:nvSpPr>
-          <p:cNvPr id="153" name="Google Shape;153;g255c330574c_0_11:notes"/>
+          <p:cNvPr id="159" name="Google Shape;159;g255c330574c_0_11:notes"/>
           <p:cNvSpPr txBox="1"/>
           <p:nvPr>
             <p:ph idx="1" type="body"/>
@@ -1194,12 +1312,12 @@
 </p:notes>
 </file>
 
-<file path=ppt/notesSlides/notesSlide12.xml><?xml version="1.0" encoding="utf-8"?>
+<file path=ppt/notesSlides/notesSlide13.xml><?xml version="1.0" encoding="utf-8"?>
 <p:notes xmlns:a="http://schemas.openxmlformats.org/drawingml/2006/main" xmlns:r="http://schemas.openxmlformats.org/officeDocument/2006/relationships" xmlns:mc="http://schemas.openxmlformats.org/markup-compatibility/2006" xmlns:mv="urn:schemas-microsoft-com:mac:vml" xmlns:p="http://schemas.openxmlformats.org/presentationml/2006/main" xmlns:c="http://schemas.openxmlformats.org/drawingml/2006/chart" xmlns:dgm="http://schemas.openxmlformats.org/drawingml/2006/diagram" xmlns:o="urn:schemas-microsoft-com:office:office" xmlns:v="urn:schemas-microsoft-com:vml" xmlns:pvml="urn:schemas-microsoft-com:office:powerpoint" xmlns:com="http://schemas.openxmlformats.org/drawingml/2006/compatibility" xmlns:p14="http://schemas.microsoft.com/office/powerpoint/2010/main" xmlns:p15="http://schemas.microsoft.com/office/powerpoint/2012/main" xmlns:ahyp="http://schemas.microsoft.com/office/drawing/2018/hyperlinkcolor" showMasterPhAnim="0" showMasterSp="0">
   <p:cSld>
     <p:spTree>
       <p:nvGrpSpPr>
-        <p:cNvPr id="158" name="Shape 158"/>
+        <p:cNvPr id="164" name="Shape 164"/>
         <p:cNvGrpSpPr/>
         <p:nvPr/>
       </p:nvGrpSpPr>
@@ -1213,7 +1331,7 @@
       </p:grpSpPr>
       <p:sp>
         <p:nvSpPr>
-          <p:cNvPr id="159" name="Google Shape;159;p10:notes"/>
+          <p:cNvPr id="165" name="Google Shape;165;p10:notes"/>
           <p:cNvSpPr/>
           <p:nvPr>
             <p:ph idx="2" type="sldImg"/>
@@ -1258,7 +1376,7 @@
       </p:sp>
       <p:sp>
         <p:nvSpPr>
-          <p:cNvPr id="160" name="Google Shape;160;p10:notes"/>
+          <p:cNvPr id="166" name="Google Shape;166;p10:notes"/>
           <p:cNvSpPr txBox="1"/>
           <p:nvPr>
             <p:ph idx="1" type="body"/>
@@ -1311,12 +1429,12 @@
 </p:notes>
 </file>
 
-<file path=ppt/notesSlides/notesSlide13.xml><?xml version="1.0" encoding="utf-8"?>
+<file path=ppt/notesSlides/notesSlide14.xml><?xml version="1.0" encoding="utf-8"?>
 <p:notes xmlns:a="http://schemas.openxmlformats.org/drawingml/2006/main" xmlns:r="http://schemas.openxmlformats.org/officeDocument/2006/relationships" xmlns:mc="http://schemas.openxmlformats.org/markup-compatibility/2006" xmlns:mv="urn:schemas-microsoft-com:mac:vml" xmlns:p="http://schemas.openxmlformats.org/presentationml/2006/main" xmlns:c="http://schemas.openxmlformats.org/drawingml/2006/chart" xmlns:dgm="http://schemas.openxmlformats.org/drawingml/2006/diagram" xmlns:o="urn:schemas-microsoft-com:office:office" xmlns:v="urn:schemas-microsoft-com:vml" xmlns:pvml="urn:schemas-microsoft-com:office:powerpoint" xmlns:com="http://schemas.openxmlformats.org/drawingml/2006/compatibility" xmlns:p14="http://schemas.microsoft.com/office/powerpoint/2010/main" xmlns:p15="http://schemas.microsoft.com/office/powerpoint/2012/main" xmlns:ahyp="http://schemas.microsoft.com/office/drawing/2018/hyperlinkcolor" showMasterPhAnim="0" showMasterSp="0">
   <p:cSld>
     <p:spTree>
       <p:nvGrpSpPr>
-        <p:cNvPr id="168" name="Shape 168"/>
+        <p:cNvPr id="174" name="Shape 174"/>
         <p:cNvGrpSpPr/>
         <p:nvPr/>
       </p:nvGrpSpPr>
@@ -1330,7 +1448,7 @@
       </p:grpSpPr>
       <p:sp>
         <p:nvSpPr>
-          <p:cNvPr id="169" name="Google Shape;169;p12:notes"/>
+          <p:cNvPr id="175" name="Google Shape;175;p12:notes"/>
           <p:cNvSpPr/>
           <p:nvPr>
             <p:ph idx="2" type="sldImg"/>
@@ -1375,7 +1493,7 @@
       </p:sp>
       <p:sp>
         <p:nvSpPr>
-          <p:cNvPr id="170" name="Google Shape;170;p12:notes"/>
+          <p:cNvPr id="176" name="Google Shape;176;p12:notes"/>
           <p:cNvSpPr txBox="1"/>
           <p:nvPr>
             <p:ph idx="1" type="body"/>
@@ -1447,7 +1565,106 @@
       </p:grpSpPr>
       <p:sp>
         <p:nvSpPr>
-          <p:cNvPr id="60" name="Google Shape;60;g255c330574c_0_66:notes"/>
+          <p:cNvPr id="60" name="Google Shape;60;g36bad18276d_0_1:notes"/>
+          <p:cNvSpPr/>
+          <p:nvPr>
+            <p:ph idx="2" type="sldImg"/>
+          </p:nvPr>
+        </p:nvSpPr>
+        <p:spPr>
+          <a:xfrm>
+            <a:off x="381300" y="685800"/>
+            <a:ext cx="6096000" cy="3429000"/>
+          </a:xfrm>
+          <a:custGeom>
+            <a:rect b="b" l="l" r="r" t="t"/>
+            <a:pathLst>
+              <a:path extrusionOk="0" h="120000" w="120000">
+                <a:moveTo>
+                  <a:pt x="0" y="0"/>
+                </a:moveTo>
+                <a:lnTo>
+                  <a:pt x="120000" y="0"/>
+                </a:lnTo>
+                <a:lnTo>
+                  <a:pt x="120000" y="120000"/>
+                </a:lnTo>
+                <a:lnTo>
+                  <a:pt x="0" y="120000"/>
+                </a:lnTo>
+                <a:close/>
+              </a:path>
+            </a:pathLst>
+          </a:custGeom>
+        </p:spPr>
+      </p:sp>
+      <p:sp>
+        <p:nvSpPr>
+          <p:cNvPr id="61" name="Google Shape;61;g36bad18276d_0_1:notes"/>
+          <p:cNvSpPr txBox="1"/>
+          <p:nvPr>
+            <p:ph idx="1" type="body"/>
+          </p:nvPr>
+        </p:nvSpPr>
+        <p:spPr>
+          <a:xfrm>
+            <a:off x="685800" y="4343400"/>
+            <a:ext cx="5486400" cy="4114800"/>
+          </a:xfrm>
+          <a:prstGeom prst="rect">
+            <a:avLst/>
+          </a:prstGeom>
+        </p:spPr>
+        <p:txBody>
+          <a:bodyPr anchorCtr="0" anchor="t" bIns="91425" lIns="91425" spcFirstLastPara="1" rIns="91425" wrap="square" tIns="91425">
+            <a:noAutofit/>
+          </a:bodyPr>
+          <a:lstStyle/>
+          <a:p>
+            <a:pPr indent="0" lvl="0" marL="0" rtl="0" algn="l">
+              <a:spcBef>
+                <a:spcPts val="0"/>
+              </a:spcBef>
+              <a:spcAft>
+                <a:spcPts val="0"/>
+              </a:spcAft>
+              <a:buNone/>
+            </a:pPr>
+            <a:r>
+              <a:t/>
+            </a:r>
+            <a:endParaRPr/>
+          </a:p>
+        </p:txBody>
+      </p:sp>
+    </p:spTree>
+  </p:cSld>
+  <p:clrMapOvr>
+    <a:masterClrMapping/>
+  </p:clrMapOvr>
+</p:notes>
+</file>
+
+<file path=ppt/notesSlides/notesSlide3.xml><?xml version="1.0" encoding="utf-8"?>
+<p:notes xmlns:a="http://schemas.openxmlformats.org/drawingml/2006/main" xmlns:r="http://schemas.openxmlformats.org/officeDocument/2006/relationships" xmlns:mc="http://schemas.openxmlformats.org/markup-compatibility/2006" xmlns:mv="urn:schemas-microsoft-com:mac:vml" xmlns:p="http://schemas.openxmlformats.org/presentationml/2006/main" xmlns:c="http://schemas.openxmlformats.org/drawingml/2006/chart" xmlns:dgm="http://schemas.openxmlformats.org/drawingml/2006/diagram" xmlns:o="urn:schemas-microsoft-com:office:office" xmlns:v="urn:schemas-microsoft-com:vml" xmlns:pvml="urn:schemas-microsoft-com:office:powerpoint" xmlns:com="http://schemas.openxmlformats.org/drawingml/2006/compatibility" xmlns:p14="http://schemas.microsoft.com/office/powerpoint/2010/main" xmlns:p15="http://schemas.microsoft.com/office/powerpoint/2012/main" xmlns:ahyp="http://schemas.microsoft.com/office/drawing/2018/hyperlinkcolor" showMasterPhAnim="0" showMasterSp="0">
+  <p:cSld>
+    <p:spTree>
+      <p:nvGrpSpPr>
+        <p:cNvPr id="65" name="Shape 65"/>
+        <p:cNvGrpSpPr/>
+        <p:nvPr/>
+      </p:nvGrpSpPr>
+      <p:grpSpPr>
+        <a:xfrm>
+          <a:off x="0" y="0"/>
+          <a:ext cx="0" cy="0"/>
+          <a:chOff x="0" y="0"/>
+          <a:chExt cx="0" cy="0"/>
+        </a:xfrm>
+      </p:grpSpPr>
+      <p:sp>
+        <p:nvSpPr>
+          <p:cNvPr id="66" name="Google Shape;66;g255c330574c_0_66:notes"/>
           <p:cNvSpPr/>
           <p:nvPr>
             <p:ph idx="2" type="sldImg"/>
@@ -1492,7 +1709,7 @@
       </p:sp>
       <p:sp>
         <p:nvSpPr>
-          <p:cNvPr id="61" name="Google Shape;61;g255c330574c_0_66:notes"/>
+          <p:cNvPr id="67" name="Google Shape;67;g255c330574c_0_66:notes"/>
           <p:cNvSpPr txBox="1"/>
           <p:nvPr>
             <p:ph idx="1" type="body"/>
@@ -1545,12 +1762,12 @@
 </p:notes>
 </file>
 
-<file path=ppt/notesSlides/notesSlide3.xml><?xml version="1.0" encoding="utf-8"?>
+<file path=ppt/notesSlides/notesSlide4.xml><?xml version="1.0" encoding="utf-8"?>
 <p:notes xmlns:a="http://schemas.openxmlformats.org/drawingml/2006/main" xmlns:r="http://schemas.openxmlformats.org/officeDocument/2006/relationships" xmlns:mc="http://schemas.openxmlformats.org/markup-compatibility/2006" xmlns:mv="urn:schemas-microsoft-com:mac:vml" xmlns:p="http://schemas.openxmlformats.org/presentationml/2006/main" xmlns:c="http://schemas.openxmlformats.org/drawingml/2006/chart" xmlns:dgm="http://schemas.openxmlformats.org/drawingml/2006/diagram" xmlns:o="urn:schemas-microsoft-com:office:office" xmlns:v="urn:schemas-microsoft-com:vml" xmlns:pvml="urn:schemas-microsoft-com:office:powerpoint" xmlns:com="http://schemas.openxmlformats.org/drawingml/2006/compatibility" xmlns:p14="http://schemas.microsoft.com/office/powerpoint/2010/main" xmlns:p15="http://schemas.microsoft.com/office/powerpoint/2012/main" xmlns:ahyp="http://schemas.microsoft.com/office/drawing/2018/hyperlinkcolor" showMasterPhAnim="0" showMasterSp="0">
   <p:cSld>
     <p:spTree>
       <p:nvGrpSpPr>
-        <p:cNvPr id="67" name="Shape 67"/>
+        <p:cNvPr id="73" name="Shape 73"/>
         <p:cNvGrpSpPr/>
         <p:nvPr/>
       </p:nvGrpSpPr>
@@ -1564,7 +1781,7 @@
       </p:grpSpPr>
       <p:sp>
         <p:nvSpPr>
-          <p:cNvPr id="68" name="Google Shape;68;p3:notes"/>
+          <p:cNvPr id="74" name="Google Shape;74;p3:notes"/>
           <p:cNvSpPr/>
           <p:nvPr>
             <p:ph idx="2" type="sldImg"/>
@@ -1609,7 +1826,7 @@
       </p:sp>
       <p:sp>
         <p:nvSpPr>
-          <p:cNvPr id="69" name="Google Shape;69;p3:notes"/>
+          <p:cNvPr id="75" name="Google Shape;75;p3:notes"/>
           <p:cNvSpPr txBox="1"/>
           <p:nvPr>
             <p:ph idx="1" type="body"/>
@@ -1662,12 +1879,12 @@
 </p:notes>
 </file>
 
-<file path=ppt/notesSlides/notesSlide4.xml><?xml version="1.0" encoding="utf-8"?>
+<file path=ppt/notesSlides/notesSlide5.xml><?xml version="1.0" encoding="utf-8"?>
 <p:notes xmlns:a="http://schemas.openxmlformats.org/drawingml/2006/main" xmlns:r="http://schemas.openxmlformats.org/officeDocument/2006/relationships" xmlns:mc="http://schemas.openxmlformats.org/markup-compatibility/2006" xmlns:mv="urn:schemas-microsoft-com:mac:vml" xmlns:p="http://schemas.openxmlformats.org/presentationml/2006/main" xmlns:c="http://schemas.openxmlformats.org/drawingml/2006/chart" xmlns:dgm="http://schemas.openxmlformats.org/drawingml/2006/diagram" xmlns:o="urn:schemas-microsoft-com:office:office" xmlns:v="urn:schemas-microsoft-com:vml" xmlns:pvml="urn:schemas-microsoft-com:office:powerpoint" xmlns:com="http://schemas.openxmlformats.org/drawingml/2006/compatibility" xmlns:p14="http://schemas.microsoft.com/office/powerpoint/2010/main" xmlns:p15="http://schemas.microsoft.com/office/powerpoint/2012/main" xmlns:ahyp="http://schemas.microsoft.com/office/drawing/2018/hyperlinkcolor" showMasterPhAnim="0" showMasterSp="0">
   <p:cSld>
     <p:spTree>
       <p:nvGrpSpPr>
-        <p:cNvPr id="75" name="Shape 75"/>
+        <p:cNvPr id="81" name="Shape 81"/>
         <p:cNvGrpSpPr/>
         <p:nvPr/>
       </p:nvGrpSpPr>
@@ -1681,7 +1898,7 @@
       </p:grpSpPr>
       <p:sp>
         <p:nvSpPr>
-          <p:cNvPr id="76" name="Google Shape;76;p4:notes"/>
+          <p:cNvPr id="82" name="Google Shape;82;p4:notes"/>
           <p:cNvSpPr/>
           <p:nvPr>
             <p:ph idx="2" type="sldImg"/>
@@ -1726,7 +1943,7 @@
       </p:sp>
       <p:sp>
         <p:nvSpPr>
-          <p:cNvPr id="77" name="Google Shape;77;p4:notes"/>
+          <p:cNvPr id="83" name="Google Shape;83;p4:notes"/>
           <p:cNvSpPr txBox="1"/>
           <p:nvPr>
             <p:ph idx="1" type="body"/>
@@ -1779,12 +1996,12 @@
 </p:notes>
 </file>
 
-<file path=ppt/notesSlides/notesSlide5.xml><?xml version="1.0" encoding="utf-8"?>
+<file path=ppt/notesSlides/notesSlide6.xml><?xml version="1.0" encoding="utf-8"?>
 <p:notes xmlns:a="http://schemas.openxmlformats.org/drawingml/2006/main" xmlns:r="http://schemas.openxmlformats.org/officeDocument/2006/relationships" xmlns:mc="http://schemas.openxmlformats.org/markup-compatibility/2006" xmlns:mv="urn:schemas-microsoft-com:mac:vml" xmlns:p="http://schemas.openxmlformats.org/presentationml/2006/main" xmlns:c="http://schemas.openxmlformats.org/drawingml/2006/chart" xmlns:dgm="http://schemas.openxmlformats.org/drawingml/2006/diagram" xmlns:o="urn:schemas-microsoft-com:office:office" xmlns:v="urn:schemas-microsoft-com:vml" xmlns:pvml="urn:schemas-microsoft-com:office:powerpoint" xmlns:com="http://schemas.openxmlformats.org/drawingml/2006/compatibility" xmlns:p14="http://schemas.microsoft.com/office/powerpoint/2010/main" xmlns:p15="http://schemas.microsoft.com/office/powerpoint/2012/main" xmlns:ahyp="http://schemas.microsoft.com/office/drawing/2018/hyperlinkcolor" showMasterPhAnim="0" showMasterSp="0">
   <p:cSld>
     <p:spTree>
       <p:nvGrpSpPr>
-        <p:cNvPr id="84" name="Shape 84"/>
+        <p:cNvPr id="90" name="Shape 90"/>
         <p:cNvGrpSpPr/>
         <p:nvPr/>
       </p:nvGrpSpPr>
@@ -1798,7 +2015,7 @@
       </p:grpSpPr>
       <p:sp>
         <p:nvSpPr>
-          <p:cNvPr id="85" name="Google Shape;85;g255c3305560_0_0:notes"/>
+          <p:cNvPr id="91" name="Google Shape;91;g255c3305560_0_0:notes"/>
           <p:cNvSpPr/>
           <p:nvPr>
             <p:ph idx="2" type="sldImg"/>
@@ -1843,7 +2060,7 @@
       </p:sp>
       <p:sp>
         <p:nvSpPr>
-          <p:cNvPr id="86" name="Google Shape;86;g255c3305560_0_0:notes"/>
+          <p:cNvPr id="92" name="Google Shape;92;g255c3305560_0_0:notes"/>
           <p:cNvSpPr txBox="1"/>
           <p:nvPr>
             <p:ph idx="1" type="body"/>
@@ -1896,12 +2113,12 @@
 </p:notes>
 </file>
 
-<file path=ppt/notesSlides/notesSlide6.xml><?xml version="1.0" encoding="utf-8"?>
+<file path=ppt/notesSlides/notesSlide7.xml><?xml version="1.0" encoding="utf-8"?>
 <p:notes xmlns:a="http://schemas.openxmlformats.org/drawingml/2006/main" xmlns:r="http://schemas.openxmlformats.org/officeDocument/2006/relationships" xmlns:mc="http://schemas.openxmlformats.org/markup-compatibility/2006" xmlns:mv="urn:schemas-microsoft-com:mac:vml" xmlns:p="http://schemas.openxmlformats.org/presentationml/2006/main" xmlns:c="http://schemas.openxmlformats.org/drawingml/2006/chart" xmlns:dgm="http://schemas.openxmlformats.org/drawingml/2006/diagram" xmlns:o="urn:schemas-microsoft-com:office:office" xmlns:v="urn:schemas-microsoft-com:vml" xmlns:pvml="urn:schemas-microsoft-com:office:powerpoint" xmlns:com="http://schemas.openxmlformats.org/drawingml/2006/compatibility" xmlns:p14="http://schemas.microsoft.com/office/powerpoint/2010/main" xmlns:p15="http://schemas.microsoft.com/office/powerpoint/2012/main" xmlns:ahyp="http://schemas.microsoft.com/office/drawing/2018/hyperlinkcolor" showMasterPhAnim="0" showMasterSp="0">
   <p:cSld>
     <p:spTree>
       <p:nvGrpSpPr>
-        <p:cNvPr id="104" name="Shape 104"/>
+        <p:cNvPr id="110" name="Shape 110"/>
         <p:cNvGrpSpPr/>
         <p:nvPr/>
       </p:nvGrpSpPr>
@@ -1915,7 +2132,7 @@
       </p:grpSpPr>
       <p:sp>
         <p:nvSpPr>
-          <p:cNvPr id="105" name="Google Shape;105;p5:notes"/>
+          <p:cNvPr id="111" name="Google Shape;111;p5:notes"/>
           <p:cNvSpPr/>
           <p:nvPr>
             <p:ph idx="2" type="sldImg"/>
@@ -1960,7 +2177,7 @@
       </p:sp>
       <p:sp>
         <p:nvSpPr>
-          <p:cNvPr id="106" name="Google Shape;106;p5:notes"/>
+          <p:cNvPr id="112" name="Google Shape;112;p5:notes"/>
           <p:cNvSpPr txBox="1"/>
           <p:nvPr>
             <p:ph idx="1" type="body"/>
@@ -2013,12 +2230,12 @@
 </p:notes>
 </file>
 
-<file path=ppt/notesSlides/notesSlide7.xml><?xml version="1.0" encoding="utf-8"?>
+<file path=ppt/notesSlides/notesSlide8.xml><?xml version="1.0" encoding="utf-8"?>
 <p:notes xmlns:a="http://schemas.openxmlformats.org/drawingml/2006/main" xmlns:r="http://schemas.openxmlformats.org/officeDocument/2006/relationships" xmlns:mc="http://schemas.openxmlformats.org/markup-compatibility/2006" xmlns:mv="urn:schemas-microsoft-com:mac:vml" xmlns:p="http://schemas.openxmlformats.org/presentationml/2006/main" xmlns:c="http://schemas.openxmlformats.org/drawingml/2006/chart" xmlns:dgm="http://schemas.openxmlformats.org/drawingml/2006/diagram" xmlns:o="urn:schemas-microsoft-com:office:office" xmlns:v="urn:schemas-microsoft-com:vml" xmlns:pvml="urn:schemas-microsoft-com:office:powerpoint" xmlns:com="http://schemas.openxmlformats.org/drawingml/2006/compatibility" xmlns:p14="http://schemas.microsoft.com/office/powerpoint/2010/main" xmlns:p15="http://schemas.microsoft.com/office/powerpoint/2012/main" xmlns:ahyp="http://schemas.microsoft.com/office/drawing/2018/hyperlinkcolor" showMasterPhAnim="0" showMasterSp="0">
   <p:cSld>
     <p:spTree>
       <p:nvGrpSpPr>
-        <p:cNvPr id="118" name="Shape 118"/>
+        <p:cNvPr id="124" name="Shape 124"/>
         <p:cNvGrpSpPr/>
         <p:nvPr/>
       </p:nvGrpSpPr>
@@ -2032,7 +2249,7 @@
       </p:grpSpPr>
       <p:sp>
         <p:nvSpPr>
-          <p:cNvPr id="119" name="Google Shape;119;g276e2b878a6_0_7:notes"/>
+          <p:cNvPr id="125" name="Google Shape;125;g276e2b878a6_0_7:notes"/>
           <p:cNvSpPr/>
           <p:nvPr>
             <p:ph idx="2" type="sldImg"/>
@@ -2077,7 +2294,7 @@
       </p:sp>
       <p:sp>
         <p:nvSpPr>
-          <p:cNvPr id="120" name="Google Shape;120;g276e2b878a6_0_7:notes"/>
+          <p:cNvPr id="126" name="Google Shape;126;g276e2b878a6_0_7:notes"/>
           <p:cNvSpPr txBox="1"/>
           <p:nvPr>
             <p:ph idx="1" type="body"/>
@@ -2130,12 +2347,12 @@
 </p:notes>
 </file>
 
-<file path=ppt/notesSlides/notesSlide8.xml><?xml version="1.0" encoding="utf-8"?>
+<file path=ppt/notesSlides/notesSlide9.xml><?xml version="1.0" encoding="utf-8"?>
 <p:notes xmlns:a="http://schemas.openxmlformats.org/drawingml/2006/main" xmlns:r="http://schemas.openxmlformats.org/officeDocument/2006/relationships" xmlns:mc="http://schemas.openxmlformats.org/markup-compatibility/2006" xmlns:mv="urn:schemas-microsoft-com:mac:vml" xmlns:p="http://schemas.openxmlformats.org/presentationml/2006/main" xmlns:c="http://schemas.openxmlformats.org/drawingml/2006/chart" xmlns:dgm="http://schemas.openxmlformats.org/drawingml/2006/diagram" xmlns:o="urn:schemas-microsoft-com:office:office" xmlns:v="urn:schemas-microsoft-com:vml" xmlns:pvml="urn:schemas-microsoft-com:office:powerpoint" xmlns:com="http://schemas.openxmlformats.org/drawingml/2006/compatibility" xmlns:p14="http://schemas.microsoft.com/office/powerpoint/2010/main" xmlns:p15="http://schemas.microsoft.com/office/powerpoint/2012/main" xmlns:ahyp="http://schemas.microsoft.com/office/drawing/2018/hyperlinkcolor" showMasterPhAnim="0" showMasterSp="0">
   <p:cSld>
     <p:spTree>
       <p:nvGrpSpPr>
-        <p:cNvPr id="129" name="Shape 129"/>
+        <p:cNvPr id="135" name="Shape 135"/>
         <p:cNvGrpSpPr/>
         <p:nvPr/>
       </p:nvGrpSpPr>
@@ -2149,7 +2366,7 @@
       </p:grpSpPr>
       <p:sp>
         <p:nvSpPr>
-          <p:cNvPr id="130" name="Google Shape;130;p6:notes"/>
+          <p:cNvPr id="136" name="Google Shape;136;p6:notes"/>
           <p:cNvSpPr/>
           <p:nvPr>
             <p:ph idx="2" type="sldImg"/>
@@ -2194,124 +2411,7 @@
       </p:sp>
       <p:sp>
         <p:nvSpPr>
-          <p:cNvPr id="131" name="Google Shape;131;p6:notes"/>
-          <p:cNvSpPr txBox="1"/>
-          <p:nvPr>
-            <p:ph idx="1" type="body"/>
-          </p:nvPr>
-        </p:nvSpPr>
-        <p:spPr>
-          <a:xfrm>
-            <a:off x="685800" y="4343400"/>
-            <a:ext cx="5486400" cy="4114800"/>
-          </a:xfrm>
-          <a:prstGeom prst="rect">
-            <a:avLst/>
-          </a:prstGeom>
-          <a:noFill/>
-          <a:ln>
-            <a:noFill/>
-          </a:ln>
-        </p:spPr>
-        <p:txBody>
-          <a:bodyPr anchorCtr="0" anchor="t" bIns="91425" lIns="91425" spcFirstLastPara="1" rIns="91425" wrap="square" tIns="91425">
-            <a:noAutofit/>
-          </a:bodyPr>
-          <a:lstStyle/>
-          <a:p>
-            <a:pPr indent="0" lvl="0" marL="0" rtl="0" algn="l">
-              <a:lnSpc>
-                <a:spcPct val="100000"/>
-              </a:lnSpc>
-              <a:spcBef>
-                <a:spcPts val="0"/>
-              </a:spcBef>
-              <a:spcAft>
-                <a:spcPts val="0"/>
-              </a:spcAft>
-              <a:buSzPts val="1100"/>
-              <a:buNone/>
-            </a:pPr>
-            <a:r>
-              <a:t/>
-            </a:r>
-            <a:endParaRPr/>
-          </a:p>
-        </p:txBody>
-      </p:sp>
-    </p:spTree>
-  </p:cSld>
-  <p:clrMapOvr>
-    <a:masterClrMapping/>
-  </p:clrMapOvr>
-</p:notes>
-</file>
-
-<file path=ppt/notesSlides/notesSlide9.xml><?xml version="1.0" encoding="utf-8"?>
-<p:notes xmlns:a="http://schemas.openxmlformats.org/drawingml/2006/main" xmlns:r="http://schemas.openxmlformats.org/officeDocument/2006/relationships" xmlns:mc="http://schemas.openxmlformats.org/markup-compatibility/2006" xmlns:mv="urn:schemas-microsoft-com:mac:vml" xmlns:p="http://schemas.openxmlformats.org/presentationml/2006/main" xmlns:c="http://schemas.openxmlformats.org/drawingml/2006/chart" xmlns:dgm="http://schemas.openxmlformats.org/drawingml/2006/diagram" xmlns:o="urn:schemas-microsoft-com:office:office" xmlns:v="urn:schemas-microsoft-com:vml" xmlns:pvml="urn:schemas-microsoft-com:office:powerpoint" xmlns:com="http://schemas.openxmlformats.org/drawingml/2006/compatibility" xmlns:p14="http://schemas.microsoft.com/office/powerpoint/2010/main" xmlns:p15="http://schemas.microsoft.com/office/powerpoint/2012/main" xmlns:ahyp="http://schemas.microsoft.com/office/drawing/2018/hyperlinkcolor" showMasterPhAnim="0" showMasterSp="0">
-  <p:cSld>
-    <p:spTree>
-      <p:nvGrpSpPr>
-        <p:cNvPr id="137" name="Shape 137"/>
-        <p:cNvGrpSpPr/>
-        <p:nvPr/>
-      </p:nvGrpSpPr>
-      <p:grpSpPr>
-        <a:xfrm>
-          <a:off x="0" y="0"/>
-          <a:ext cx="0" cy="0"/>
-          <a:chOff x="0" y="0"/>
-          <a:chExt cx="0" cy="0"/>
-        </a:xfrm>
-      </p:grpSpPr>
-      <p:sp>
-        <p:nvSpPr>
-          <p:cNvPr id="138" name="Google Shape;138;g255c330574c_0_0:notes"/>
-          <p:cNvSpPr/>
-          <p:nvPr>
-            <p:ph idx="2" type="sldImg"/>
-          </p:nvPr>
-        </p:nvSpPr>
-        <p:spPr>
-          <a:xfrm>
-            <a:off x="381000" y="685800"/>
-            <a:ext cx="6096000" cy="3429000"/>
-          </a:xfrm>
-          <a:custGeom>
-            <a:rect b="b" l="l" r="r" t="t"/>
-            <a:pathLst>
-              <a:path extrusionOk="0" h="120000" w="120000">
-                <a:moveTo>
-                  <a:pt x="0" y="0"/>
-                </a:moveTo>
-                <a:lnTo>
-                  <a:pt x="120000" y="0"/>
-                </a:lnTo>
-                <a:lnTo>
-                  <a:pt x="120000" y="120000"/>
-                </a:lnTo>
-                <a:lnTo>
-                  <a:pt x="0" y="120000"/>
-                </a:lnTo>
-                <a:close/>
-              </a:path>
-            </a:pathLst>
-          </a:custGeom>
-          <a:noFill/>
-          <a:ln cap="flat" cmpd="sng" w="9525">
-            <a:solidFill>
-              <a:srgbClr val="000000"/>
-            </a:solidFill>
-            <a:prstDash val="solid"/>
-            <a:round/>
-            <a:headEnd len="sm" w="sm" type="none"/>
-            <a:tailEnd len="sm" w="sm" type="none"/>
-          </a:ln>
-        </p:spPr>
-      </p:sp>
-      <p:sp>
-        <p:nvSpPr>
-          <p:cNvPr id="139" name="Google Shape;139;g255c330574c_0_0:notes"/>
+          <p:cNvPr id="137" name="Google Shape;137;p6:notes"/>
           <p:cNvSpPr txBox="1"/>
           <p:nvPr>
             <p:ph idx="1" type="body"/>
@@ -10505,7 +10605,7 @@
         </p:spPr>
         <p:txBody>
           <a:bodyPr anchorCtr="0" anchor="b" bIns="91425" lIns="91425" spcFirstLastPara="1" rIns="91425" wrap="square" tIns="91425">
-            <a:normAutofit fontScale="90000"/>
+            <a:normAutofit/>
           </a:bodyPr>
           <a:lstStyle/>
           <a:p>
@@ -10519,27 +10619,7 @@
               <a:spcAft>
                 <a:spcPts val="0"/>
               </a:spcAft>
-              <a:buSzPct val="100000"/>
-              <a:buNone/>
-            </a:pPr>
-            <a:r>
-              <a:rPr lang="en"/>
-              <a:t>Short Read Workshop Day 6</a:t>
-            </a:r>
-            <a:endParaRPr/>
-          </a:p>
-          <a:p>
-            <a:pPr indent="0" lvl="0" marL="0" rtl="0" algn="ctr">
-              <a:lnSpc>
-                <a:spcPct val="100000"/>
-              </a:lnSpc>
-              <a:spcBef>
-                <a:spcPts val="0"/>
-              </a:spcBef>
-              <a:spcAft>
-                <a:spcPts val="0"/>
-              </a:spcAft>
-              <a:buSzPct val="100000"/>
+              <a:buSzPts val="5200"/>
               <a:buNone/>
             </a:pPr>
             <a:r>
@@ -10554,14 +10634,12 @@
         <p:nvSpPr>
           <p:cNvPr id="58" name="Google Shape;58;p1"/>
           <p:cNvSpPr txBox="1"/>
-          <p:nvPr>
-            <p:ph idx="1" type="subTitle"/>
-          </p:nvPr>
+          <p:nvPr/>
         </p:nvSpPr>
         <p:spPr>
           <a:xfrm>
             <a:off x="311700" y="3052425"/>
-            <a:ext cx="8520600" cy="792600"/>
+            <a:ext cx="8520600" cy="1226700"/>
           </a:xfrm>
           <a:prstGeom prst="rect">
             <a:avLst/>
@@ -10573,48 +10651,75 @@
         </p:spPr>
         <p:txBody>
           <a:bodyPr anchorCtr="0" anchor="t" bIns="91425" lIns="91425" spcFirstLastPara="1" rIns="91425" wrap="square" tIns="91425">
-            <a:normAutofit lnSpcReduction="20000"/>
+            <a:normAutofit lnSpcReduction="10000"/>
           </a:bodyPr>
           <a:lstStyle/>
           <a:p>
             <a:pPr indent="0" lvl="0" marL="0" rtl="0" algn="ctr">
-              <a:lnSpc>
-                <a:spcPct val="100000"/>
-              </a:lnSpc>
-              <a:spcBef>
-                <a:spcPts val="0"/>
-              </a:spcBef>
-              <a:spcAft>
-                <a:spcPts val="0"/>
-              </a:spcAft>
-              <a:buSzPts val="2800"/>
+              <a:spcBef>
+                <a:spcPts val="0"/>
+              </a:spcBef>
+              <a:spcAft>
+                <a:spcPts val="0"/>
+              </a:spcAft>
               <a:buNone/>
             </a:pPr>
             <a:r>
-              <a:rPr lang="en" sz="2500"/>
-              <a:t>Rutendo Sigauke</a:t>
+              <a:rPr lang="en" sz="2500">
+                <a:solidFill>
+                  <a:srgbClr val="595959"/>
+                </a:solidFill>
+              </a:rPr>
+              <a:t>Short Read Workshop </a:t>
             </a:r>
-            <a:endParaRPr sz="2500"/>
+            <a:endParaRPr sz="2500">
+              <a:solidFill>
+                <a:srgbClr val="595959"/>
+              </a:solidFill>
+            </a:endParaRPr>
           </a:p>
           <a:p>
             <a:pPr indent="0" lvl="0" marL="0" rtl="0" algn="ctr">
-              <a:lnSpc>
-                <a:spcPct val="100000"/>
-              </a:lnSpc>
-              <a:spcBef>
-                <a:spcPts val="0"/>
-              </a:spcBef>
-              <a:spcAft>
-                <a:spcPts val="0"/>
-              </a:spcAft>
-              <a:buSzPts val="2800"/>
+              <a:spcBef>
+                <a:spcPts val="0"/>
+              </a:spcBef>
+              <a:spcAft>
+                <a:spcPts val="0"/>
+              </a:spcAft>
               <a:buNone/>
             </a:pPr>
             <a:r>
-              <a:rPr lang="en" sz="2500"/>
-              <a:t>2025</a:t>
+              <a:rPr lang="en" sz="2500">
+                <a:solidFill>
+                  <a:srgbClr val="595959"/>
+                </a:solidFill>
+              </a:rPr>
+              <a:t>Day 6</a:t>
             </a:r>
-            <a:endParaRPr sz="2500"/>
+            <a:endParaRPr sz="2500">
+              <a:solidFill>
+                <a:srgbClr val="595959"/>
+              </a:solidFill>
+            </a:endParaRPr>
+          </a:p>
+          <a:p>
+            <a:pPr indent="0" lvl="0" marL="0" rtl="0" algn="ctr">
+              <a:spcBef>
+                <a:spcPts val="0"/>
+              </a:spcBef>
+              <a:spcAft>
+                <a:spcPts val="0"/>
+              </a:spcAft>
+              <a:buNone/>
+            </a:pPr>
+            <a:r>
+              <a:t/>
+            </a:r>
+            <a:endParaRPr sz="2500">
+              <a:solidFill>
+                <a:srgbClr val="595959"/>
+              </a:solidFill>
+            </a:endParaRPr>
           </a:p>
         </p:txBody>
       </p:sp>
@@ -10631,7 +10736,7 @@
   <p:cSld>
     <p:spTree>
       <p:nvGrpSpPr>
-        <p:cNvPr id="148" name="Shape 148"/>
+        <p:cNvPr id="146" name="Shape 146"/>
         <p:cNvGrpSpPr/>
         <p:nvPr/>
       </p:nvGrpSpPr>
@@ -10645,7 +10750,7 @@
       </p:grpSpPr>
       <p:sp>
         <p:nvSpPr>
-          <p:cNvPr id="149" name="Google Shape;149;g255c330574c_0_61"/>
+          <p:cNvPr id="147" name="Google Shape;147;g255c330574c_0_0"/>
           <p:cNvSpPr txBox="1"/>
           <p:nvPr>
             <p:ph type="title"/>
@@ -10653,7 +10758,7 @@
         </p:nvSpPr>
         <p:spPr>
           <a:xfrm>
-            <a:off x="311700" y="275550"/>
+            <a:off x="311700" y="219900"/>
             <a:ext cx="8520600" cy="572700"/>
           </a:xfrm>
           <a:prstGeom prst="rect">
@@ -10685,15 +10790,15 @@
             </a:pPr>
             <a:r>
               <a:rPr lang="en"/>
-              <a:t>Challenge Question</a:t>
+              <a:t>Learning R in RStudio</a:t>
             </a:r>
-            <a:endParaRPr/>
+            <a:endParaRPr b="1"/>
           </a:p>
         </p:txBody>
       </p:sp>
       <p:sp>
         <p:nvSpPr>
-          <p:cNvPr id="150" name="Google Shape;150;g255c330574c_0_61"/>
+          <p:cNvPr id="148" name="Google Shape;148;g255c330574c_0_0"/>
           <p:cNvSpPr txBox="1"/>
           <p:nvPr>
             <p:ph idx="1" type="body"/>
@@ -10718,7 +10823,7 @@
           </a:bodyPr>
           <a:lstStyle/>
           <a:p>
-            <a:pPr indent="-368300" lvl="0" marL="457200" rtl="0" algn="l">
+            <a:pPr indent="-355600" lvl="0" marL="457200" rtl="0" algn="l">
               <a:lnSpc>
                 <a:spcPct val="115000"/>
               </a:lnSpc>
@@ -10728,17 +10833,65 @@
               <a:spcAft>
                 <a:spcPts val="0"/>
               </a:spcAft>
-              <a:buSzPts val="2200"/>
+              <a:buSzPts val="2000"/>
               <a:buChar char="●"/>
             </a:pPr>
             <a:r>
-              <a:rPr lang="en" sz="2200"/>
-              <a:t>How would you perform a computationally intensive R job?</a:t>
+              <a:rPr lang="en" sz="2000"/>
+              <a:t>In </a:t>
             </a:r>
-            <a:endParaRPr sz="2200"/>
+            <a:r>
+              <a:rPr lang="en" sz="2000">
+                <a:solidFill>
+                  <a:srgbClr val="1155CC"/>
+                </a:solidFill>
+                <a:latin typeface="Consolas"/>
+                <a:ea typeface="Consolas"/>
+                <a:cs typeface="Consolas"/>
+                <a:sym typeface="Consolas"/>
+              </a:rPr>
+              <a:t>Day6_worksheet2_R_in_Rstudio.md </a:t>
+            </a:r>
+            <a:r>
+              <a:rPr lang="en" sz="2000">
+                <a:solidFill>
+                  <a:schemeClr val="dk2"/>
+                </a:solidFill>
+                <a:latin typeface="Arial"/>
+                <a:ea typeface="Arial"/>
+                <a:cs typeface="Arial"/>
+                <a:sym typeface="Arial"/>
+              </a:rPr>
+              <a:t>(</a:t>
+            </a:r>
+            <a:r>
+              <a:rPr lang="en" sz="2000"/>
+              <a:t>Section A</a:t>
+            </a:r>
+            <a:r>
+              <a:rPr lang="en" sz="2000">
+                <a:solidFill>
+                  <a:schemeClr val="dk2"/>
+                </a:solidFill>
+                <a:latin typeface="Arial"/>
+                <a:ea typeface="Arial"/>
+                <a:cs typeface="Arial"/>
+                <a:sym typeface="Arial"/>
+              </a:rPr>
+              <a:t>):</a:t>
+            </a:r>
+            <a:endParaRPr sz="2000">
+              <a:solidFill>
+                <a:schemeClr val="dk2"/>
+              </a:solidFill>
+              <a:latin typeface="Arial"/>
+              <a:ea typeface="Arial"/>
+              <a:cs typeface="Arial"/>
+              <a:sym typeface="Arial"/>
+            </a:endParaRPr>
           </a:p>
           <a:p>
-            <a:pPr indent="-342900" lvl="1" marL="914400" rtl="0" algn="l">
+            <a:pPr indent="-355600" lvl="0" marL="457200" rtl="0" algn="l">
               <a:lnSpc>
                 <a:spcPct val="115000"/>
               </a:lnSpc>
@@ -10748,14 +10901,266 @@
               <a:spcAft>
                 <a:spcPts val="0"/>
               </a:spcAft>
-              <a:buSzPts val="1800"/>
+              <a:buSzPts val="2000"/>
+              <a:buChar char="●"/>
+            </a:pPr>
+            <a:r>
+              <a:rPr lang="en" sz="2000">
+                <a:solidFill>
+                  <a:schemeClr val="dk2"/>
+                </a:solidFill>
+                <a:latin typeface="Arial"/>
+                <a:ea typeface="Arial"/>
+                <a:cs typeface="Arial"/>
+                <a:sym typeface="Arial"/>
+              </a:rPr>
+              <a:t>We will go over the </a:t>
+            </a:r>
+            <a:r>
+              <a:rPr lang="en" sz="2000">
+                <a:solidFill>
+                  <a:srgbClr val="1155CC"/>
+                </a:solidFill>
+                <a:latin typeface="Consolas"/>
+                <a:ea typeface="Consolas"/>
+                <a:cs typeface="Consolas"/>
+                <a:sym typeface="Consolas"/>
+              </a:rPr>
+              <a:t>Learning_R.R</a:t>
+            </a:r>
+            <a:r>
+              <a:rPr lang="en" sz="2000"/>
+              <a:t> worksheet in R Studio:</a:t>
+            </a:r>
+            <a:endParaRPr sz="2000"/>
+          </a:p>
+          <a:p>
+            <a:pPr indent="-355600" lvl="1" marL="914400" rtl="0" algn="l">
+              <a:lnSpc>
+                <a:spcPct val="115000"/>
+              </a:lnSpc>
+              <a:spcBef>
+                <a:spcPts val="0"/>
+              </a:spcBef>
+              <a:spcAft>
+                <a:spcPts val="0"/>
+              </a:spcAft>
+              <a:buSzPts val="2000"/>
               <a:buChar char="○"/>
             </a:pPr>
             <a:r>
-              <a:rPr lang="en" sz="1800"/>
-              <a:t>i.e. Requires more memory than on your personal computer.</a:t>
+              <a:rPr lang="en" sz="2000"/>
+              <a:t>Introduction to R and R Markdown</a:t>
             </a:r>
-            <a:endParaRPr sz="1800"/>
+            <a:endParaRPr sz="2000"/>
+          </a:p>
+          <a:p>
+            <a:pPr indent="-355600" lvl="1" marL="914400" rtl="0" algn="l">
+              <a:lnSpc>
+                <a:spcPct val="115000"/>
+              </a:lnSpc>
+              <a:spcBef>
+                <a:spcPts val="0"/>
+              </a:spcBef>
+              <a:spcAft>
+                <a:spcPts val="0"/>
+              </a:spcAft>
+              <a:buSzPts val="2000"/>
+              <a:buChar char="○"/>
+            </a:pPr>
+            <a:r>
+              <a:rPr lang="en" sz="2000"/>
+              <a:t>Introduction to the iris dataset</a:t>
+            </a:r>
+            <a:endParaRPr sz="2000"/>
+          </a:p>
+          <a:p>
+            <a:pPr indent="-355600" lvl="1" marL="914400" rtl="0" algn="l">
+              <a:lnSpc>
+                <a:spcPct val="115000"/>
+              </a:lnSpc>
+              <a:spcBef>
+                <a:spcPts val="0"/>
+              </a:spcBef>
+              <a:spcAft>
+                <a:spcPts val="0"/>
+              </a:spcAft>
+              <a:buSzPts val="2000"/>
+              <a:buChar char="○"/>
+            </a:pPr>
+            <a:r>
+              <a:rPr lang="en" sz="2000"/>
+              <a:t>Installing and loading libraries</a:t>
+            </a:r>
+            <a:endParaRPr sz="2000"/>
+          </a:p>
+          <a:p>
+            <a:pPr indent="-355600" lvl="2" marL="1371600" rtl="0" algn="l">
+              <a:lnSpc>
+                <a:spcPct val="115000"/>
+              </a:lnSpc>
+              <a:spcBef>
+                <a:spcPts val="0"/>
+              </a:spcBef>
+              <a:spcAft>
+                <a:spcPts val="0"/>
+              </a:spcAft>
+              <a:buSzPts val="2000"/>
+              <a:buChar char="■"/>
+            </a:pPr>
+            <a:r>
+              <a:rPr lang="en" sz="2000"/>
+              <a:t>tidyverse</a:t>
+            </a:r>
+            <a:endParaRPr sz="2000"/>
+          </a:p>
+          <a:p>
+            <a:pPr indent="-355600" lvl="1" marL="914400" rtl="0" algn="l">
+              <a:lnSpc>
+                <a:spcPct val="115000"/>
+              </a:lnSpc>
+              <a:spcBef>
+                <a:spcPts val="0"/>
+              </a:spcBef>
+              <a:spcAft>
+                <a:spcPts val="0"/>
+              </a:spcAft>
+              <a:buSzPts val="2000"/>
+              <a:buChar char="○"/>
+            </a:pPr>
+            <a:r>
+              <a:rPr lang="en" sz="2000"/>
+              <a:t>Generating summary statistic in R</a:t>
+            </a:r>
+            <a:endParaRPr sz="2000"/>
+          </a:p>
+          <a:p>
+            <a:pPr indent="-355600" lvl="1" marL="914400" rtl="0" algn="l">
+              <a:lnSpc>
+                <a:spcPct val="115000"/>
+              </a:lnSpc>
+              <a:spcBef>
+                <a:spcPts val="0"/>
+              </a:spcBef>
+              <a:spcAft>
+                <a:spcPts val="0"/>
+              </a:spcAft>
+              <a:buSzPts val="2000"/>
+              <a:buChar char="○"/>
+            </a:pPr>
+            <a:r>
+              <a:rPr lang="en" sz="2000"/>
+              <a:t>Making plots with ggplot2</a:t>
+            </a:r>
+            <a:endParaRPr sz="2000"/>
+          </a:p>
+          <a:p>
+            <a:pPr indent="-355600" lvl="1" marL="914400" rtl="0" algn="l">
+              <a:lnSpc>
+                <a:spcPct val="115000"/>
+              </a:lnSpc>
+              <a:spcBef>
+                <a:spcPts val="0"/>
+              </a:spcBef>
+              <a:spcAft>
+                <a:spcPts val="0"/>
+              </a:spcAft>
+              <a:buSzPts val="2000"/>
+              <a:buChar char="○"/>
+            </a:pPr>
+            <a:r>
+              <a:rPr lang="en" sz="2000"/>
+              <a:t>Manipulating data.frames</a:t>
+            </a:r>
+            <a:endParaRPr sz="2000"/>
+          </a:p>
+        </p:txBody>
+      </p:sp>
+      <p:pic>
+        <p:nvPicPr>
+          <p:cNvPr id="149" name="Google Shape;149;g255c330574c_0_0"/>
+          <p:cNvPicPr preferRelativeResize="0"/>
+          <p:nvPr/>
+        </p:nvPicPr>
+        <p:blipFill rotWithShape="1">
+          <a:blip r:embed="rId3">
+            <a:alphaModFix/>
+          </a:blip>
+          <a:srcRect b="0" l="0" r="0" t="0"/>
+          <a:stretch/>
+        </p:blipFill>
+        <p:spPr>
+          <a:xfrm>
+            <a:off x="5635125" y="2808825"/>
+            <a:ext cx="3154800" cy="1760059"/>
+          </a:xfrm>
+          <a:prstGeom prst="rect">
+            <a:avLst/>
+          </a:prstGeom>
+          <a:noFill/>
+          <a:ln cap="flat" cmpd="sng" w="9525">
+            <a:solidFill>
+              <a:srgbClr val="000000"/>
+            </a:solidFill>
+            <a:prstDash val="solid"/>
+            <a:round/>
+            <a:headEnd len="sm" w="sm" type="none"/>
+            <a:tailEnd len="sm" w="sm" type="none"/>
+          </a:ln>
+          <a:effectLst>
+            <a:outerShdw blurRad="57150" rotWithShape="0" algn="bl" dir="5400000" dist="19050">
+              <a:srgbClr val="000000">
+                <a:alpha val="49019"/>
+              </a:srgbClr>
+            </a:outerShdw>
+          </a:effectLst>
+        </p:spPr>
+      </p:pic>
+      <p:sp>
+        <p:nvSpPr>
+          <p:cNvPr id="150" name="Google Shape;150;g255c330574c_0_0"/>
+          <p:cNvSpPr txBox="1"/>
+          <p:nvPr>
+            <p:ph idx="1" type="body"/>
+          </p:nvPr>
+        </p:nvSpPr>
+        <p:spPr>
+          <a:xfrm>
+            <a:off x="6039063" y="4647600"/>
+            <a:ext cx="2346900" cy="495900"/>
+          </a:xfrm>
+          <a:prstGeom prst="rect">
+            <a:avLst/>
+          </a:prstGeom>
+          <a:noFill/>
+          <a:ln>
+            <a:noFill/>
+          </a:ln>
+        </p:spPr>
+        <p:txBody>
+          <a:bodyPr anchorCtr="0" anchor="t" bIns="91425" lIns="91425" spcFirstLastPara="1" rIns="91425" wrap="square" tIns="91425">
+            <a:normAutofit/>
+          </a:bodyPr>
+          <a:lstStyle/>
+          <a:p>
+            <a:pPr indent="0" lvl="0" marL="0" rtl="0" algn="ctr">
+              <a:lnSpc>
+                <a:spcPct val="115000"/>
+              </a:lnSpc>
+              <a:spcBef>
+                <a:spcPts val="0"/>
+              </a:spcBef>
+              <a:spcAft>
+                <a:spcPts val="1200"/>
+              </a:spcAft>
+              <a:buSzPts val="1800"/>
+              <a:buNone/>
+            </a:pPr>
+            <a:r>
+              <a:rPr lang="en"/>
+              <a:t>R Studio</a:t>
+            </a:r>
+            <a:endParaRPr/>
           </a:p>
         </p:txBody>
       </p:sp>
@@ -10786,7 +11191,148 @@
       </p:grpSpPr>
       <p:sp>
         <p:nvSpPr>
-          <p:cNvPr id="155" name="Google Shape;155;g255c330574c_0_11"/>
+          <p:cNvPr id="155" name="Google Shape;155;g255c330574c_0_61"/>
+          <p:cNvSpPr txBox="1"/>
+          <p:nvPr>
+            <p:ph type="title"/>
+          </p:nvPr>
+        </p:nvSpPr>
+        <p:spPr>
+          <a:xfrm>
+            <a:off x="311700" y="275550"/>
+            <a:ext cx="8520600" cy="572700"/>
+          </a:xfrm>
+          <a:prstGeom prst="rect">
+            <a:avLst/>
+          </a:prstGeom>
+          <a:noFill/>
+          <a:ln>
+            <a:noFill/>
+          </a:ln>
+        </p:spPr>
+        <p:txBody>
+          <a:bodyPr anchorCtr="0" anchor="t" bIns="91425" lIns="91425" spcFirstLastPara="1" rIns="91425" wrap="square" tIns="91425">
+            <a:normAutofit fontScale="90000"/>
+          </a:bodyPr>
+          <a:lstStyle/>
+          <a:p>
+            <a:pPr indent="0" lvl="0" marL="0" rtl="0" algn="ctr">
+              <a:lnSpc>
+                <a:spcPct val="100000"/>
+              </a:lnSpc>
+              <a:spcBef>
+                <a:spcPts val="0"/>
+              </a:spcBef>
+              <a:spcAft>
+                <a:spcPts val="0"/>
+              </a:spcAft>
+              <a:buSzPct val="111111"/>
+              <a:buNone/>
+            </a:pPr>
+            <a:r>
+              <a:rPr lang="en"/>
+              <a:t>Challenge Question</a:t>
+            </a:r>
+            <a:endParaRPr/>
+          </a:p>
+        </p:txBody>
+      </p:sp>
+      <p:sp>
+        <p:nvSpPr>
+          <p:cNvPr id="156" name="Google Shape;156;g255c330574c_0_61"/>
+          <p:cNvSpPr txBox="1"/>
+          <p:nvPr>
+            <p:ph idx="1" type="body"/>
+          </p:nvPr>
+        </p:nvSpPr>
+        <p:spPr>
+          <a:xfrm>
+            <a:off x="311700" y="1152475"/>
+            <a:ext cx="8520600" cy="3416400"/>
+          </a:xfrm>
+          <a:prstGeom prst="rect">
+            <a:avLst/>
+          </a:prstGeom>
+          <a:noFill/>
+          <a:ln>
+            <a:noFill/>
+          </a:ln>
+        </p:spPr>
+        <p:txBody>
+          <a:bodyPr anchorCtr="0" anchor="t" bIns="91425" lIns="91425" spcFirstLastPara="1" rIns="91425" wrap="square" tIns="91425">
+            <a:normAutofit/>
+          </a:bodyPr>
+          <a:lstStyle/>
+          <a:p>
+            <a:pPr indent="-368300" lvl="0" marL="457200" rtl="0" algn="l">
+              <a:lnSpc>
+                <a:spcPct val="115000"/>
+              </a:lnSpc>
+              <a:spcBef>
+                <a:spcPts val="0"/>
+              </a:spcBef>
+              <a:spcAft>
+                <a:spcPts val="0"/>
+              </a:spcAft>
+              <a:buSzPts val="2200"/>
+              <a:buChar char="●"/>
+            </a:pPr>
+            <a:r>
+              <a:rPr lang="en" sz="2200"/>
+              <a:t>How would you perform a computationally intensive R job?</a:t>
+            </a:r>
+            <a:endParaRPr sz="2200"/>
+          </a:p>
+          <a:p>
+            <a:pPr indent="-342900" lvl="1" marL="914400" rtl="0" algn="l">
+              <a:lnSpc>
+                <a:spcPct val="115000"/>
+              </a:lnSpc>
+              <a:spcBef>
+                <a:spcPts val="0"/>
+              </a:spcBef>
+              <a:spcAft>
+                <a:spcPts val="0"/>
+              </a:spcAft>
+              <a:buSzPts val="1800"/>
+              <a:buChar char="○"/>
+            </a:pPr>
+            <a:r>
+              <a:rPr lang="en" sz="1800"/>
+              <a:t>i.e. Requires more memory than on your personal computer.</a:t>
+            </a:r>
+            <a:endParaRPr sz="1800"/>
+          </a:p>
+        </p:txBody>
+      </p:sp>
+    </p:spTree>
+  </p:cSld>
+  <p:clrMapOvr>
+    <a:masterClrMapping/>
+  </p:clrMapOvr>
+</p:sld>
+</file>
+
+<file path=ppt/slides/slide12.xml><?xml version="1.0" encoding="utf-8"?>
+<p:sld xmlns:a="http://schemas.openxmlformats.org/drawingml/2006/main" xmlns:r="http://schemas.openxmlformats.org/officeDocument/2006/relationships" xmlns:mc="http://schemas.openxmlformats.org/markup-compatibility/2006" xmlns:mv="urn:schemas-microsoft-com:mac:vml" xmlns:p="http://schemas.openxmlformats.org/presentationml/2006/main" xmlns:c="http://schemas.openxmlformats.org/drawingml/2006/chart" xmlns:dgm="http://schemas.openxmlformats.org/drawingml/2006/diagram" xmlns:o="urn:schemas-microsoft-com:office:office" xmlns:v="urn:schemas-microsoft-com:vml" xmlns:pvml="urn:schemas-microsoft-com:office:powerpoint" xmlns:com="http://schemas.openxmlformats.org/drawingml/2006/compatibility" xmlns:p14="http://schemas.microsoft.com/office/powerpoint/2010/main" xmlns:p15="http://schemas.microsoft.com/office/powerpoint/2012/main" xmlns:ahyp="http://schemas.microsoft.com/office/drawing/2018/hyperlinkcolor">
+  <p:cSld>
+    <p:spTree>
+      <p:nvGrpSpPr>
+        <p:cNvPr id="160" name="Shape 160"/>
+        <p:cNvGrpSpPr/>
+        <p:nvPr/>
+      </p:nvGrpSpPr>
+      <p:grpSpPr>
+        <a:xfrm>
+          <a:off x="0" y="0"/>
+          <a:ext cx="0" cy="0"/>
+          <a:chOff x="0" y="0"/>
+          <a:chExt cx="0" cy="0"/>
+        </a:xfrm>
+      </p:grpSpPr>
+      <p:sp>
+        <p:nvSpPr>
+          <p:cNvPr id="161" name="Google Shape;161;g255c330574c_0_11"/>
           <p:cNvSpPr txBox="1"/>
           <p:nvPr>
             <p:ph type="title"/>
@@ -10834,7 +11380,7 @@
       </p:sp>
       <p:sp>
         <p:nvSpPr>
-          <p:cNvPr id="156" name="Google Shape;156;g255c330574c_0_11"/>
+          <p:cNvPr id="162" name="Google Shape;162;g255c330574c_0_11"/>
           <p:cNvSpPr txBox="1"/>
           <p:nvPr>
             <p:ph idx="1" type="body"/>
@@ -11054,7 +11600,7 @@
       </p:sp>
       <p:pic>
         <p:nvPicPr>
-          <p:cNvPr id="157" name="Google Shape;157;g255c330574c_0_11"/>
+          <p:cNvPr id="163" name="Google Shape;163;g255c330574c_0_11"/>
           <p:cNvPicPr preferRelativeResize="0"/>
           <p:nvPr/>
         </p:nvPicPr>
@@ -11087,12 +11633,12 @@
 </p:sld>
 </file>
 
-<file path=ppt/slides/slide12.xml><?xml version="1.0" encoding="utf-8"?>
+<file path=ppt/slides/slide13.xml><?xml version="1.0" encoding="utf-8"?>
 <p:sld xmlns:a="http://schemas.openxmlformats.org/drawingml/2006/main" xmlns:r="http://schemas.openxmlformats.org/officeDocument/2006/relationships" xmlns:mc="http://schemas.openxmlformats.org/markup-compatibility/2006" xmlns:mv="urn:schemas-microsoft-com:mac:vml" xmlns:p="http://schemas.openxmlformats.org/presentationml/2006/main" xmlns:c="http://schemas.openxmlformats.org/drawingml/2006/chart" xmlns:dgm="http://schemas.openxmlformats.org/drawingml/2006/diagram" xmlns:o="urn:schemas-microsoft-com:office:office" xmlns:v="urn:schemas-microsoft-com:vml" xmlns:pvml="urn:schemas-microsoft-com:office:powerpoint" xmlns:com="http://schemas.openxmlformats.org/drawingml/2006/compatibility" xmlns:p14="http://schemas.microsoft.com/office/powerpoint/2010/main" xmlns:p15="http://schemas.microsoft.com/office/powerpoint/2012/main" xmlns:ahyp="http://schemas.microsoft.com/office/drawing/2018/hyperlinkcolor">
   <p:cSld>
     <p:spTree>
       <p:nvGrpSpPr>
-        <p:cNvPr id="161" name="Shape 161"/>
+        <p:cNvPr id="167" name="Shape 167"/>
         <p:cNvGrpSpPr/>
         <p:nvPr/>
       </p:nvGrpSpPr>
@@ -11106,7 +11652,7 @@
       </p:grpSpPr>
       <p:sp>
         <p:nvSpPr>
-          <p:cNvPr id="162" name="Google Shape;162;p10"/>
+          <p:cNvPr id="168" name="Google Shape;168;p10"/>
           <p:cNvSpPr txBox="1"/>
           <p:nvPr/>
         </p:nvSpPr>
@@ -11380,7 +11926,7 @@
       </p:sp>
       <p:pic>
         <p:nvPicPr>
-          <p:cNvPr id="163" name="Google Shape;163;p10"/>
+          <p:cNvPr id="169" name="Google Shape;169;p10"/>
           <p:cNvPicPr preferRelativeResize="0"/>
           <p:nvPr/>
         </p:nvPicPr>
@@ -11407,7 +11953,7 @@
       </p:pic>
       <p:pic>
         <p:nvPicPr>
-          <p:cNvPr id="164" name="Google Shape;164;p10"/>
+          <p:cNvPr id="170" name="Google Shape;170;p10"/>
           <p:cNvPicPr preferRelativeResize="0"/>
           <p:nvPr/>
         </p:nvPicPr>
@@ -11434,7 +11980,7 @@
       </p:pic>
       <p:pic>
         <p:nvPicPr>
-          <p:cNvPr id="165" name="Google Shape;165;p10"/>
+          <p:cNvPr id="171" name="Google Shape;171;p10"/>
           <p:cNvPicPr preferRelativeResize="0"/>
           <p:nvPr/>
         </p:nvPicPr>
@@ -11461,7 +12007,7 @@
       </p:pic>
       <p:pic>
         <p:nvPicPr>
-          <p:cNvPr id="166" name="Google Shape;166;p10"/>
+          <p:cNvPr id="172" name="Google Shape;172;p10"/>
           <p:cNvPicPr preferRelativeResize="0"/>
           <p:nvPr/>
         </p:nvPicPr>
@@ -11488,7 +12034,7 @@
       </p:pic>
       <p:sp>
         <p:nvSpPr>
-          <p:cNvPr id="167" name="Google Shape;167;p10"/>
+          <p:cNvPr id="173" name="Google Shape;173;p10"/>
           <p:cNvSpPr txBox="1"/>
           <p:nvPr>
             <p:ph type="title"/>
@@ -11542,12 +12088,12 @@
 </p:sld>
 </file>
 
-<file path=ppt/slides/slide13.xml><?xml version="1.0" encoding="utf-8"?>
+<file path=ppt/slides/slide14.xml><?xml version="1.0" encoding="utf-8"?>
 <p:sld xmlns:a="http://schemas.openxmlformats.org/drawingml/2006/main" xmlns:r="http://schemas.openxmlformats.org/officeDocument/2006/relationships" xmlns:mc="http://schemas.openxmlformats.org/markup-compatibility/2006" xmlns:mv="urn:schemas-microsoft-com:mac:vml" xmlns:p="http://schemas.openxmlformats.org/presentationml/2006/main" xmlns:c="http://schemas.openxmlformats.org/drawingml/2006/chart" xmlns:dgm="http://schemas.openxmlformats.org/drawingml/2006/diagram" xmlns:o="urn:schemas-microsoft-com:office:office" xmlns:v="urn:schemas-microsoft-com:vml" xmlns:pvml="urn:schemas-microsoft-com:office:powerpoint" xmlns:com="http://schemas.openxmlformats.org/drawingml/2006/compatibility" xmlns:p14="http://schemas.microsoft.com/office/powerpoint/2010/main" xmlns:p15="http://schemas.microsoft.com/office/powerpoint/2012/main" xmlns:ahyp="http://schemas.microsoft.com/office/drawing/2018/hyperlinkcolor">
   <p:cSld>
     <p:spTree>
       <p:nvGrpSpPr>
-        <p:cNvPr id="171" name="Shape 171"/>
+        <p:cNvPr id="177" name="Shape 177"/>
         <p:cNvGrpSpPr/>
         <p:nvPr/>
       </p:nvGrpSpPr>
@@ -11561,7 +12107,7 @@
       </p:grpSpPr>
       <p:sp>
         <p:nvSpPr>
-          <p:cNvPr id="172" name="Google Shape;172;p12"/>
+          <p:cNvPr id="178" name="Google Shape;178;p12"/>
           <p:cNvSpPr txBox="1"/>
           <p:nvPr>
             <p:ph type="title"/>
@@ -11609,7 +12155,7 @@
       </p:sp>
       <p:sp>
         <p:nvSpPr>
-          <p:cNvPr id="173" name="Google Shape;173;p12"/>
+          <p:cNvPr id="179" name="Google Shape;179;p12"/>
           <p:cNvSpPr txBox="1"/>
           <p:nvPr>
             <p:ph idx="1" type="body"/>
@@ -11971,7 +12517,248 @@
       </p:grpSpPr>
       <p:sp>
         <p:nvSpPr>
-          <p:cNvPr id="63" name="Google Shape;63;g255c330574c_0_66"/>
+          <p:cNvPr id="63" name="Google Shape;63;g36bad18276d_0_1"/>
+          <p:cNvSpPr txBox="1"/>
+          <p:nvPr>
+            <p:ph type="title"/>
+          </p:nvPr>
+        </p:nvSpPr>
+        <p:spPr>
+          <a:xfrm>
+            <a:off x="311700" y="445025"/>
+            <a:ext cx="8520600" cy="572700"/>
+          </a:xfrm>
+          <a:prstGeom prst="rect">
+            <a:avLst/>
+          </a:prstGeom>
+        </p:spPr>
+        <p:txBody>
+          <a:bodyPr anchorCtr="0" anchor="t" bIns="91425" lIns="91425" spcFirstLastPara="1" rIns="91425" wrap="square" tIns="91425">
+            <a:normAutofit fontScale="90000"/>
+          </a:bodyPr>
+          <a:lstStyle/>
+          <a:p>
+            <a:pPr indent="0" lvl="0" marL="0" rtl="0" algn="l">
+              <a:spcBef>
+                <a:spcPts val="0"/>
+              </a:spcBef>
+              <a:spcAft>
+                <a:spcPts val="0"/>
+              </a:spcAft>
+              <a:buNone/>
+            </a:pPr>
+            <a:r>
+              <a:rPr lang="en"/>
+              <a:t>Recap of Day 6 Video</a:t>
+            </a:r>
+            <a:endParaRPr/>
+          </a:p>
+        </p:txBody>
+      </p:sp>
+      <p:sp>
+        <p:nvSpPr>
+          <p:cNvPr id="64" name="Google Shape;64;g36bad18276d_0_1"/>
+          <p:cNvSpPr txBox="1"/>
+          <p:nvPr>
+            <p:ph idx="1" type="body"/>
+          </p:nvPr>
+        </p:nvSpPr>
+        <p:spPr>
+          <a:xfrm>
+            <a:off x="559250" y="1177700"/>
+            <a:ext cx="6512700" cy="3416400"/>
+          </a:xfrm>
+          <a:prstGeom prst="rect">
+            <a:avLst/>
+          </a:prstGeom>
+        </p:spPr>
+        <p:txBody>
+          <a:bodyPr anchorCtr="0" anchor="t" bIns="91425" lIns="91425" spcFirstLastPara="1" rIns="91425" wrap="square" tIns="91425">
+            <a:normAutofit/>
+          </a:bodyPr>
+          <a:lstStyle/>
+          <a:p>
+            <a:pPr indent="0" lvl="0" marL="0" rtl="0" algn="l">
+              <a:spcBef>
+                <a:spcPts val="0"/>
+              </a:spcBef>
+              <a:spcAft>
+                <a:spcPts val="0"/>
+              </a:spcAft>
+              <a:buNone/>
+            </a:pPr>
+            <a:r>
+              <a:rPr lang="en"/>
+              <a:t>Introduction to R and RStudio</a:t>
+            </a:r>
+            <a:endParaRPr/>
+          </a:p>
+          <a:p>
+            <a:pPr indent="-342900" lvl="0" marL="457200" rtl="0" algn="l">
+              <a:spcBef>
+                <a:spcPts val="0"/>
+              </a:spcBef>
+              <a:spcAft>
+                <a:spcPts val="0"/>
+              </a:spcAft>
+              <a:buSzPts val="1800"/>
+              <a:buChar char="●"/>
+            </a:pPr>
+            <a:r>
+              <a:rPr lang="en"/>
+              <a:t>Overview of R</a:t>
+            </a:r>
+            <a:endParaRPr/>
+          </a:p>
+          <a:p>
+            <a:pPr indent="-342900" lvl="0" marL="457200" rtl="0" algn="l">
+              <a:spcBef>
+                <a:spcPts val="0"/>
+              </a:spcBef>
+              <a:spcAft>
+                <a:spcPts val="0"/>
+              </a:spcAft>
+              <a:buSzPts val="1800"/>
+              <a:buChar char="●"/>
+            </a:pPr>
+            <a:r>
+              <a:rPr lang="en"/>
+              <a:t>Loading data into R</a:t>
+            </a:r>
+            <a:endParaRPr/>
+          </a:p>
+          <a:p>
+            <a:pPr indent="-342900" lvl="0" marL="457200" rtl="0" algn="l">
+              <a:spcBef>
+                <a:spcPts val="0"/>
+              </a:spcBef>
+              <a:spcAft>
+                <a:spcPts val="0"/>
+              </a:spcAft>
+              <a:buSzPts val="1800"/>
+              <a:buChar char="●"/>
+            </a:pPr>
+            <a:r>
+              <a:rPr lang="en"/>
+              <a:t>Filtering data frames in R</a:t>
+            </a:r>
+            <a:endParaRPr/>
+          </a:p>
+          <a:p>
+            <a:pPr indent="-317500" lvl="1" marL="914400" rtl="0" algn="l">
+              <a:spcBef>
+                <a:spcPts val="0"/>
+              </a:spcBef>
+              <a:spcAft>
+                <a:spcPts val="0"/>
+              </a:spcAft>
+              <a:buSzPts val="1400"/>
+              <a:buChar char="○"/>
+            </a:pPr>
+            <a:r>
+              <a:rPr lang="en"/>
+              <a:t>Based on a column value and IDs</a:t>
+            </a:r>
+            <a:endParaRPr/>
+          </a:p>
+          <a:p>
+            <a:pPr indent="-342900" lvl="0" marL="457200" rtl="0" algn="l">
+              <a:spcBef>
+                <a:spcPts val="0"/>
+              </a:spcBef>
+              <a:spcAft>
+                <a:spcPts val="0"/>
+              </a:spcAft>
+              <a:buSzPts val="1800"/>
+              <a:buChar char="●"/>
+            </a:pPr>
+            <a:r>
+              <a:rPr lang="en"/>
+              <a:t>Brief installation instructions</a:t>
+            </a:r>
+            <a:endParaRPr/>
+          </a:p>
+          <a:p>
+            <a:pPr indent="-342900" lvl="0" marL="457200" rtl="0" algn="l">
+              <a:spcBef>
+                <a:spcPts val="0"/>
+              </a:spcBef>
+              <a:spcAft>
+                <a:spcPts val="0"/>
+              </a:spcAft>
+              <a:buSzPts val="1800"/>
+              <a:buChar char="●"/>
+            </a:pPr>
+            <a:r>
+              <a:rPr lang="en"/>
+              <a:t>Data visualization and plotting with ggplot2 (in R)</a:t>
+            </a:r>
+            <a:endParaRPr/>
+          </a:p>
+          <a:p>
+            <a:pPr indent="-317500" lvl="1" marL="914400" rtl="0" algn="l">
+              <a:spcBef>
+                <a:spcPts val="0"/>
+              </a:spcBef>
+              <a:spcAft>
+                <a:spcPts val="0"/>
+              </a:spcAft>
+              <a:buSzPts val="1400"/>
+              <a:buChar char="○"/>
+            </a:pPr>
+            <a:r>
+              <a:rPr lang="en"/>
+              <a:t>Syntax introduction</a:t>
+            </a:r>
+            <a:endParaRPr/>
+          </a:p>
+          <a:p>
+            <a:pPr indent="-317500" lvl="1" marL="914400" rtl="0" algn="l">
+              <a:spcBef>
+                <a:spcPts val="0"/>
+              </a:spcBef>
+              <a:spcAft>
+                <a:spcPts val="0"/>
+              </a:spcAft>
+              <a:buSzPts val="1400"/>
+              <a:buChar char="○"/>
+            </a:pPr>
+            <a:r>
+              <a:rPr lang="en"/>
+              <a:t>Example scatter plot for differential expression data (MA plot)</a:t>
+            </a:r>
+            <a:endParaRPr/>
+          </a:p>
+        </p:txBody>
+      </p:sp>
+    </p:spTree>
+  </p:cSld>
+  <p:clrMapOvr>
+    <a:masterClrMapping/>
+  </p:clrMapOvr>
+</p:sld>
+</file>
+
+<file path=ppt/slides/slide3.xml><?xml version="1.0" encoding="utf-8"?>
+<p:sld xmlns:a="http://schemas.openxmlformats.org/drawingml/2006/main" xmlns:r="http://schemas.openxmlformats.org/officeDocument/2006/relationships" xmlns:mc="http://schemas.openxmlformats.org/markup-compatibility/2006" xmlns:mv="urn:schemas-microsoft-com:mac:vml" xmlns:p="http://schemas.openxmlformats.org/presentationml/2006/main" xmlns:c="http://schemas.openxmlformats.org/drawingml/2006/chart" xmlns:dgm="http://schemas.openxmlformats.org/drawingml/2006/diagram" xmlns:o="urn:schemas-microsoft-com:office:office" xmlns:v="urn:schemas-microsoft-com:vml" xmlns:pvml="urn:schemas-microsoft-com:office:powerpoint" xmlns:com="http://schemas.openxmlformats.org/drawingml/2006/compatibility" xmlns:p14="http://schemas.microsoft.com/office/powerpoint/2010/main" xmlns:p15="http://schemas.microsoft.com/office/powerpoint/2012/main" xmlns:ahyp="http://schemas.microsoft.com/office/drawing/2018/hyperlinkcolor">
+  <p:cSld>
+    <p:spTree>
+      <p:nvGrpSpPr>
+        <p:cNvPr id="68" name="Shape 68"/>
+        <p:cNvGrpSpPr/>
+        <p:nvPr/>
+      </p:nvGrpSpPr>
+      <p:grpSpPr>
+        <a:xfrm>
+          <a:off x="0" y="0"/>
+          <a:ext cx="0" cy="0"/>
+          <a:chOff x="0" y="0"/>
+          <a:chExt cx="0" cy="0"/>
+        </a:xfrm>
+      </p:grpSpPr>
+      <p:sp>
+        <p:nvSpPr>
+          <p:cNvPr id="69" name="Google Shape;69;g255c330574c_0_66"/>
           <p:cNvSpPr txBox="1"/>
           <p:nvPr>
             <p:ph type="title"/>
@@ -12019,7 +12806,7 @@
       </p:sp>
       <p:sp>
         <p:nvSpPr>
-          <p:cNvPr id="64" name="Google Shape;64;g255c330574c_0_66"/>
+          <p:cNvPr id="70" name="Google Shape;70;g255c330574c_0_66"/>
           <p:cNvSpPr txBox="1"/>
           <p:nvPr>
             <p:ph idx="1" type="body"/>
@@ -12179,7 +12966,7 @@
       </p:sp>
       <p:pic>
         <p:nvPicPr>
-          <p:cNvPr id="65" name="Google Shape;65;g255c330574c_0_66"/>
+          <p:cNvPr id="71" name="Google Shape;71;g255c330574c_0_66"/>
           <p:cNvPicPr preferRelativeResize="0"/>
           <p:nvPr/>
         </p:nvPicPr>
@@ -12206,7 +12993,7 @@
       </p:pic>
       <p:pic>
         <p:nvPicPr>
-          <p:cNvPr id="66" name="Google Shape;66;g255c330574c_0_66"/>
+          <p:cNvPr id="72" name="Google Shape;72;g255c330574c_0_66"/>
           <p:cNvPicPr preferRelativeResize="0"/>
           <p:nvPr/>
         </p:nvPicPr>
@@ -12239,12 +13026,12 @@
 </p:sld>
 </file>
 
-<file path=ppt/slides/slide3.xml><?xml version="1.0" encoding="utf-8"?>
+<file path=ppt/slides/slide4.xml><?xml version="1.0" encoding="utf-8"?>
 <p:sld xmlns:a="http://schemas.openxmlformats.org/drawingml/2006/main" xmlns:r="http://schemas.openxmlformats.org/officeDocument/2006/relationships" xmlns:mc="http://schemas.openxmlformats.org/markup-compatibility/2006" xmlns:mv="urn:schemas-microsoft-com:mac:vml" xmlns:p="http://schemas.openxmlformats.org/presentationml/2006/main" xmlns:c="http://schemas.openxmlformats.org/drawingml/2006/chart" xmlns:dgm="http://schemas.openxmlformats.org/drawingml/2006/diagram" xmlns:o="urn:schemas-microsoft-com:office:office" xmlns:v="urn:schemas-microsoft-com:vml" xmlns:pvml="urn:schemas-microsoft-com:office:powerpoint" xmlns:com="http://schemas.openxmlformats.org/drawingml/2006/compatibility" xmlns:p14="http://schemas.microsoft.com/office/powerpoint/2010/main" xmlns:p15="http://schemas.microsoft.com/office/powerpoint/2012/main" xmlns:ahyp="http://schemas.microsoft.com/office/drawing/2018/hyperlinkcolor">
   <p:cSld>
     <p:spTree>
       <p:nvGrpSpPr>
-        <p:cNvPr id="70" name="Shape 70"/>
+        <p:cNvPr id="76" name="Shape 76"/>
         <p:cNvGrpSpPr/>
         <p:nvPr/>
       </p:nvGrpSpPr>
@@ -12258,7 +13045,7 @@
       </p:grpSpPr>
       <p:sp>
         <p:nvSpPr>
-          <p:cNvPr id="71" name="Google Shape;71;p3"/>
+          <p:cNvPr id="77" name="Google Shape;77;p3"/>
           <p:cNvSpPr txBox="1"/>
           <p:nvPr>
             <p:ph type="title"/>
@@ -12306,7 +13093,7 @@
       </p:sp>
       <p:sp>
         <p:nvSpPr>
-          <p:cNvPr id="72" name="Google Shape;72;p3"/>
+          <p:cNvPr id="78" name="Google Shape;78;p3"/>
           <p:cNvSpPr txBox="1"/>
           <p:nvPr>
             <p:ph idx="1" type="body"/>
@@ -12374,7 +13161,7 @@
       </p:sp>
       <p:pic>
         <p:nvPicPr>
-          <p:cNvPr id="73" name="Google Shape;73;p3"/>
+          <p:cNvPr id="79" name="Google Shape;79;p3"/>
           <p:cNvPicPr preferRelativeResize="0"/>
           <p:nvPr/>
         </p:nvPicPr>
@@ -12401,7 +13188,7 @@
       </p:pic>
       <p:pic>
         <p:nvPicPr>
-          <p:cNvPr id="74" name="Google Shape;74;p3"/>
+          <p:cNvPr id="80" name="Google Shape;80;p3"/>
           <p:cNvPicPr preferRelativeResize="0"/>
           <p:nvPr/>
         </p:nvPicPr>
@@ -12434,12 +13221,12 @@
 </p:sld>
 </file>
 
-<file path=ppt/slides/slide4.xml><?xml version="1.0" encoding="utf-8"?>
+<file path=ppt/slides/slide5.xml><?xml version="1.0" encoding="utf-8"?>
 <p:sld xmlns:a="http://schemas.openxmlformats.org/drawingml/2006/main" xmlns:r="http://schemas.openxmlformats.org/officeDocument/2006/relationships" xmlns:mc="http://schemas.openxmlformats.org/markup-compatibility/2006" xmlns:mv="urn:schemas-microsoft-com:mac:vml" xmlns:p="http://schemas.openxmlformats.org/presentationml/2006/main" xmlns:c="http://schemas.openxmlformats.org/drawingml/2006/chart" xmlns:dgm="http://schemas.openxmlformats.org/drawingml/2006/diagram" xmlns:o="urn:schemas-microsoft-com:office:office" xmlns:v="urn:schemas-microsoft-com:vml" xmlns:pvml="urn:schemas-microsoft-com:office:powerpoint" xmlns:com="http://schemas.openxmlformats.org/drawingml/2006/compatibility" xmlns:p14="http://schemas.microsoft.com/office/powerpoint/2010/main" xmlns:p15="http://schemas.microsoft.com/office/powerpoint/2012/main" xmlns:ahyp="http://schemas.microsoft.com/office/drawing/2018/hyperlinkcolor">
   <p:cSld>
     <p:spTree>
       <p:nvGrpSpPr>
-        <p:cNvPr id="78" name="Shape 78"/>
+        <p:cNvPr id="84" name="Shape 84"/>
         <p:cNvGrpSpPr/>
         <p:nvPr/>
       </p:nvGrpSpPr>
@@ -12453,7 +13240,7 @@
       </p:grpSpPr>
       <p:sp>
         <p:nvSpPr>
-          <p:cNvPr id="79" name="Google Shape;79;p4"/>
+          <p:cNvPr id="85" name="Google Shape;85;p4"/>
           <p:cNvSpPr txBox="1"/>
           <p:nvPr>
             <p:ph type="title"/>
@@ -12501,7 +13288,7 @@
       </p:sp>
       <p:sp>
         <p:nvSpPr>
-          <p:cNvPr id="80" name="Google Shape;80;p4"/>
+          <p:cNvPr id="86" name="Google Shape;86;p4"/>
           <p:cNvSpPr txBox="1"/>
           <p:nvPr>
             <p:ph idx="1" type="body"/>
@@ -12638,7 +13425,7 @@
       </p:sp>
       <p:pic>
         <p:nvPicPr>
-          <p:cNvPr id="81" name="Google Shape;81;p4"/>
+          <p:cNvPr id="87" name="Google Shape;87;p4"/>
           <p:cNvPicPr preferRelativeResize="0"/>
           <p:nvPr/>
         </p:nvPicPr>
@@ -12665,7 +13452,7 @@
       </p:pic>
       <p:pic>
         <p:nvPicPr>
-          <p:cNvPr id="82" name="Google Shape;82;p4"/>
+          <p:cNvPr id="88" name="Google Shape;88;p4"/>
           <p:cNvPicPr preferRelativeResize="0"/>
           <p:nvPr/>
         </p:nvPicPr>
@@ -12692,7 +13479,7 @@
       </p:pic>
       <p:pic>
         <p:nvPicPr>
-          <p:cNvPr id="83" name="Google Shape;83;p4"/>
+          <p:cNvPr id="89" name="Google Shape;89;p4"/>
           <p:cNvPicPr preferRelativeResize="0"/>
           <p:nvPr/>
         </p:nvPicPr>
@@ -12725,12 +13512,12 @@
 </p:sld>
 </file>
 
-<file path=ppt/slides/slide5.xml><?xml version="1.0" encoding="utf-8"?>
+<file path=ppt/slides/slide6.xml><?xml version="1.0" encoding="utf-8"?>
 <p:sld xmlns:a="http://schemas.openxmlformats.org/drawingml/2006/main" xmlns:r="http://schemas.openxmlformats.org/officeDocument/2006/relationships" xmlns:mc="http://schemas.openxmlformats.org/markup-compatibility/2006" xmlns:mv="urn:schemas-microsoft-com:mac:vml" xmlns:p="http://schemas.openxmlformats.org/presentationml/2006/main" xmlns:c="http://schemas.openxmlformats.org/drawingml/2006/chart" xmlns:dgm="http://schemas.openxmlformats.org/drawingml/2006/diagram" xmlns:o="urn:schemas-microsoft-com:office:office" xmlns:v="urn:schemas-microsoft-com:vml" xmlns:pvml="urn:schemas-microsoft-com:office:powerpoint" xmlns:com="http://schemas.openxmlformats.org/drawingml/2006/compatibility" xmlns:p14="http://schemas.microsoft.com/office/powerpoint/2010/main" xmlns:p15="http://schemas.microsoft.com/office/powerpoint/2012/main" xmlns:ahyp="http://schemas.microsoft.com/office/drawing/2018/hyperlinkcolor">
   <p:cSld>
     <p:spTree>
       <p:nvGrpSpPr>
-        <p:cNvPr id="87" name="Shape 87"/>
+        <p:cNvPr id="93" name="Shape 93"/>
         <p:cNvGrpSpPr/>
         <p:nvPr/>
       </p:nvGrpSpPr>
@@ -12744,7 +13531,7 @@
       </p:grpSpPr>
       <p:sp>
         <p:nvSpPr>
-          <p:cNvPr id="88" name="Google Shape;88;g255c3305560_0_0"/>
+          <p:cNvPr id="94" name="Google Shape;94;g255c3305560_0_0"/>
           <p:cNvSpPr txBox="1"/>
           <p:nvPr>
             <p:ph type="title"/>
@@ -12792,7 +13579,7 @@
       </p:sp>
       <p:sp>
         <p:nvSpPr>
-          <p:cNvPr id="89" name="Google Shape;89;g255c3305560_0_0"/>
+          <p:cNvPr id="95" name="Google Shape;95;g255c3305560_0_0"/>
           <p:cNvSpPr txBox="1"/>
           <p:nvPr>
             <p:ph idx="1" type="body"/>
@@ -12840,7 +13627,7 @@
       </p:sp>
       <p:sp>
         <p:nvSpPr>
-          <p:cNvPr id="90" name="Google Shape;90;g255c3305560_0_0"/>
+          <p:cNvPr id="96" name="Google Shape;96;g255c3305560_0_0"/>
           <p:cNvSpPr txBox="1"/>
           <p:nvPr>
             <p:ph idx="1" type="body"/>
@@ -12888,7 +13675,7 @@
       </p:sp>
       <p:pic>
         <p:nvPicPr>
-          <p:cNvPr id="91" name="Google Shape;91;g255c3305560_0_0"/>
+          <p:cNvPr id="97" name="Google Shape;97;g255c3305560_0_0"/>
           <p:cNvPicPr preferRelativeResize="0"/>
           <p:nvPr/>
         </p:nvPicPr>
@@ -12915,7 +13702,7 @@
       </p:pic>
       <p:pic>
         <p:nvPicPr>
-          <p:cNvPr id="92" name="Google Shape;92;g255c3305560_0_0"/>
+          <p:cNvPr id="98" name="Google Shape;98;g255c3305560_0_0"/>
           <p:cNvPicPr preferRelativeResize="0"/>
           <p:nvPr/>
         </p:nvPicPr>
@@ -12942,7 +13729,7 @@
       </p:pic>
       <p:cxnSp>
         <p:nvCxnSpPr>
-          <p:cNvPr id="93" name="Google Shape;93;g255c3305560_0_0"/>
+          <p:cNvPr id="99" name="Google Shape;99;g255c3305560_0_0"/>
           <p:cNvCxnSpPr/>
           <p:nvPr/>
         </p:nvCxnSpPr>
@@ -12968,7 +13755,7 @@
       </p:cxnSp>
       <p:sp>
         <p:nvSpPr>
-          <p:cNvPr id="94" name="Google Shape;94;g255c3305560_0_0"/>
+          <p:cNvPr id="100" name="Google Shape;100;g255c3305560_0_0"/>
           <p:cNvSpPr txBox="1"/>
           <p:nvPr/>
         </p:nvSpPr>
@@ -13058,7 +13845,7 @@
       </p:sp>
       <p:cxnSp>
         <p:nvCxnSpPr>
-          <p:cNvPr id="95" name="Google Shape;95;g255c3305560_0_0"/>
+          <p:cNvPr id="101" name="Google Shape;101;g255c3305560_0_0"/>
           <p:cNvCxnSpPr/>
           <p:nvPr/>
         </p:nvCxnSpPr>
@@ -13084,7 +13871,7 @@
       </p:cxnSp>
       <p:sp>
         <p:nvSpPr>
-          <p:cNvPr id="96" name="Google Shape;96;g255c3305560_0_0"/>
+          <p:cNvPr id="102" name="Google Shape;102;g255c3305560_0_0"/>
           <p:cNvSpPr txBox="1"/>
           <p:nvPr/>
         </p:nvSpPr>
@@ -13174,7 +13961,7 @@
       </p:sp>
       <p:sp>
         <p:nvSpPr>
-          <p:cNvPr id="97" name="Google Shape;97;g255c3305560_0_0"/>
+          <p:cNvPr id="103" name="Google Shape;103;g255c3305560_0_0"/>
           <p:cNvSpPr txBox="1"/>
           <p:nvPr/>
         </p:nvSpPr>
@@ -13240,7 +14027,7 @@
       </p:sp>
       <p:sp>
         <p:nvSpPr>
-          <p:cNvPr id="98" name="Google Shape;98;g255c3305560_0_0"/>
+          <p:cNvPr id="104" name="Google Shape;104;g255c3305560_0_0"/>
           <p:cNvSpPr txBox="1"/>
           <p:nvPr/>
         </p:nvSpPr>
@@ -13306,7 +14093,7 @@
       </p:sp>
       <p:pic>
         <p:nvPicPr>
-          <p:cNvPr id="99" name="Google Shape;99;g255c3305560_0_0"/>
+          <p:cNvPr id="105" name="Google Shape;105;g255c3305560_0_0"/>
           <p:cNvPicPr preferRelativeResize="0"/>
           <p:nvPr/>
         </p:nvPicPr>
@@ -13346,7 +14133,7 @@
       </p:pic>
       <p:sp>
         <p:nvSpPr>
-          <p:cNvPr id="100" name="Google Shape;100;g255c3305560_0_0"/>
+          <p:cNvPr id="106" name="Google Shape;106;g255c3305560_0_0"/>
           <p:cNvSpPr txBox="1"/>
           <p:nvPr/>
         </p:nvSpPr>
@@ -13448,7 +14235,7 @@
       </p:sp>
       <p:sp>
         <p:nvSpPr>
-          <p:cNvPr id="101" name="Google Shape;101;g255c3305560_0_0"/>
+          <p:cNvPr id="107" name="Google Shape;107;g255c3305560_0_0"/>
           <p:cNvSpPr txBox="1"/>
           <p:nvPr/>
         </p:nvSpPr>
@@ -13514,7 +14301,7 @@
       </p:sp>
       <p:sp>
         <p:nvSpPr>
-          <p:cNvPr id="102" name="Google Shape;102;g255c3305560_0_0"/>
+          <p:cNvPr id="108" name="Google Shape;108;g255c3305560_0_0"/>
           <p:cNvSpPr txBox="1"/>
           <p:nvPr/>
         </p:nvSpPr>
@@ -13580,7 +14367,7 @@
       </p:sp>
       <p:sp>
         <p:nvSpPr>
-          <p:cNvPr id="103" name="Google Shape;103;g255c3305560_0_0"/>
+          <p:cNvPr id="109" name="Google Shape;109;g255c3305560_0_0"/>
           <p:cNvSpPr txBox="1"/>
           <p:nvPr>
             <p:ph idx="1" type="body"/>
@@ -13634,12 +14421,12 @@
 </p:sld>
 </file>
 
-<file path=ppt/slides/slide6.xml><?xml version="1.0" encoding="utf-8"?>
+<file path=ppt/slides/slide7.xml><?xml version="1.0" encoding="utf-8"?>
 <p:sld xmlns:a="http://schemas.openxmlformats.org/drawingml/2006/main" xmlns:r="http://schemas.openxmlformats.org/officeDocument/2006/relationships" xmlns:mc="http://schemas.openxmlformats.org/markup-compatibility/2006" xmlns:mv="urn:schemas-microsoft-com:mac:vml" xmlns:p="http://schemas.openxmlformats.org/presentationml/2006/main" xmlns:c="http://schemas.openxmlformats.org/drawingml/2006/chart" xmlns:dgm="http://schemas.openxmlformats.org/drawingml/2006/diagram" xmlns:o="urn:schemas-microsoft-com:office:office" xmlns:v="urn:schemas-microsoft-com:vml" xmlns:pvml="urn:schemas-microsoft-com:office:powerpoint" xmlns:com="http://schemas.openxmlformats.org/drawingml/2006/compatibility" xmlns:p14="http://schemas.microsoft.com/office/powerpoint/2010/main" xmlns:p15="http://schemas.microsoft.com/office/powerpoint/2012/main" xmlns:ahyp="http://schemas.microsoft.com/office/drawing/2018/hyperlinkcolor">
   <p:cSld>
     <p:spTree>
       <p:nvGrpSpPr>
-        <p:cNvPr id="107" name="Shape 107"/>
+        <p:cNvPr id="113" name="Shape 113"/>
         <p:cNvGrpSpPr/>
         <p:nvPr/>
       </p:nvGrpSpPr>
@@ -13653,7 +14440,7 @@
       </p:grpSpPr>
       <p:sp>
         <p:nvSpPr>
-          <p:cNvPr id="108" name="Google Shape;108;p5"/>
+          <p:cNvPr id="114" name="Google Shape;114;p5"/>
           <p:cNvSpPr txBox="1"/>
           <p:nvPr>
             <p:ph type="title"/>
@@ -13701,7 +14488,7 @@
       </p:sp>
       <p:pic>
         <p:nvPicPr>
-          <p:cNvPr id="109" name="Google Shape;109;p5"/>
+          <p:cNvPr id="115" name="Google Shape;115;p5"/>
           <p:cNvPicPr preferRelativeResize="0"/>
           <p:nvPr/>
         </p:nvPicPr>
@@ -13741,7 +14528,7 @@
       </p:pic>
       <p:sp>
         <p:nvSpPr>
-          <p:cNvPr id="110" name="Google Shape;110;p5"/>
+          <p:cNvPr id="116" name="Google Shape;116;p5"/>
           <p:cNvSpPr/>
           <p:nvPr/>
         </p:nvSpPr>
@@ -13804,7 +14591,7 @@
       </p:sp>
       <p:sp>
         <p:nvSpPr>
-          <p:cNvPr id="111" name="Google Shape;111;p5"/>
+          <p:cNvPr id="117" name="Google Shape;117;p5"/>
           <p:cNvSpPr txBox="1"/>
           <p:nvPr/>
         </p:nvSpPr>
@@ -13870,7 +14657,7 @@
       </p:sp>
       <p:sp>
         <p:nvSpPr>
-          <p:cNvPr id="112" name="Google Shape;112;p5"/>
+          <p:cNvPr id="118" name="Google Shape;118;p5"/>
           <p:cNvSpPr txBox="1"/>
           <p:nvPr/>
         </p:nvSpPr>
@@ -13936,7 +14723,7 @@
       </p:sp>
       <p:sp>
         <p:nvSpPr>
-          <p:cNvPr id="113" name="Google Shape;113;p5"/>
+          <p:cNvPr id="119" name="Google Shape;119;p5"/>
           <p:cNvSpPr/>
           <p:nvPr/>
         </p:nvSpPr>
@@ -13999,7 +14786,7 @@
       </p:sp>
       <p:sp>
         <p:nvSpPr>
-          <p:cNvPr id="114" name="Google Shape;114;p5"/>
+          <p:cNvPr id="120" name="Google Shape;120;p5"/>
           <p:cNvSpPr txBox="1"/>
           <p:nvPr/>
         </p:nvSpPr>
@@ -14065,7 +14852,7 @@
       </p:sp>
       <p:sp>
         <p:nvSpPr>
-          <p:cNvPr id="115" name="Google Shape;115;p5"/>
+          <p:cNvPr id="121" name="Google Shape;121;p5"/>
           <p:cNvSpPr txBox="1"/>
           <p:nvPr/>
         </p:nvSpPr>
@@ -14131,7 +14918,7 @@
       </p:sp>
       <p:sp>
         <p:nvSpPr>
-          <p:cNvPr id="116" name="Google Shape;116;p5"/>
+          <p:cNvPr id="122" name="Google Shape;122;p5"/>
           <p:cNvSpPr/>
           <p:nvPr/>
         </p:nvSpPr>
@@ -14194,7 +14981,7 @@
       </p:sp>
       <p:sp>
         <p:nvSpPr>
-          <p:cNvPr id="117" name="Google Shape;117;p5"/>
+          <p:cNvPr id="123" name="Google Shape;123;p5"/>
           <p:cNvSpPr/>
           <p:nvPr/>
         </p:nvSpPr>
@@ -14263,12 +15050,12 @@
 </p:sld>
 </file>
 
-<file path=ppt/slides/slide7.xml><?xml version="1.0" encoding="utf-8"?>
+<file path=ppt/slides/slide8.xml><?xml version="1.0" encoding="utf-8"?>
 <p:sld xmlns:a="http://schemas.openxmlformats.org/drawingml/2006/main" xmlns:r="http://schemas.openxmlformats.org/officeDocument/2006/relationships" xmlns:mc="http://schemas.openxmlformats.org/markup-compatibility/2006" xmlns:mv="urn:schemas-microsoft-com:mac:vml" xmlns:p="http://schemas.openxmlformats.org/presentationml/2006/main" xmlns:c="http://schemas.openxmlformats.org/drawingml/2006/chart" xmlns:dgm="http://schemas.openxmlformats.org/drawingml/2006/diagram" xmlns:o="urn:schemas-microsoft-com:office:office" xmlns:v="urn:schemas-microsoft-com:vml" xmlns:pvml="urn:schemas-microsoft-com:office:powerpoint" xmlns:com="http://schemas.openxmlformats.org/drawingml/2006/compatibility" xmlns:p14="http://schemas.microsoft.com/office/powerpoint/2010/main" xmlns:p15="http://schemas.microsoft.com/office/powerpoint/2012/main" xmlns:ahyp="http://schemas.microsoft.com/office/drawing/2018/hyperlinkcolor">
   <p:cSld>
     <p:spTree>
       <p:nvGrpSpPr>
-        <p:cNvPr id="121" name="Shape 121"/>
+        <p:cNvPr id="127" name="Shape 127"/>
         <p:cNvGrpSpPr/>
         <p:nvPr/>
       </p:nvGrpSpPr>
@@ -14282,7 +15069,7 @@
       </p:grpSpPr>
       <p:sp>
         <p:nvSpPr>
-          <p:cNvPr id="122" name="Google Shape;122;g276e2b878a6_0_7"/>
+          <p:cNvPr id="128" name="Google Shape;128;g276e2b878a6_0_7"/>
           <p:cNvSpPr txBox="1"/>
           <p:nvPr>
             <p:ph type="title"/>
@@ -14330,7 +15117,7 @@
       </p:sp>
       <p:sp>
         <p:nvSpPr>
-          <p:cNvPr id="123" name="Google Shape;123;g276e2b878a6_0_7"/>
+          <p:cNvPr id="129" name="Google Shape;129;g276e2b878a6_0_7"/>
           <p:cNvSpPr txBox="1"/>
           <p:nvPr/>
         </p:nvSpPr>
@@ -14434,7 +15221,7 @@
       </p:sp>
       <p:pic>
         <p:nvPicPr>
-          <p:cNvPr id="124" name="Google Shape;124;g276e2b878a6_0_7"/>
+          <p:cNvPr id="130" name="Google Shape;130;g276e2b878a6_0_7"/>
           <p:cNvPicPr preferRelativeResize="0"/>
           <p:nvPr/>
         </p:nvPicPr>
@@ -14468,7 +15255,7 @@
       </p:pic>
       <p:pic>
         <p:nvPicPr>
-          <p:cNvPr id="125" name="Google Shape;125;g276e2b878a6_0_7"/>
+          <p:cNvPr id="131" name="Google Shape;131;g276e2b878a6_0_7"/>
           <p:cNvPicPr preferRelativeResize="0"/>
           <p:nvPr/>
         </p:nvPicPr>
@@ -14502,7 +15289,7 @@
       </p:pic>
       <p:pic>
         <p:nvPicPr>
-          <p:cNvPr id="126" name="Google Shape;126;g276e2b878a6_0_7"/>
+          <p:cNvPr id="132" name="Google Shape;132;g276e2b878a6_0_7"/>
           <p:cNvPicPr preferRelativeResize="0"/>
           <p:nvPr/>
         </p:nvPicPr>
@@ -14536,7 +15323,7 @@
       </p:pic>
       <p:pic>
         <p:nvPicPr>
-          <p:cNvPr id="127" name="Google Shape;127;g276e2b878a6_0_7"/>
+          <p:cNvPr id="133" name="Google Shape;133;g276e2b878a6_0_7"/>
           <p:cNvPicPr preferRelativeResize="0"/>
           <p:nvPr/>
         </p:nvPicPr>
@@ -14570,7 +15357,7 @@
       </p:pic>
       <p:pic>
         <p:nvPicPr>
-          <p:cNvPr id="128" name="Google Shape;128;g276e2b878a6_0_7"/>
+          <p:cNvPr id="134" name="Google Shape;134;g276e2b878a6_0_7"/>
           <p:cNvPicPr preferRelativeResize="0"/>
           <p:nvPr/>
         </p:nvPicPr>
@@ -14610,12 +15397,12 @@
 </p:sld>
 </file>
 
-<file path=ppt/slides/slide8.xml><?xml version="1.0" encoding="utf-8"?>
+<file path=ppt/slides/slide9.xml><?xml version="1.0" encoding="utf-8"?>
 <p:sld xmlns:a="http://schemas.openxmlformats.org/drawingml/2006/main" xmlns:r="http://schemas.openxmlformats.org/officeDocument/2006/relationships" xmlns:mc="http://schemas.openxmlformats.org/markup-compatibility/2006" xmlns:mv="urn:schemas-microsoft-com:mac:vml" xmlns:p="http://schemas.openxmlformats.org/presentationml/2006/main" xmlns:c="http://schemas.openxmlformats.org/drawingml/2006/chart" xmlns:dgm="http://schemas.openxmlformats.org/drawingml/2006/diagram" xmlns:o="urn:schemas-microsoft-com:office:office" xmlns:v="urn:schemas-microsoft-com:vml" xmlns:pvml="urn:schemas-microsoft-com:office:powerpoint" xmlns:com="http://schemas.openxmlformats.org/drawingml/2006/compatibility" xmlns:p14="http://schemas.microsoft.com/office/powerpoint/2010/main" xmlns:p15="http://schemas.microsoft.com/office/powerpoint/2012/main" xmlns:ahyp="http://schemas.microsoft.com/office/drawing/2018/hyperlinkcolor">
   <p:cSld>
     <p:spTree>
       <p:nvGrpSpPr>
-        <p:cNvPr id="132" name="Shape 132"/>
+        <p:cNvPr id="138" name="Shape 138"/>
         <p:cNvGrpSpPr/>
         <p:nvPr/>
       </p:nvGrpSpPr>
@@ -14629,7 +15416,7 @@
       </p:grpSpPr>
       <p:sp>
         <p:nvSpPr>
-          <p:cNvPr id="133" name="Google Shape;133;p6"/>
+          <p:cNvPr id="139" name="Google Shape;139;p6"/>
           <p:cNvSpPr txBox="1"/>
           <p:nvPr>
             <p:ph type="title"/>
@@ -14681,7 +15468,7 @@
       </p:sp>
       <p:sp>
         <p:nvSpPr>
-          <p:cNvPr id="134" name="Google Shape;134;p6"/>
+          <p:cNvPr id="140" name="Google Shape;140;p6"/>
           <p:cNvSpPr txBox="1"/>
           <p:nvPr>
             <p:ph idx="1" type="body"/>
@@ -14785,7 +15572,7 @@
       </p:sp>
       <p:sp>
         <p:nvSpPr>
-          <p:cNvPr id="135" name="Google Shape;135;p6"/>
+          <p:cNvPr id="141" name="Google Shape;141;p6"/>
           <p:cNvSpPr txBox="1"/>
           <p:nvPr>
             <p:ph idx="1" type="body"/>
@@ -14833,7 +15620,7 @@
       </p:sp>
       <p:pic>
         <p:nvPicPr>
-          <p:cNvPr id="136" name="Google Shape;136;p6"/>
+          <p:cNvPr id="142" name="Google Shape;142;p6"/>
           <p:cNvPicPr preferRelativeResize="0"/>
           <p:nvPr/>
         </p:nvPicPr>
@@ -14866,448 +15653,286 @@
 </p:sld>
 </file>
 
-<file path=ppt/slides/slide9.xml><?xml version="1.0" encoding="utf-8"?>
-<p:sld xmlns:a="http://schemas.openxmlformats.org/drawingml/2006/main" xmlns:r="http://schemas.openxmlformats.org/officeDocument/2006/relationships" xmlns:mc="http://schemas.openxmlformats.org/markup-compatibility/2006" xmlns:mv="urn:schemas-microsoft-com:mac:vml" xmlns:p="http://schemas.openxmlformats.org/presentationml/2006/main" xmlns:c="http://schemas.openxmlformats.org/drawingml/2006/chart" xmlns:dgm="http://schemas.openxmlformats.org/drawingml/2006/diagram" xmlns:o="urn:schemas-microsoft-com:office:office" xmlns:v="urn:schemas-microsoft-com:vml" xmlns:pvml="urn:schemas-microsoft-com:office:powerpoint" xmlns:com="http://schemas.openxmlformats.org/drawingml/2006/compatibility" xmlns:p14="http://schemas.microsoft.com/office/powerpoint/2010/main" xmlns:p15="http://schemas.microsoft.com/office/powerpoint/2012/main" xmlns:ahyp="http://schemas.microsoft.com/office/drawing/2018/hyperlinkcolor">
-  <p:cSld>
-    <p:spTree>
-      <p:nvGrpSpPr>
-        <p:cNvPr id="140" name="Shape 140"/>
-        <p:cNvGrpSpPr/>
-        <p:nvPr/>
-      </p:nvGrpSpPr>
-      <p:grpSpPr>
-        <a:xfrm>
-          <a:off x="0" y="0"/>
-          <a:ext cx="0" cy="0"/>
-          <a:chOff x="0" y="0"/>
-          <a:chExt cx="0" cy="0"/>
-        </a:xfrm>
-      </p:grpSpPr>
-      <p:sp>
-        <p:nvSpPr>
-          <p:cNvPr id="141" name="Google Shape;141;g255c330574c_0_0"/>
-          <p:cNvSpPr txBox="1"/>
-          <p:nvPr>
-            <p:ph type="title"/>
-          </p:nvPr>
-        </p:nvSpPr>
-        <p:spPr>
-          <a:xfrm>
-            <a:off x="311700" y="219900"/>
-            <a:ext cx="8520600" cy="572700"/>
-          </a:xfrm>
-          <a:prstGeom prst="rect">
-            <a:avLst/>
-          </a:prstGeom>
-          <a:noFill/>
-          <a:ln>
-            <a:noFill/>
-          </a:ln>
-        </p:spPr>
-        <p:txBody>
-          <a:bodyPr anchorCtr="0" anchor="t" bIns="91425" lIns="91425" spcFirstLastPara="1" rIns="91425" wrap="square" tIns="91425">
-            <a:normAutofit fontScale="90000"/>
-          </a:bodyPr>
-          <a:lstStyle/>
-          <a:p>
-            <a:pPr indent="0" lvl="0" marL="0" rtl="0" algn="ctr">
-              <a:lnSpc>
-                <a:spcPct val="100000"/>
-              </a:lnSpc>
-              <a:spcBef>
-                <a:spcPts val="0"/>
-              </a:spcBef>
-              <a:spcAft>
-                <a:spcPts val="0"/>
-              </a:spcAft>
-              <a:buSzPct val="111111"/>
-              <a:buNone/>
-            </a:pPr>
-            <a:r>
-              <a:rPr lang="en"/>
-              <a:t>Learning R in RStudio</a:t>
-            </a:r>
-            <a:endParaRPr b="1"/>
-          </a:p>
-        </p:txBody>
-      </p:sp>
-      <p:sp>
-        <p:nvSpPr>
-          <p:cNvPr id="142" name="Google Shape;142;g255c330574c_0_0"/>
-          <p:cNvSpPr txBox="1"/>
-          <p:nvPr>
-            <p:ph idx="1" type="body"/>
-          </p:nvPr>
-        </p:nvSpPr>
-        <p:spPr>
-          <a:xfrm>
-            <a:off x="311700" y="1152475"/>
-            <a:ext cx="8520600" cy="3416400"/>
-          </a:xfrm>
-          <a:prstGeom prst="rect">
-            <a:avLst/>
-          </a:prstGeom>
-          <a:noFill/>
-          <a:ln>
-            <a:noFill/>
-          </a:ln>
-        </p:spPr>
-        <p:txBody>
-          <a:bodyPr anchorCtr="0" anchor="t" bIns="91425" lIns="91425" spcFirstLastPara="1" rIns="91425" wrap="square" tIns="91425">
-            <a:normAutofit/>
-          </a:bodyPr>
-          <a:lstStyle/>
-          <a:p>
-            <a:pPr indent="-355600" lvl="0" marL="457200" rtl="0" algn="l">
-              <a:lnSpc>
-                <a:spcPct val="115000"/>
-              </a:lnSpc>
-              <a:spcBef>
-                <a:spcPts val="0"/>
-              </a:spcBef>
-              <a:spcAft>
-                <a:spcPts val="0"/>
-              </a:spcAft>
-              <a:buSzPts val="2000"/>
-              <a:buChar char="●"/>
-            </a:pPr>
-            <a:r>
-              <a:rPr lang="en" sz="2000"/>
-              <a:t>In </a:t>
-            </a:r>
-            <a:r>
-              <a:rPr lang="en" sz="2000">
-                <a:solidFill>
-                  <a:srgbClr val="1155CC"/>
-                </a:solidFill>
-                <a:latin typeface="Consolas"/>
-                <a:ea typeface="Consolas"/>
-                <a:cs typeface="Consolas"/>
-                <a:sym typeface="Consolas"/>
-              </a:rPr>
-              <a:t>Day6_worksheet2_R_in_Rstudio.md </a:t>
-            </a:r>
-            <a:r>
-              <a:rPr lang="en" sz="2000">
-                <a:solidFill>
-                  <a:schemeClr val="dk2"/>
-                </a:solidFill>
-                <a:latin typeface="Arial"/>
-                <a:ea typeface="Arial"/>
-                <a:cs typeface="Arial"/>
-                <a:sym typeface="Arial"/>
-              </a:rPr>
-              <a:t>(</a:t>
-            </a:r>
-            <a:r>
-              <a:rPr lang="en" sz="2000"/>
-              <a:t>Section A</a:t>
-            </a:r>
-            <a:r>
-              <a:rPr lang="en" sz="2000">
-                <a:solidFill>
-                  <a:schemeClr val="dk2"/>
-                </a:solidFill>
-                <a:latin typeface="Arial"/>
-                <a:ea typeface="Arial"/>
-                <a:cs typeface="Arial"/>
-                <a:sym typeface="Arial"/>
-              </a:rPr>
-              <a:t>):</a:t>
-            </a:r>
-            <a:endParaRPr sz="2000">
-              <a:solidFill>
-                <a:schemeClr val="dk2"/>
-              </a:solidFill>
-              <a:latin typeface="Arial"/>
-              <a:ea typeface="Arial"/>
-              <a:cs typeface="Arial"/>
-              <a:sym typeface="Arial"/>
-            </a:endParaRPr>
-          </a:p>
-          <a:p>
-            <a:pPr indent="-355600" lvl="0" marL="457200" rtl="0" algn="l">
-              <a:lnSpc>
-                <a:spcPct val="115000"/>
-              </a:lnSpc>
-              <a:spcBef>
-                <a:spcPts val="0"/>
-              </a:spcBef>
-              <a:spcAft>
-                <a:spcPts val="0"/>
-              </a:spcAft>
-              <a:buSzPts val="2000"/>
-              <a:buChar char="●"/>
-            </a:pPr>
-            <a:r>
-              <a:rPr lang="en" sz="2000">
-                <a:solidFill>
-                  <a:schemeClr val="dk2"/>
-                </a:solidFill>
-                <a:latin typeface="Arial"/>
-                <a:ea typeface="Arial"/>
-                <a:cs typeface="Arial"/>
-                <a:sym typeface="Arial"/>
-              </a:rPr>
-              <a:t>We will go over the </a:t>
-            </a:r>
-            <a:r>
-              <a:rPr lang="en" sz="2000">
-                <a:solidFill>
-                  <a:srgbClr val="1155CC"/>
-                </a:solidFill>
-                <a:latin typeface="Consolas"/>
-                <a:ea typeface="Consolas"/>
-                <a:cs typeface="Consolas"/>
-                <a:sym typeface="Consolas"/>
-              </a:rPr>
-              <a:t>Learning_R.R</a:t>
-            </a:r>
-            <a:r>
-              <a:rPr lang="en" sz="2000"/>
-              <a:t> worksheet in R Studio:</a:t>
-            </a:r>
-            <a:endParaRPr sz="2000"/>
-          </a:p>
-          <a:p>
-            <a:pPr indent="-355600" lvl="1" marL="914400" rtl="0" algn="l">
-              <a:lnSpc>
-                <a:spcPct val="115000"/>
-              </a:lnSpc>
-              <a:spcBef>
-                <a:spcPts val="0"/>
-              </a:spcBef>
-              <a:spcAft>
-                <a:spcPts val="0"/>
-              </a:spcAft>
-              <a:buSzPts val="2000"/>
-              <a:buChar char="○"/>
-            </a:pPr>
-            <a:r>
-              <a:rPr lang="en" sz="2000"/>
-              <a:t>Introduction to R and R Markdown</a:t>
-            </a:r>
-            <a:endParaRPr sz="2000"/>
-          </a:p>
-          <a:p>
-            <a:pPr indent="-355600" lvl="1" marL="914400" rtl="0" algn="l">
-              <a:lnSpc>
-                <a:spcPct val="115000"/>
-              </a:lnSpc>
-              <a:spcBef>
-                <a:spcPts val="0"/>
-              </a:spcBef>
-              <a:spcAft>
-                <a:spcPts val="0"/>
-              </a:spcAft>
-              <a:buSzPts val="2000"/>
-              <a:buChar char="○"/>
-            </a:pPr>
-            <a:r>
-              <a:rPr lang="en" sz="2000"/>
-              <a:t>Introduction to the iris dataset</a:t>
-            </a:r>
-            <a:endParaRPr sz="2000"/>
-          </a:p>
-          <a:p>
-            <a:pPr indent="-355600" lvl="1" marL="914400" rtl="0" algn="l">
-              <a:lnSpc>
-                <a:spcPct val="115000"/>
-              </a:lnSpc>
-              <a:spcBef>
-                <a:spcPts val="0"/>
-              </a:spcBef>
-              <a:spcAft>
-                <a:spcPts val="0"/>
-              </a:spcAft>
-              <a:buSzPts val="2000"/>
-              <a:buChar char="○"/>
-            </a:pPr>
-            <a:r>
-              <a:rPr lang="en" sz="2000"/>
-              <a:t>Installing and loading libraries</a:t>
-            </a:r>
-            <a:endParaRPr sz="2000"/>
-          </a:p>
-          <a:p>
-            <a:pPr indent="-355600" lvl="2" marL="1371600" rtl="0" algn="l">
-              <a:lnSpc>
-                <a:spcPct val="115000"/>
-              </a:lnSpc>
-              <a:spcBef>
-                <a:spcPts val="0"/>
-              </a:spcBef>
-              <a:spcAft>
-                <a:spcPts val="0"/>
-              </a:spcAft>
-              <a:buSzPts val="2000"/>
-              <a:buChar char="■"/>
-            </a:pPr>
-            <a:r>
-              <a:rPr lang="en" sz="2000"/>
-              <a:t>tidyverse</a:t>
-            </a:r>
-            <a:endParaRPr sz="2000"/>
-          </a:p>
-          <a:p>
-            <a:pPr indent="-355600" lvl="1" marL="914400" rtl="0" algn="l">
-              <a:lnSpc>
-                <a:spcPct val="115000"/>
-              </a:lnSpc>
-              <a:spcBef>
-                <a:spcPts val="0"/>
-              </a:spcBef>
-              <a:spcAft>
-                <a:spcPts val="0"/>
-              </a:spcAft>
-              <a:buSzPts val="2000"/>
-              <a:buChar char="○"/>
-            </a:pPr>
-            <a:r>
-              <a:rPr lang="en" sz="2000"/>
-              <a:t>Generating summary statistic in R</a:t>
-            </a:r>
-            <a:endParaRPr sz="2000"/>
-          </a:p>
-          <a:p>
-            <a:pPr indent="-355600" lvl="1" marL="914400" rtl="0" algn="l">
-              <a:lnSpc>
-                <a:spcPct val="115000"/>
-              </a:lnSpc>
-              <a:spcBef>
-                <a:spcPts val="0"/>
-              </a:spcBef>
-              <a:spcAft>
-                <a:spcPts val="0"/>
-              </a:spcAft>
-              <a:buSzPts val="2000"/>
-              <a:buChar char="○"/>
-            </a:pPr>
-            <a:r>
-              <a:rPr lang="en" sz="2000"/>
-              <a:t>Making plots with ggplot2</a:t>
-            </a:r>
-            <a:endParaRPr sz="2000"/>
-          </a:p>
-          <a:p>
-            <a:pPr indent="-355600" lvl="1" marL="914400" rtl="0" algn="l">
-              <a:lnSpc>
-                <a:spcPct val="115000"/>
-              </a:lnSpc>
-              <a:spcBef>
-                <a:spcPts val="0"/>
-              </a:spcBef>
-              <a:spcAft>
-                <a:spcPts val="0"/>
-              </a:spcAft>
-              <a:buSzPts val="2000"/>
-              <a:buChar char="○"/>
-            </a:pPr>
-            <a:r>
-              <a:rPr lang="en" sz="2000"/>
-              <a:t>Manipulating data.frames</a:t>
-            </a:r>
-            <a:endParaRPr sz="2000"/>
-          </a:p>
-        </p:txBody>
-      </p:sp>
-      <p:pic>
-        <p:nvPicPr>
-          <p:cNvPr id="143" name="Google Shape;143;g255c330574c_0_0"/>
-          <p:cNvPicPr preferRelativeResize="0"/>
-          <p:nvPr/>
-        </p:nvPicPr>
-        <p:blipFill rotWithShape="1">
-          <a:blip r:embed="rId3">
-            <a:alphaModFix/>
-          </a:blip>
-          <a:srcRect b="0" l="0" r="0" t="0"/>
-          <a:stretch/>
-        </p:blipFill>
-        <p:spPr>
-          <a:xfrm>
-            <a:off x="5635125" y="2808825"/>
-            <a:ext cx="3154800" cy="1760059"/>
-          </a:xfrm>
-          <a:prstGeom prst="rect">
-            <a:avLst/>
-          </a:prstGeom>
-          <a:noFill/>
-          <a:ln cap="flat" cmpd="sng" w="9525">
-            <a:solidFill>
-              <a:srgbClr val="000000"/>
-            </a:solidFill>
-            <a:prstDash val="solid"/>
-            <a:round/>
-            <a:headEnd len="sm" w="sm" type="none"/>
-            <a:tailEnd len="sm" w="sm" type="none"/>
-          </a:ln>
+<file path=ppt/theme/theme1.xml><?xml version="1.0" encoding="utf-8"?>
+<a:theme xmlns:a="http://schemas.openxmlformats.org/drawingml/2006/main" xmlns:r="http://schemas.openxmlformats.org/officeDocument/2006/relationships">
+  <a:themeElements>
+    <a:clrScheme name="Default">
+      <a:dk1>
+        <a:srgbClr val="000000"/>
+      </a:dk1>
+      <a:lt1>
+        <a:srgbClr val="FFFFFF"/>
+      </a:lt1>
+      <a:dk2>
+        <a:srgbClr val="158158"/>
+      </a:dk2>
+      <a:lt2>
+        <a:srgbClr val="F3F3F3"/>
+      </a:lt2>
+      <a:accent1>
+        <a:srgbClr val="058DC7"/>
+      </a:accent1>
+      <a:accent2>
+        <a:srgbClr val="50B432"/>
+      </a:accent2>
+      <a:accent3>
+        <a:srgbClr val="ED561B"/>
+      </a:accent3>
+      <a:accent4>
+        <a:srgbClr val="EDEF00"/>
+      </a:accent4>
+      <a:accent5>
+        <a:srgbClr val="24CBE5"/>
+      </a:accent5>
+      <a:accent6>
+        <a:srgbClr val="64E572"/>
+      </a:accent6>
+      <a:hlink>
+        <a:srgbClr val="2200CC"/>
+      </a:hlink>
+      <a:folHlink>
+        <a:srgbClr val="551A8B"/>
+      </a:folHlink>
+    </a:clrScheme>
+    <a:fontScheme name="Office">
+      <a:majorFont>
+        <a:latin typeface="Arial"/>
+        <a:ea typeface=""/>
+        <a:cs typeface=""/>
+        <a:font script="Jpan" typeface="ＭＳ Ｐゴシック"/>
+        <a:font script="Hang" typeface="맑은 고딕"/>
+        <a:font script="Hans" typeface="宋体"/>
+        <a:font script="Hant" typeface="新細明體"/>
+        <a:font script="Arab" typeface="Times New Roman"/>
+        <a:font script="Hebr" typeface="Times New Roman"/>
+        <a:font script="Thai" typeface="Angsana New"/>
+        <a:font script="Ethi" typeface="Nyala"/>
+        <a:font script="Beng" typeface="Vrinda"/>
+        <a:font script="Gujr" typeface="Shruti"/>
+        <a:font script="Khmr" typeface="MoolBoran"/>
+        <a:font script="Knda" typeface="Tunga"/>
+        <a:font script="Guru" typeface="Raavi"/>
+        <a:font script="Cans" typeface="Euphemia"/>
+        <a:font script="Cher" typeface="Plantagenet Cherokee"/>
+        <a:font script="Yiii" typeface="Microsoft Yi Baiti"/>
+        <a:font script="Tibt" typeface="Microsoft Himalaya"/>
+        <a:font script="Thaa" typeface="MV Boli"/>
+        <a:font script="Deva" typeface="Mangal"/>
+        <a:font script="Telu" typeface="Gautami"/>
+        <a:font script="Taml" typeface="Latha"/>
+        <a:font script="Syrc" typeface="Estrangelo Edessa"/>
+        <a:font script="Orya" typeface="Kalinga"/>
+        <a:font script="Mlym" typeface="Kartika"/>
+        <a:font script="Laoo" typeface="DokChampa"/>
+        <a:font script="Sinh" typeface="Iskoola Pota"/>
+        <a:font script="Mong" typeface="Mongolian Baiti"/>
+        <a:font script="Viet" typeface="Times New Roman"/>
+        <a:font script="Uigh" typeface="Microsoft Uighur"/>
+        <a:font script="Geor" typeface="Sylfaen"/>
+      </a:majorFont>
+      <a:minorFont>
+        <a:latin typeface="Arial"/>
+        <a:ea typeface=""/>
+        <a:cs typeface=""/>
+        <a:font script="Jpan" typeface="ＭＳ Ｐゴシック"/>
+        <a:font script="Hang" typeface="맑은 고딕"/>
+        <a:font script="Hans" typeface="宋体"/>
+        <a:font script="Hant" typeface="新細明體"/>
+        <a:font script="Arab" typeface="Arial"/>
+        <a:font script="Hebr" typeface="Arial"/>
+        <a:font script="Thai" typeface="Cordia New"/>
+        <a:font script="Ethi" typeface="Nyala"/>
+        <a:font script="Beng" typeface="Vrinda"/>
+        <a:font script="Gujr" typeface="Shruti"/>
+        <a:font script="Khmr" typeface="DaunPenh"/>
+        <a:font script="Knda" typeface="Tunga"/>
+        <a:font script="Guru" typeface="Raavi"/>
+        <a:font script="Cans" typeface="Euphemia"/>
+        <a:font script="Cher" typeface="Plantagenet Cherokee"/>
+        <a:font script="Yiii" typeface="Microsoft Yi Baiti"/>
+        <a:font script="Tibt" typeface="Microsoft Himalaya"/>
+        <a:font script="Thaa" typeface="MV Boli"/>
+        <a:font script="Deva" typeface="Mangal"/>
+        <a:font script="Telu" typeface="Gautami"/>
+        <a:font script="Taml" typeface="Latha"/>
+        <a:font script="Syrc" typeface="Estrangelo Edessa"/>
+        <a:font script="Orya" typeface="Kalinga"/>
+        <a:font script="Mlym" typeface="Kartika"/>
+        <a:font script="Laoo" typeface="DokChampa"/>
+        <a:font script="Sinh" typeface="Iskoola Pota"/>
+        <a:font script="Mong" typeface="Mongolian Baiti"/>
+        <a:font script="Viet" typeface="Arial"/>
+        <a:font script="Uigh" typeface="Microsoft Uighur"/>
+        <a:font script="Geor" typeface="Sylfaen"/>
+      </a:minorFont>
+    </a:fontScheme>
+    <a:fmtScheme name="Office">
+      <a:fillStyleLst>
+        <a:solidFill>
+          <a:schemeClr val="phClr"/>
+        </a:solidFill>
+        <a:gradFill rotWithShape="1">
+          <a:gsLst>
+            <a:gs pos="0">
+              <a:schemeClr val="phClr">
+                <a:tint val="50000"/>
+                <a:satMod val="300000"/>
+              </a:schemeClr>
+            </a:gs>
+            <a:gs pos="35000">
+              <a:schemeClr val="phClr">
+                <a:tint val="37000"/>
+                <a:satMod val="300000"/>
+              </a:schemeClr>
+            </a:gs>
+            <a:gs pos="100000">
+              <a:schemeClr val="phClr">
+                <a:tint val="15000"/>
+                <a:satMod val="350000"/>
+              </a:schemeClr>
+            </a:gs>
+          </a:gsLst>
+          <a:lin ang="16200000" scaled="1"/>
+        </a:gradFill>
+        <a:gradFill rotWithShape="1">
+          <a:gsLst>
+            <a:gs pos="0">
+              <a:schemeClr val="phClr">
+                <a:tint val="100000"/>
+                <a:shade val="100000"/>
+                <a:satMod val="130000"/>
+              </a:schemeClr>
+            </a:gs>
+            <a:gs pos="100000">
+              <a:schemeClr val="phClr">
+                <a:tint val="50000"/>
+                <a:shade val="100000"/>
+                <a:satMod val="350000"/>
+              </a:schemeClr>
+            </a:gs>
+          </a:gsLst>
+          <a:lin ang="16200000" scaled="0"/>
+        </a:gradFill>
+      </a:fillStyleLst>
+      <a:lnStyleLst>
+        <a:ln w="9525" cap="flat" cmpd="sng" algn="ctr">
+          <a:solidFill>
+            <a:schemeClr val="phClr">
+              <a:shade val="95000"/>
+              <a:satMod val="105000"/>
+            </a:schemeClr>
+          </a:solidFill>
+          <a:prstDash val="solid"/>
+        </a:ln>
+        <a:ln w="25400" cap="flat" cmpd="sng" algn="ctr">
+          <a:solidFill>
+            <a:schemeClr val="phClr"/>
+          </a:solidFill>
+          <a:prstDash val="solid"/>
+        </a:ln>
+        <a:ln w="38100" cap="flat" cmpd="sng" algn="ctr">
+          <a:solidFill>
+            <a:schemeClr val="phClr"/>
+          </a:solidFill>
+          <a:prstDash val="solid"/>
+        </a:ln>
+      </a:lnStyleLst>
+      <a:effectStyleLst>
+        <a:effectStyle>
           <a:effectLst>
-            <a:outerShdw blurRad="57150" rotWithShape="0" algn="bl" dir="5400000" dist="19050">
+            <a:outerShdw blurRad="40000" dist="20000" dir="5400000" rotWithShape="0">
               <a:srgbClr val="000000">
-                <a:alpha val="49019"/>
+                <a:alpha val="38000"/>
               </a:srgbClr>
             </a:outerShdw>
           </a:effectLst>
-        </p:spPr>
-      </p:pic>
-      <p:sp>
-        <p:nvSpPr>
-          <p:cNvPr id="144" name="Google Shape;144;g255c330574c_0_0"/>
-          <p:cNvSpPr txBox="1"/>
-          <p:nvPr>
-            <p:ph idx="1" type="body"/>
-          </p:nvPr>
-        </p:nvSpPr>
-        <p:spPr>
-          <a:xfrm>
-            <a:off x="6039063" y="4647600"/>
-            <a:ext cx="2346900" cy="495900"/>
-          </a:xfrm>
-          <a:prstGeom prst="rect">
-            <a:avLst/>
-          </a:prstGeom>
-          <a:noFill/>
-          <a:ln>
-            <a:noFill/>
-          </a:ln>
-        </p:spPr>
-        <p:txBody>
-          <a:bodyPr anchorCtr="0" anchor="t" bIns="91425" lIns="91425" spcFirstLastPara="1" rIns="91425" wrap="square" tIns="91425">
-            <a:normAutofit/>
-          </a:bodyPr>
-          <a:lstStyle/>
-          <a:p>
-            <a:pPr indent="0" lvl="0" marL="0" rtl="0" algn="ctr">
-              <a:lnSpc>
-                <a:spcPct val="115000"/>
-              </a:lnSpc>
-              <a:spcBef>
-                <a:spcPts val="0"/>
-              </a:spcBef>
-              <a:spcAft>
-                <a:spcPts val="1200"/>
-              </a:spcAft>
-              <a:buSzPts val="1800"/>
-              <a:buNone/>
-            </a:pPr>
-            <a:r>
-              <a:rPr lang="en"/>
-              <a:t>R Studio</a:t>
-            </a:r>
-            <a:endParaRPr/>
-          </a:p>
-        </p:txBody>
-      </p:sp>
-    </p:spTree>
-  </p:cSld>
-  <p:clrMapOvr>
-    <a:masterClrMapping/>
-  </p:clrMapOvr>
-</p:sld>
+        </a:effectStyle>
+        <a:effectStyle>
+          <a:effectLst>
+            <a:outerShdw blurRad="40000" dist="23000" dir="5400000" rotWithShape="0">
+              <a:srgbClr val="000000">
+                <a:alpha val="35000"/>
+              </a:srgbClr>
+            </a:outerShdw>
+          </a:effectLst>
+        </a:effectStyle>
+        <a:effectStyle>
+          <a:effectLst>
+            <a:outerShdw blurRad="40000" dist="23000" dir="5400000" rotWithShape="0">
+              <a:srgbClr val="000000">
+                <a:alpha val="35000"/>
+              </a:srgbClr>
+            </a:outerShdw>
+          </a:effectLst>
+          <a:scene3d>
+            <a:camera prst="orthographicFront">
+              <a:rot lat="0" lon="0" rev="0"/>
+            </a:camera>
+            <a:lightRig rig="threePt" dir="t">
+              <a:rot lat="0" lon="0" rev="1200000"/>
+            </a:lightRig>
+          </a:scene3d>
+          <a:sp3d>
+            <a:bevelT w="63500" h="25400"/>
+          </a:sp3d>
+        </a:effectStyle>
+      </a:effectStyleLst>
+      <a:bgFillStyleLst>
+        <a:solidFill>
+          <a:schemeClr val="phClr"/>
+        </a:solidFill>
+        <a:gradFill rotWithShape="1">
+          <a:gsLst>
+            <a:gs pos="0">
+              <a:schemeClr val="phClr">
+                <a:tint val="40000"/>
+                <a:satMod val="350000"/>
+              </a:schemeClr>
+            </a:gs>
+            <a:gs pos="40000">
+              <a:schemeClr val="phClr">
+                <a:tint val="45000"/>
+                <a:shade val="99000"/>
+                <a:satMod val="350000"/>
+              </a:schemeClr>
+            </a:gs>
+            <a:gs pos="100000">
+              <a:schemeClr val="phClr">
+                <a:shade val="20000"/>
+                <a:satMod val="255000"/>
+              </a:schemeClr>
+            </a:gs>
+          </a:gsLst>
+          <a:path path="circle">
+            <a:fillToRect l="50000" t="-80000" r="50000" b="180000"/>
+          </a:path>
+        </a:gradFill>
+        <a:gradFill rotWithShape="1">
+          <a:gsLst>
+            <a:gs pos="0">
+              <a:schemeClr val="phClr">
+                <a:tint val="80000"/>
+                <a:satMod val="300000"/>
+              </a:schemeClr>
+            </a:gs>
+            <a:gs pos="100000">
+              <a:schemeClr val="phClr">
+                <a:shade val="30000"/>
+                <a:satMod val="200000"/>
+              </a:schemeClr>
+            </a:gs>
+          </a:gsLst>
+          <a:path path="circle">
+            <a:fillToRect l="50000" t="50000" r="50000" b="50000"/>
+          </a:path>
+        </a:gradFill>
+      </a:bgFillStyleLst>
+    </a:fmtScheme>
+  </a:themeElements>
+</a:theme>
 </file>
 
-<file path=ppt/theme/theme1.xml><?xml version="1.0" encoding="utf-8"?>
+<file path=ppt/theme/theme2.xml><?xml version="1.0" encoding="utf-8"?>
 <a:theme xmlns:a="http://schemas.openxmlformats.org/drawingml/2006/main" xmlns:r="http://schemas.openxmlformats.org/officeDocument/2006/relationships" name="Simple Light">
   <a:themeElements>
     <a:clrScheme name="Simple Light">
@@ -15584,283 +16209,4 @@
     </a:fmtScheme>
   </a:themeElements>
 </a:theme>
-</file>
-
-<file path=ppt/theme/theme2.xml><?xml version="1.0" encoding="utf-8"?>
-<a:theme xmlns:a="http://schemas.openxmlformats.org/drawingml/2006/main" xmlns:r="http://schemas.openxmlformats.org/officeDocument/2006/relationships">
-  <a:themeElements>
-    <a:clrScheme name="Default">
-      <a:dk1>
-        <a:srgbClr val="000000"/>
-      </a:dk1>
-      <a:lt1>
-        <a:srgbClr val="FFFFFF"/>
-      </a:lt1>
-      <a:dk2>
-        <a:srgbClr val="158158"/>
-      </a:dk2>
-      <a:lt2>
-        <a:srgbClr val="F3F3F3"/>
-      </a:lt2>
-      <a:accent1>
-        <a:srgbClr val="058DC7"/>
-      </a:accent1>
-      <a:accent2>
-        <a:srgbClr val="50B432"/>
-      </a:accent2>
-      <a:accent3>
-        <a:srgbClr val="ED561B"/>
-      </a:accent3>
-      <a:accent4>
-        <a:srgbClr val="EDEF00"/>
-      </a:accent4>
-      <a:accent5>
-        <a:srgbClr val="24CBE5"/>
-      </a:accent5>
-      <a:accent6>
-        <a:srgbClr val="64E572"/>
-      </a:accent6>
-      <a:hlink>
-        <a:srgbClr val="2200CC"/>
-      </a:hlink>
-      <a:folHlink>
-        <a:srgbClr val="551A8B"/>
-      </a:folHlink>
-    </a:clrScheme>
-    <a:fontScheme name="Office">
-      <a:majorFont>
-        <a:latin typeface="Arial"/>
-        <a:ea typeface=""/>
-        <a:cs typeface=""/>
-        <a:font script="Jpan" typeface="ＭＳ Ｐゴシック"/>
-        <a:font script="Hang" typeface="맑은 고딕"/>
-        <a:font script="Hans" typeface="宋体"/>
-        <a:font script="Hant" typeface="新細明體"/>
-        <a:font script="Arab" typeface="Times New Roman"/>
-        <a:font script="Hebr" typeface="Times New Roman"/>
-        <a:font script="Thai" typeface="Angsana New"/>
-        <a:font script="Ethi" typeface="Nyala"/>
-        <a:font script="Beng" typeface="Vrinda"/>
-        <a:font script="Gujr" typeface="Shruti"/>
-        <a:font script="Khmr" typeface="MoolBoran"/>
-        <a:font script="Knda" typeface="Tunga"/>
-        <a:font script="Guru" typeface="Raavi"/>
-        <a:font script="Cans" typeface="Euphemia"/>
-        <a:font script="Cher" typeface="Plantagenet Cherokee"/>
-        <a:font script="Yiii" typeface="Microsoft Yi Baiti"/>
-        <a:font script="Tibt" typeface="Microsoft Himalaya"/>
-        <a:font script="Thaa" typeface="MV Boli"/>
-        <a:font script="Deva" typeface="Mangal"/>
-        <a:font script="Telu" typeface="Gautami"/>
-        <a:font script="Taml" typeface="Latha"/>
-        <a:font script="Syrc" typeface="Estrangelo Edessa"/>
-        <a:font script="Orya" typeface="Kalinga"/>
-        <a:font script="Mlym" typeface="Kartika"/>
-        <a:font script="Laoo" typeface="DokChampa"/>
-        <a:font script="Sinh" typeface="Iskoola Pota"/>
-        <a:font script="Mong" typeface="Mongolian Baiti"/>
-        <a:font script="Viet" typeface="Times New Roman"/>
-        <a:font script="Uigh" typeface="Microsoft Uighur"/>
-        <a:font script="Geor" typeface="Sylfaen"/>
-      </a:majorFont>
-      <a:minorFont>
-        <a:latin typeface="Arial"/>
-        <a:ea typeface=""/>
-        <a:cs typeface=""/>
-        <a:font script="Jpan" typeface="ＭＳ Ｐゴシック"/>
-        <a:font script="Hang" typeface="맑은 고딕"/>
-        <a:font script="Hans" typeface="宋体"/>
-        <a:font script="Hant" typeface="新細明體"/>
-        <a:font script="Arab" typeface="Arial"/>
-        <a:font script="Hebr" typeface="Arial"/>
-        <a:font script="Thai" typeface="Cordia New"/>
-        <a:font script="Ethi" typeface="Nyala"/>
-        <a:font script="Beng" typeface="Vrinda"/>
-        <a:font script="Gujr" typeface="Shruti"/>
-        <a:font script="Khmr" typeface="DaunPenh"/>
-        <a:font script="Knda" typeface="Tunga"/>
-        <a:font script="Guru" typeface="Raavi"/>
-        <a:font script="Cans" typeface="Euphemia"/>
-        <a:font script="Cher" typeface="Plantagenet Cherokee"/>
-        <a:font script="Yiii" typeface="Microsoft Yi Baiti"/>
-        <a:font script="Tibt" typeface="Microsoft Himalaya"/>
-        <a:font script="Thaa" typeface="MV Boli"/>
-        <a:font script="Deva" typeface="Mangal"/>
-        <a:font script="Telu" typeface="Gautami"/>
-        <a:font script="Taml" typeface="Latha"/>
-        <a:font script="Syrc" typeface="Estrangelo Edessa"/>
-        <a:font script="Orya" typeface="Kalinga"/>
-        <a:font script="Mlym" typeface="Kartika"/>
-        <a:font script="Laoo" typeface="DokChampa"/>
-        <a:font script="Sinh" typeface="Iskoola Pota"/>
-        <a:font script="Mong" typeface="Mongolian Baiti"/>
-        <a:font script="Viet" typeface="Arial"/>
-        <a:font script="Uigh" typeface="Microsoft Uighur"/>
-        <a:font script="Geor" typeface="Sylfaen"/>
-      </a:minorFont>
-    </a:fontScheme>
-    <a:fmtScheme name="Office">
-      <a:fillStyleLst>
-        <a:solidFill>
-          <a:schemeClr val="phClr"/>
-        </a:solidFill>
-        <a:gradFill rotWithShape="1">
-          <a:gsLst>
-            <a:gs pos="0">
-              <a:schemeClr val="phClr">
-                <a:tint val="50000"/>
-                <a:satMod val="300000"/>
-              </a:schemeClr>
-            </a:gs>
-            <a:gs pos="35000">
-              <a:schemeClr val="phClr">
-                <a:tint val="37000"/>
-                <a:satMod val="300000"/>
-              </a:schemeClr>
-            </a:gs>
-            <a:gs pos="100000">
-              <a:schemeClr val="phClr">
-                <a:tint val="15000"/>
-                <a:satMod val="350000"/>
-              </a:schemeClr>
-            </a:gs>
-          </a:gsLst>
-          <a:lin ang="16200000" scaled="1"/>
-        </a:gradFill>
-        <a:gradFill rotWithShape="1">
-          <a:gsLst>
-            <a:gs pos="0">
-              <a:schemeClr val="phClr">
-                <a:tint val="100000"/>
-                <a:shade val="100000"/>
-                <a:satMod val="130000"/>
-              </a:schemeClr>
-            </a:gs>
-            <a:gs pos="100000">
-              <a:schemeClr val="phClr">
-                <a:tint val="50000"/>
-                <a:shade val="100000"/>
-                <a:satMod val="350000"/>
-              </a:schemeClr>
-            </a:gs>
-          </a:gsLst>
-          <a:lin ang="16200000" scaled="0"/>
-        </a:gradFill>
-      </a:fillStyleLst>
-      <a:lnStyleLst>
-        <a:ln w="9525" cap="flat" cmpd="sng" algn="ctr">
-          <a:solidFill>
-            <a:schemeClr val="phClr">
-              <a:shade val="95000"/>
-              <a:satMod val="105000"/>
-            </a:schemeClr>
-          </a:solidFill>
-          <a:prstDash val="solid"/>
-        </a:ln>
-        <a:ln w="25400" cap="flat" cmpd="sng" algn="ctr">
-          <a:solidFill>
-            <a:schemeClr val="phClr"/>
-          </a:solidFill>
-          <a:prstDash val="solid"/>
-        </a:ln>
-        <a:ln w="38100" cap="flat" cmpd="sng" algn="ctr">
-          <a:solidFill>
-            <a:schemeClr val="phClr"/>
-          </a:solidFill>
-          <a:prstDash val="solid"/>
-        </a:ln>
-      </a:lnStyleLst>
-      <a:effectStyleLst>
-        <a:effectStyle>
-          <a:effectLst>
-            <a:outerShdw blurRad="40000" dist="20000" dir="5400000" rotWithShape="0">
-              <a:srgbClr val="000000">
-                <a:alpha val="38000"/>
-              </a:srgbClr>
-            </a:outerShdw>
-          </a:effectLst>
-        </a:effectStyle>
-        <a:effectStyle>
-          <a:effectLst>
-            <a:outerShdw blurRad="40000" dist="23000" dir="5400000" rotWithShape="0">
-              <a:srgbClr val="000000">
-                <a:alpha val="35000"/>
-              </a:srgbClr>
-            </a:outerShdw>
-          </a:effectLst>
-        </a:effectStyle>
-        <a:effectStyle>
-          <a:effectLst>
-            <a:outerShdw blurRad="40000" dist="23000" dir="5400000" rotWithShape="0">
-              <a:srgbClr val="000000">
-                <a:alpha val="35000"/>
-              </a:srgbClr>
-            </a:outerShdw>
-          </a:effectLst>
-          <a:scene3d>
-            <a:camera prst="orthographicFront">
-              <a:rot lat="0" lon="0" rev="0"/>
-            </a:camera>
-            <a:lightRig rig="threePt" dir="t">
-              <a:rot lat="0" lon="0" rev="1200000"/>
-            </a:lightRig>
-          </a:scene3d>
-          <a:sp3d>
-            <a:bevelT w="63500" h="25400"/>
-          </a:sp3d>
-        </a:effectStyle>
-      </a:effectStyleLst>
-      <a:bgFillStyleLst>
-        <a:solidFill>
-          <a:schemeClr val="phClr"/>
-        </a:solidFill>
-        <a:gradFill rotWithShape="1">
-          <a:gsLst>
-            <a:gs pos="0">
-              <a:schemeClr val="phClr">
-                <a:tint val="40000"/>
-                <a:satMod val="350000"/>
-              </a:schemeClr>
-            </a:gs>
-            <a:gs pos="40000">
-              <a:schemeClr val="phClr">
-                <a:tint val="45000"/>
-                <a:shade val="99000"/>
-                <a:satMod val="350000"/>
-              </a:schemeClr>
-            </a:gs>
-            <a:gs pos="100000">
-              <a:schemeClr val="phClr">
-                <a:shade val="20000"/>
-                <a:satMod val="255000"/>
-              </a:schemeClr>
-            </a:gs>
-          </a:gsLst>
-          <a:path path="circle">
-            <a:fillToRect l="50000" t="-80000" r="50000" b="180000"/>
-          </a:path>
-        </a:gradFill>
-        <a:gradFill rotWithShape="1">
-          <a:gsLst>
-            <a:gs pos="0">
-              <a:schemeClr val="phClr">
-                <a:tint val="80000"/>
-                <a:satMod val="300000"/>
-              </a:schemeClr>
-            </a:gs>
-            <a:gs pos="100000">
-              <a:schemeClr val="phClr">
-                <a:shade val="30000"/>
-                <a:satMod val="200000"/>
-              </a:schemeClr>
-            </a:gs>
-          </a:gsLst>
-          <a:path path="circle">
-            <a:fillToRect l="50000" t="50000" r="50000" b="50000"/>
-          </a:path>
-        </a:gradFill>
-      </a:bgFillStyleLst>
-    </a:fmtScheme>
-  </a:themeElements>
-</a:theme>
 </file>
</xml_diff>

<commit_message>
Updating the README for day6.
</commit_message>
<xml_diff>
--- a/day06/slides/Day6_slides.pptx
+++ b/day06/slides/Day6_slides.pptx
@@ -22,6 +22,7 @@
     <p:sldId id="267" r:id="rId17"/>
     <p:sldId id="268" r:id="rId18"/>
     <p:sldId id="269" r:id="rId19"/>
+    <p:sldId id="270" r:id="rId20"/>
   </p:sldIdLst>
   <p:sldSz cy="5143500" cx="9144000"/>
   <p:notesSz cx="6858000" cy="9144000"/>
@@ -270,7 +271,7 @@
       </p15:sldGuideLst>
     </p:ext>
     <p:ext uri="GoogleSlidesCustomDataVersion2">
-      <go:slidesCustomData xmlns:go="http://customooxmlschemas.google.com/" r:id="rId20" roundtripDataSignature="AMtx7mhZZP/TlKqV0CMWp0gedXoCsAp76w=="/>
+      <go:slidesCustomData xmlns:go="http://customooxmlschemas.google.com/" r:id="rId21" roundtripDataSignature="AMtx7miMhHEVgERvvJxmf7BCV02dQfDnBA=="/>
     </p:ext>
   </p:extLst>
 </p:presentation>
@@ -966,7 +967,7 @@
   <p:cSld>
     <p:spTree>
       <p:nvGrpSpPr>
-        <p:cNvPr id="143" name="Shape 143"/>
+        <p:cNvPr id="150" name="Shape 150"/>
         <p:cNvGrpSpPr/>
         <p:nvPr/>
       </p:nvGrpSpPr>
@@ -980,7 +981,7 @@
       </p:grpSpPr>
       <p:sp>
         <p:nvSpPr>
-          <p:cNvPr id="144" name="Google Shape;144;g255c330574c_0_0:notes"/>
+          <p:cNvPr id="151" name="Google Shape;151;p6:notes"/>
           <p:cNvSpPr/>
           <p:nvPr>
             <p:ph idx="2" type="sldImg"/>
@@ -1025,7 +1026,7 @@
       </p:sp>
       <p:sp>
         <p:nvSpPr>
-          <p:cNvPr id="145" name="Google Shape;145;g255c330574c_0_0:notes"/>
+          <p:cNvPr id="152" name="Google Shape;152;p6:notes"/>
           <p:cNvSpPr txBox="1"/>
           <p:nvPr>
             <p:ph idx="1" type="body"/>
@@ -1083,7 +1084,7 @@
   <p:cSld>
     <p:spTree>
       <p:nvGrpSpPr>
-        <p:cNvPr id="151" name="Shape 151"/>
+        <p:cNvPr id="158" name="Shape 158"/>
         <p:cNvGrpSpPr/>
         <p:nvPr/>
       </p:nvGrpSpPr>
@@ -1097,7 +1098,124 @@
       </p:grpSpPr>
       <p:sp>
         <p:nvSpPr>
-          <p:cNvPr id="152" name="Google Shape;152;g255c330574c_0_61:notes"/>
+          <p:cNvPr id="159" name="Google Shape;159;g255c330574c_0_0:notes"/>
+          <p:cNvSpPr/>
+          <p:nvPr>
+            <p:ph idx="2" type="sldImg"/>
+          </p:nvPr>
+        </p:nvSpPr>
+        <p:spPr>
+          <a:xfrm>
+            <a:off x="381000" y="685800"/>
+            <a:ext cx="6096000" cy="3429000"/>
+          </a:xfrm>
+          <a:custGeom>
+            <a:rect b="b" l="l" r="r" t="t"/>
+            <a:pathLst>
+              <a:path extrusionOk="0" h="120000" w="120000">
+                <a:moveTo>
+                  <a:pt x="0" y="0"/>
+                </a:moveTo>
+                <a:lnTo>
+                  <a:pt x="120000" y="0"/>
+                </a:lnTo>
+                <a:lnTo>
+                  <a:pt x="120000" y="120000"/>
+                </a:lnTo>
+                <a:lnTo>
+                  <a:pt x="0" y="120000"/>
+                </a:lnTo>
+                <a:close/>
+              </a:path>
+            </a:pathLst>
+          </a:custGeom>
+          <a:noFill/>
+          <a:ln cap="flat" cmpd="sng" w="9525">
+            <a:solidFill>
+              <a:srgbClr val="000000"/>
+            </a:solidFill>
+            <a:prstDash val="solid"/>
+            <a:round/>
+            <a:headEnd len="sm" w="sm" type="none"/>
+            <a:tailEnd len="sm" w="sm" type="none"/>
+          </a:ln>
+        </p:spPr>
+      </p:sp>
+      <p:sp>
+        <p:nvSpPr>
+          <p:cNvPr id="160" name="Google Shape;160;g255c330574c_0_0:notes"/>
+          <p:cNvSpPr txBox="1"/>
+          <p:nvPr>
+            <p:ph idx="1" type="body"/>
+          </p:nvPr>
+        </p:nvSpPr>
+        <p:spPr>
+          <a:xfrm>
+            <a:off x="685800" y="4343400"/>
+            <a:ext cx="5486400" cy="4114800"/>
+          </a:xfrm>
+          <a:prstGeom prst="rect">
+            <a:avLst/>
+          </a:prstGeom>
+          <a:noFill/>
+          <a:ln>
+            <a:noFill/>
+          </a:ln>
+        </p:spPr>
+        <p:txBody>
+          <a:bodyPr anchorCtr="0" anchor="t" bIns="91425" lIns="91425" spcFirstLastPara="1" rIns="91425" wrap="square" tIns="91425">
+            <a:noAutofit/>
+          </a:bodyPr>
+          <a:lstStyle/>
+          <a:p>
+            <a:pPr indent="0" lvl="0" marL="0" rtl="0" algn="l">
+              <a:lnSpc>
+                <a:spcPct val="100000"/>
+              </a:lnSpc>
+              <a:spcBef>
+                <a:spcPts val="0"/>
+              </a:spcBef>
+              <a:spcAft>
+                <a:spcPts val="0"/>
+              </a:spcAft>
+              <a:buSzPts val="1100"/>
+              <a:buNone/>
+            </a:pPr>
+            <a:r>
+              <a:t/>
+            </a:r>
+            <a:endParaRPr/>
+          </a:p>
+        </p:txBody>
+      </p:sp>
+    </p:spTree>
+  </p:cSld>
+  <p:clrMapOvr>
+    <a:masterClrMapping/>
+  </p:clrMapOvr>
+</p:notes>
+</file>
+
+<file path=ppt/notesSlides/notesSlide12.xml><?xml version="1.0" encoding="utf-8"?>
+<p:notes xmlns:a="http://schemas.openxmlformats.org/drawingml/2006/main" xmlns:r="http://schemas.openxmlformats.org/officeDocument/2006/relationships" xmlns:mc="http://schemas.openxmlformats.org/markup-compatibility/2006" xmlns:mv="urn:schemas-microsoft-com:mac:vml" xmlns:p="http://schemas.openxmlformats.org/presentationml/2006/main" xmlns:c="http://schemas.openxmlformats.org/drawingml/2006/chart" xmlns:dgm="http://schemas.openxmlformats.org/drawingml/2006/diagram" xmlns:o="urn:schemas-microsoft-com:office:office" xmlns:v="urn:schemas-microsoft-com:vml" xmlns:pvml="urn:schemas-microsoft-com:office:powerpoint" xmlns:com="http://schemas.openxmlformats.org/drawingml/2006/compatibility" xmlns:p14="http://schemas.microsoft.com/office/powerpoint/2010/main" xmlns:p15="http://schemas.microsoft.com/office/powerpoint/2012/main" xmlns:ahyp="http://schemas.microsoft.com/office/drawing/2018/hyperlinkcolor" showMasterPhAnim="0" showMasterSp="0">
+  <p:cSld>
+    <p:spTree>
+      <p:nvGrpSpPr>
+        <p:cNvPr id="166" name="Shape 166"/>
+        <p:cNvGrpSpPr/>
+        <p:nvPr/>
+      </p:nvGrpSpPr>
+      <p:grpSpPr>
+        <a:xfrm>
+          <a:off x="0" y="0"/>
+          <a:ext cx="0" cy="0"/>
+          <a:chOff x="0" y="0"/>
+          <a:chExt cx="0" cy="0"/>
+        </a:xfrm>
+      </p:grpSpPr>
+      <p:sp>
+        <p:nvSpPr>
+          <p:cNvPr id="167" name="Google Shape;167;g255c330574c_0_61:notes"/>
           <p:cNvSpPr/>
           <p:nvPr>
             <p:ph idx="2" type="sldImg"/>
@@ -1142,7 +1260,7 @@
       </p:sp>
       <p:sp>
         <p:nvSpPr>
-          <p:cNvPr id="153" name="Google Shape;153;g255c330574c_0_61:notes"/>
+          <p:cNvPr id="168" name="Google Shape;168;g255c330574c_0_61:notes"/>
           <p:cNvSpPr txBox="1"/>
           <p:nvPr>
             <p:ph idx="1" type="body"/>
@@ -1195,12 +1313,12 @@
 </p:notes>
 </file>
 
-<file path=ppt/notesSlides/notesSlide12.xml><?xml version="1.0" encoding="utf-8"?>
+<file path=ppt/notesSlides/notesSlide13.xml><?xml version="1.0" encoding="utf-8"?>
 <p:notes xmlns:a="http://schemas.openxmlformats.org/drawingml/2006/main" xmlns:r="http://schemas.openxmlformats.org/officeDocument/2006/relationships" xmlns:mc="http://schemas.openxmlformats.org/markup-compatibility/2006" xmlns:mv="urn:schemas-microsoft-com:mac:vml" xmlns:p="http://schemas.openxmlformats.org/presentationml/2006/main" xmlns:c="http://schemas.openxmlformats.org/drawingml/2006/chart" xmlns:dgm="http://schemas.openxmlformats.org/drawingml/2006/diagram" xmlns:o="urn:schemas-microsoft-com:office:office" xmlns:v="urn:schemas-microsoft-com:vml" xmlns:pvml="urn:schemas-microsoft-com:office:powerpoint" xmlns:com="http://schemas.openxmlformats.org/drawingml/2006/compatibility" xmlns:p14="http://schemas.microsoft.com/office/powerpoint/2010/main" xmlns:p15="http://schemas.microsoft.com/office/powerpoint/2012/main" xmlns:ahyp="http://schemas.microsoft.com/office/drawing/2018/hyperlinkcolor" showMasterPhAnim="0" showMasterSp="0">
   <p:cSld>
     <p:spTree>
       <p:nvGrpSpPr>
-        <p:cNvPr id="157" name="Shape 157"/>
+        <p:cNvPr id="172" name="Shape 172"/>
         <p:cNvGrpSpPr/>
         <p:nvPr/>
       </p:nvGrpSpPr>
@@ -1214,7 +1332,7 @@
       </p:grpSpPr>
       <p:sp>
         <p:nvSpPr>
-          <p:cNvPr id="158" name="Google Shape;158;g255c330574c_0_11:notes"/>
+          <p:cNvPr id="173" name="Google Shape;173;g255c330574c_0_11:notes"/>
           <p:cNvSpPr/>
           <p:nvPr>
             <p:ph idx="2" type="sldImg"/>
@@ -1259,7 +1377,7 @@
       </p:sp>
       <p:sp>
         <p:nvSpPr>
-          <p:cNvPr id="159" name="Google Shape;159;g255c330574c_0_11:notes"/>
+          <p:cNvPr id="174" name="Google Shape;174;g255c330574c_0_11:notes"/>
           <p:cNvSpPr txBox="1"/>
           <p:nvPr>
             <p:ph idx="1" type="body"/>
@@ -1312,12 +1430,12 @@
 </p:notes>
 </file>
 
-<file path=ppt/notesSlides/notesSlide13.xml><?xml version="1.0" encoding="utf-8"?>
+<file path=ppt/notesSlides/notesSlide14.xml><?xml version="1.0" encoding="utf-8"?>
 <p:notes xmlns:a="http://schemas.openxmlformats.org/drawingml/2006/main" xmlns:r="http://schemas.openxmlformats.org/officeDocument/2006/relationships" xmlns:mc="http://schemas.openxmlformats.org/markup-compatibility/2006" xmlns:mv="urn:schemas-microsoft-com:mac:vml" xmlns:p="http://schemas.openxmlformats.org/presentationml/2006/main" xmlns:c="http://schemas.openxmlformats.org/drawingml/2006/chart" xmlns:dgm="http://schemas.openxmlformats.org/drawingml/2006/diagram" xmlns:o="urn:schemas-microsoft-com:office:office" xmlns:v="urn:schemas-microsoft-com:vml" xmlns:pvml="urn:schemas-microsoft-com:office:powerpoint" xmlns:com="http://schemas.openxmlformats.org/drawingml/2006/compatibility" xmlns:p14="http://schemas.microsoft.com/office/powerpoint/2010/main" xmlns:p15="http://schemas.microsoft.com/office/powerpoint/2012/main" xmlns:ahyp="http://schemas.microsoft.com/office/drawing/2018/hyperlinkcolor" showMasterPhAnim="0" showMasterSp="0">
   <p:cSld>
     <p:spTree>
       <p:nvGrpSpPr>
-        <p:cNvPr id="164" name="Shape 164"/>
+        <p:cNvPr id="179" name="Shape 179"/>
         <p:cNvGrpSpPr/>
         <p:nvPr/>
       </p:nvGrpSpPr>
@@ -1331,7 +1449,7 @@
       </p:grpSpPr>
       <p:sp>
         <p:nvSpPr>
-          <p:cNvPr id="165" name="Google Shape;165;p10:notes"/>
+          <p:cNvPr id="180" name="Google Shape;180;p10:notes"/>
           <p:cNvSpPr/>
           <p:nvPr>
             <p:ph idx="2" type="sldImg"/>
@@ -1376,7 +1494,7 @@
       </p:sp>
       <p:sp>
         <p:nvSpPr>
-          <p:cNvPr id="166" name="Google Shape;166;p10:notes"/>
+          <p:cNvPr id="181" name="Google Shape;181;p10:notes"/>
           <p:cNvSpPr txBox="1"/>
           <p:nvPr>
             <p:ph idx="1" type="body"/>
@@ -1429,12 +1547,12 @@
 </p:notes>
 </file>
 
-<file path=ppt/notesSlides/notesSlide14.xml><?xml version="1.0" encoding="utf-8"?>
+<file path=ppt/notesSlides/notesSlide15.xml><?xml version="1.0" encoding="utf-8"?>
 <p:notes xmlns:a="http://schemas.openxmlformats.org/drawingml/2006/main" xmlns:r="http://schemas.openxmlformats.org/officeDocument/2006/relationships" xmlns:mc="http://schemas.openxmlformats.org/markup-compatibility/2006" xmlns:mv="urn:schemas-microsoft-com:mac:vml" xmlns:p="http://schemas.openxmlformats.org/presentationml/2006/main" xmlns:c="http://schemas.openxmlformats.org/drawingml/2006/chart" xmlns:dgm="http://schemas.openxmlformats.org/drawingml/2006/diagram" xmlns:o="urn:schemas-microsoft-com:office:office" xmlns:v="urn:schemas-microsoft-com:vml" xmlns:pvml="urn:schemas-microsoft-com:office:powerpoint" xmlns:com="http://schemas.openxmlformats.org/drawingml/2006/compatibility" xmlns:p14="http://schemas.microsoft.com/office/powerpoint/2010/main" xmlns:p15="http://schemas.microsoft.com/office/powerpoint/2012/main" xmlns:ahyp="http://schemas.microsoft.com/office/drawing/2018/hyperlinkcolor" showMasterPhAnim="0" showMasterSp="0">
   <p:cSld>
     <p:spTree>
       <p:nvGrpSpPr>
-        <p:cNvPr id="174" name="Shape 174"/>
+        <p:cNvPr id="189" name="Shape 189"/>
         <p:cNvGrpSpPr/>
         <p:nvPr/>
       </p:nvGrpSpPr>
@@ -1448,7 +1566,7 @@
       </p:grpSpPr>
       <p:sp>
         <p:nvSpPr>
-          <p:cNvPr id="175" name="Google Shape;175;p12:notes"/>
+          <p:cNvPr id="190" name="Google Shape;190;p12:notes"/>
           <p:cNvSpPr/>
           <p:nvPr>
             <p:ph idx="2" type="sldImg"/>
@@ -1493,7 +1611,7 @@
       </p:sp>
       <p:sp>
         <p:nvSpPr>
-          <p:cNvPr id="176" name="Google Shape;176;p12:notes"/>
+          <p:cNvPr id="191" name="Google Shape;191;p12:notes"/>
           <p:cNvSpPr txBox="1"/>
           <p:nvPr>
             <p:ph idx="1" type="body"/>
@@ -2235,7 +2353,7 @@
   <p:cSld>
     <p:spTree>
       <p:nvGrpSpPr>
-        <p:cNvPr id="124" name="Shape 124"/>
+        <p:cNvPr id="128" name="Shape 128"/>
         <p:cNvGrpSpPr/>
         <p:nvPr/>
       </p:nvGrpSpPr>
@@ -2249,7 +2367,7 @@
       </p:grpSpPr>
       <p:sp>
         <p:nvSpPr>
-          <p:cNvPr id="125" name="Google Shape;125;g276e2b878a6_0_7:notes"/>
+          <p:cNvPr id="129" name="Google Shape;129;g276e2b878a6_0_7:notes"/>
           <p:cNvSpPr/>
           <p:nvPr>
             <p:ph idx="2" type="sldImg"/>
@@ -2294,7 +2412,7 @@
       </p:sp>
       <p:sp>
         <p:nvSpPr>
-          <p:cNvPr id="126" name="Google Shape;126;g276e2b878a6_0_7:notes"/>
+          <p:cNvPr id="130" name="Google Shape;130;g276e2b878a6_0_7:notes"/>
           <p:cNvSpPr txBox="1"/>
           <p:nvPr>
             <p:ph idx="1" type="body"/>
@@ -2352,7 +2470,7 @@
   <p:cSld>
     <p:spTree>
       <p:nvGrpSpPr>
-        <p:cNvPr id="135" name="Shape 135"/>
+        <p:cNvPr id="139" name="Shape 139"/>
         <p:cNvGrpSpPr/>
         <p:nvPr/>
       </p:nvGrpSpPr>
@@ -2366,7 +2484,7 @@
       </p:grpSpPr>
       <p:sp>
         <p:nvSpPr>
-          <p:cNvPr id="136" name="Google Shape;136;p6:notes"/>
+          <p:cNvPr id="140" name="Google Shape;140;g36ee14835eb_0_4:notes"/>
           <p:cNvSpPr/>
           <p:nvPr>
             <p:ph idx="2" type="sldImg"/>
@@ -2374,7 +2492,7 @@
         </p:nvSpPr>
         <p:spPr>
           <a:xfrm>
-            <a:off x="381000" y="685800"/>
+            <a:off x="381300" y="685800"/>
             <a:ext cx="6096000" cy="3429000"/>
           </a:xfrm>
           <a:custGeom>
@@ -2397,21 +2515,11 @@
               </a:path>
             </a:pathLst>
           </a:custGeom>
-          <a:noFill/>
-          <a:ln cap="flat" cmpd="sng" w="9525">
-            <a:solidFill>
-              <a:srgbClr val="000000"/>
-            </a:solidFill>
-            <a:prstDash val="solid"/>
-            <a:round/>
-            <a:headEnd len="sm" w="sm" type="none"/>
-            <a:tailEnd len="sm" w="sm" type="none"/>
-          </a:ln>
         </p:spPr>
       </p:sp>
       <p:sp>
         <p:nvSpPr>
-          <p:cNvPr id="137" name="Google Shape;137;p6:notes"/>
+          <p:cNvPr id="141" name="Google Shape;141;g36ee14835eb_0_4:notes"/>
           <p:cNvSpPr txBox="1"/>
           <p:nvPr>
             <p:ph idx="1" type="body"/>
@@ -2425,10 +2533,6 @@
           <a:prstGeom prst="rect">
             <a:avLst/>
           </a:prstGeom>
-          <a:noFill/>
-          <a:ln>
-            <a:noFill/>
-          </a:ln>
         </p:spPr>
         <p:txBody>
           <a:bodyPr anchorCtr="0" anchor="t" bIns="91425" lIns="91425" spcFirstLastPara="1" rIns="91425" wrap="square" tIns="91425">
@@ -2437,16 +2541,12 @@
           <a:lstStyle/>
           <a:p>
             <a:pPr indent="0" lvl="0" marL="0" rtl="0" algn="l">
-              <a:lnSpc>
-                <a:spcPct val="100000"/>
-              </a:lnSpc>
-              <a:spcBef>
-                <a:spcPts val="0"/>
-              </a:spcBef>
-              <a:spcAft>
-                <a:spcPts val="0"/>
-              </a:spcAft>
-              <a:buSzPts val="1100"/>
+              <a:spcBef>
+                <a:spcPts val="0"/>
+              </a:spcBef>
+              <a:spcAft>
+                <a:spcPts val="0"/>
+              </a:spcAft>
               <a:buNone/>
             </a:pPr>
             <a:r>
@@ -10736,7 +10836,7 @@
   <p:cSld>
     <p:spTree>
       <p:nvGrpSpPr>
-        <p:cNvPr id="146" name="Shape 146"/>
+        <p:cNvPr id="153" name="Shape 153"/>
         <p:cNvGrpSpPr/>
         <p:nvPr/>
       </p:nvGrpSpPr>
@@ -10750,7 +10850,7 @@
       </p:grpSpPr>
       <p:sp>
         <p:nvSpPr>
-          <p:cNvPr id="147" name="Google Shape;147;g255c330574c_0_0"/>
+          <p:cNvPr id="154" name="Google Shape;154;p6"/>
           <p:cNvSpPr txBox="1"/>
           <p:nvPr>
             <p:ph type="title"/>
@@ -10785,6 +10885,262 @@
               <a:spcAft>
                 <a:spcPts val="0"/>
               </a:spcAft>
+              <a:buClr>
+                <a:srgbClr val="000000"/>
+              </a:buClr>
+              <a:buSzPct val="111111"/>
+              <a:buFont typeface="Arial"/>
+              <a:buNone/>
+            </a:pPr>
+            <a:r>
+              <a:rPr lang="en"/>
+              <a:t>R you ready to learn some R?</a:t>
+            </a:r>
+            <a:endParaRPr b="1"/>
+          </a:p>
+        </p:txBody>
+      </p:sp>
+      <p:sp>
+        <p:nvSpPr>
+          <p:cNvPr id="155" name="Google Shape;155;p6"/>
+          <p:cNvSpPr txBox="1"/>
+          <p:nvPr>
+            <p:ph idx="1" type="body"/>
+          </p:nvPr>
+        </p:nvSpPr>
+        <p:spPr>
+          <a:xfrm>
+            <a:off x="311700" y="1152475"/>
+            <a:ext cx="8832300" cy="3416400"/>
+          </a:xfrm>
+          <a:prstGeom prst="rect">
+            <a:avLst/>
+          </a:prstGeom>
+          <a:noFill/>
+          <a:ln>
+            <a:noFill/>
+          </a:ln>
+        </p:spPr>
+        <p:txBody>
+          <a:bodyPr anchorCtr="0" anchor="t" bIns="91425" lIns="91425" spcFirstLastPara="1" rIns="91425" wrap="square" tIns="91425">
+            <a:normAutofit/>
+          </a:bodyPr>
+          <a:lstStyle/>
+          <a:p>
+            <a:pPr indent="-355600" lvl="0" marL="457200" rtl="0" algn="l">
+              <a:lnSpc>
+                <a:spcPct val="115000"/>
+              </a:lnSpc>
+              <a:spcBef>
+                <a:spcPts val="0"/>
+              </a:spcBef>
+              <a:spcAft>
+                <a:spcPts val="0"/>
+              </a:spcAft>
+              <a:buSzPts val="2000"/>
+              <a:buChar char="●"/>
+            </a:pPr>
+            <a:r>
+              <a:rPr lang="en" sz="2000"/>
+              <a:t>Let’s go over the </a:t>
+            </a:r>
+            <a:r>
+              <a:rPr lang="en" sz="2000">
+                <a:solidFill>
+                  <a:srgbClr val="1155CC"/>
+                </a:solidFill>
+                <a:latin typeface="Consolas"/>
+                <a:ea typeface="Consolas"/>
+                <a:cs typeface="Consolas"/>
+                <a:sym typeface="Consolas"/>
+              </a:rPr>
+              <a:t>Day6_worksheet1_Introduction_to_R.md </a:t>
+            </a:r>
+            <a:r>
+              <a:rPr lang="en" sz="2000"/>
+              <a:t>worksheet:</a:t>
+            </a:r>
+            <a:endParaRPr sz="2000"/>
+          </a:p>
+          <a:p>
+            <a:pPr indent="-355600" lvl="1" marL="914400" rtl="0" algn="l">
+              <a:lnSpc>
+                <a:spcPct val="115000"/>
+              </a:lnSpc>
+              <a:spcBef>
+                <a:spcPts val="0"/>
+              </a:spcBef>
+              <a:spcAft>
+                <a:spcPts val="0"/>
+              </a:spcAft>
+              <a:buSzPts val="2000"/>
+              <a:buChar char="○"/>
+            </a:pPr>
+            <a:r>
+              <a:rPr lang="en" sz="2000"/>
+              <a:t>Introduction to R in the terminal</a:t>
+            </a:r>
+            <a:endParaRPr sz="2000"/>
+          </a:p>
+          <a:p>
+            <a:pPr indent="-355600" lvl="1" marL="914400" rtl="0" algn="l">
+              <a:lnSpc>
+                <a:spcPct val="115000"/>
+              </a:lnSpc>
+              <a:spcBef>
+                <a:spcPts val="0"/>
+              </a:spcBef>
+              <a:spcAft>
+                <a:spcPts val="0"/>
+              </a:spcAft>
+              <a:buSzPts val="2000"/>
+              <a:buChar char="○"/>
+            </a:pPr>
+            <a:r>
+              <a:rPr lang="en" sz="2000"/>
+              <a:t>Learn basic R commands</a:t>
+            </a:r>
+            <a:endParaRPr sz="2000"/>
+          </a:p>
+        </p:txBody>
+      </p:sp>
+      <p:sp>
+        <p:nvSpPr>
+          <p:cNvPr id="156" name="Google Shape;156;p6"/>
+          <p:cNvSpPr txBox="1"/>
+          <p:nvPr>
+            <p:ph idx="1" type="body"/>
+          </p:nvPr>
+        </p:nvSpPr>
+        <p:spPr>
+          <a:xfrm>
+            <a:off x="3398550" y="4640400"/>
+            <a:ext cx="2346900" cy="495900"/>
+          </a:xfrm>
+          <a:prstGeom prst="rect">
+            <a:avLst/>
+          </a:prstGeom>
+          <a:noFill/>
+          <a:ln>
+            <a:noFill/>
+          </a:ln>
+        </p:spPr>
+        <p:txBody>
+          <a:bodyPr anchorCtr="0" anchor="t" bIns="91425" lIns="91425" spcFirstLastPara="1" rIns="91425" wrap="square" tIns="91425">
+            <a:normAutofit/>
+          </a:bodyPr>
+          <a:lstStyle/>
+          <a:p>
+            <a:pPr indent="0" lvl="0" marL="0" rtl="0" algn="ctr">
+              <a:lnSpc>
+                <a:spcPct val="115000"/>
+              </a:lnSpc>
+              <a:spcBef>
+                <a:spcPts val="0"/>
+              </a:spcBef>
+              <a:spcAft>
+                <a:spcPts val="1200"/>
+              </a:spcAft>
+              <a:buSzPts val="1800"/>
+              <a:buNone/>
+            </a:pPr>
+            <a:r>
+              <a:rPr lang="en"/>
+              <a:t>R console</a:t>
+            </a:r>
+            <a:endParaRPr/>
+          </a:p>
+        </p:txBody>
+      </p:sp>
+      <p:pic>
+        <p:nvPicPr>
+          <p:cNvPr id="157" name="Google Shape;157;p6"/>
+          <p:cNvPicPr preferRelativeResize="0"/>
+          <p:nvPr/>
+        </p:nvPicPr>
+        <p:blipFill rotWithShape="1">
+          <a:blip r:embed="rId3">
+            <a:alphaModFix/>
+          </a:blip>
+          <a:srcRect b="0" l="0" r="0" t="0"/>
+          <a:stretch/>
+        </p:blipFill>
+        <p:spPr>
+          <a:xfrm>
+            <a:off x="3249225" y="2627825"/>
+            <a:ext cx="2645556" cy="2012567"/>
+          </a:xfrm>
+          <a:prstGeom prst="rect">
+            <a:avLst/>
+          </a:prstGeom>
+          <a:noFill/>
+          <a:ln>
+            <a:noFill/>
+          </a:ln>
+        </p:spPr>
+      </p:pic>
+    </p:spTree>
+  </p:cSld>
+  <p:clrMapOvr>
+    <a:masterClrMapping/>
+  </p:clrMapOvr>
+</p:sld>
+</file>
+
+<file path=ppt/slides/slide11.xml><?xml version="1.0" encoding="utf-8"?>
+<p:sld xmlns:a="http://schemas.openxmlformats.org/drawingml/2006/main" xmlns:r="http://schemas.openxmlformats.org/officeDocument/2006/relationships" xmlns:mc="http://schemas.openxmlformats.org/markup-compatibility/2006" xmlns:mv="urn:schemas-microsoft-com:mac:vml" xmlns:p="http://schemas.openxmlformats.org/presentationml/2006/main" xmlns:c="http://schemas.openxmlformats.org/drawingml/2006/chart" xmlns:dgm="http://schemas.openxmlformats.org/drawingml/2006/diagram" xmlns:o="urn:schemas-microsoft-com:office:office" xmlns:v="urn:schemas-microsoft-com:vml" xmlns:pvml="urn:schemas-microsoft-com:office:powerpoint" xmlns:com="http://schemas.openxmlformats.org/drawingml/2006/compatibility" xmlns:p14="http://schemas.microsoft.com/office/powerpoint/2010/main" xmlns:p15="http://schemas.microsoft.com/office/powerpoint/2012/main" xmlns:ahyp="http://schemas.microsoft.com/office/drawing/2018/hyperlinkcolor">
+  <p:cSld>
+    <p:spTree>
+      <p:nvGrpSpPr>
+        <p:cNvPr id="161" name="Shape 161"/>
+        <p:cNvGrpSpPr/>
+        <p:nvPr/>
+      </p:nvGrpSpPr>
+      <p:grpSpPr>
+        <a:xfrm>
+          <a:off x="0" y="0"/>
+          <a:ext cx="0" cy="0"/>
+          <a:chOff x="0" y="0"/>
+          <a:chExt cx="0" cy="0"/>
+        </a:xfrm>
+      </p:grpSpPr>
+      <p:sp>
+        <p:nvSpPr>
+          <p:cNvPr id="162" name="Google Shape;162;g255c330574c_0_0"/>
+          <p:cNvSpPr txBox="1"/>
+          <p:nvPr>
+            <p:ph type="title"/>
+          </p:nvPr>
+        </p:nvSpPr>
+        <p:spPr>
+          <a:xfrm>
+            <a:off x="311700" y="219900"/>
+            <a:ext cx="8520600" cy="572700"/>
+          </a:xfrm>
+          <a:prstGeom prst="rect">
+            <a:avLst/>
+          </a:prstGeom>
+          <a:noFill/>
+          <a:ln>
+            <a:noFill/>
+          </a:ln>
+        </p:spPr>
+        <p:txBody>
+          <a:bodyPr anchorCtr="0" anchor="t" bIns="91425" lIns="91425" spcFirstLastPara="1" rIns="91425" wrap="square" tIns="91425">
+            <a:normAutofit fontScale="90000"/>
+          </a:bodyPr>
+          <a:lstStyle/>
+          <a:p>
+            <a:pPr indent="0" lvl="0" marL="0" rtl="0" algn="ctr">
+              <a:lnSpc>
+                <a:spcPct val="100000"/>
+              </a:lnSpc>
+              <a:spcBef>
+                <a:spcPts val="0"/>
+              </a:spcBef>
+              <a:spcAft>
+                <a:spcPts val="0"/>
+              </a:spcAft>
               <a:buSzPct val="111111"/>
               <a:buNone/>
             </a:pPr>
@@ -10798,7 +11154,7 @@
       </p:sp>
       <p:sp>
         <p:nvSpPr>
-          <p:cNvPr id="148" name="Google Shape;148;g255c330574c_0_0"/>
+          <p:cNvPr id="163" name="Google Shape;163;g255c330574c_0_0"/>
           <p:cNvSpPr txBox="1"/>
           <p:nvPr>
             <p:ph idx="1" type="body"/>
@@ -11078,7 +11434,7 @@
       </p:sp>
       <p:pic>
         <p:nvPicPr>
-          <p:cNvPr id="149" name="Google Shape;149;g255c330574c_0_0"/>
+          <p:cNvPr id="164" name="Google Shape;164;g255c330574c_0_0"/>
           <p:cNvPicPr preferRelativeResize="0"/>
           <p:nvPr/>
         </p:nvPicPr>
@@ -11118,7 +11474,7 @@
       </p:pic>
       <p:sp>
         <p:nvSpPr>
-          <p:cNvPr id="150" name="Google Shape;150;g255c330574c_0_0"/>
+          <p:cNvPr id="165" name="Google Shape;165;g255c330574c_0_0"/>
           <p:cNvSpPr txBox="1"/>
           <p:nvPr>
             <p:ph idx="1" type="body"/>
@@ -11172,12 +11528,12 @@
 </p:sld>
 </file>
 
-<file path=ppt/slides/slide11.xml><?xml version="1.0" encoding="utf-8"?>
+<file path=ppt/slides/slide12.xml><?xml version="1.0" encoding="utf-8"?>
 <p:sld xmlns:a="http://schemas.openxmlformats.org/drawingml/2006/main" xmlns:r="http://schemas.openxmlformats.org/officeDocument/2006/relationships" xmlns:mc="http://schemas.openxmlformats.org/markup-compatibility/2006" xmlns:mv="urn:schemas-microsoft-com:mac:vml" xmlns:p="http://schemas.openxmlformats.org/presentationml/2006/main" xmlns:c="http://schemas.openxmlformats.org/drawingml/2006/chart" xmlns:dgm="http://schemas.openxmlformats.org/drawingml/2006/diagram" xmlns:o="urn:schemas-microsoft-com:office:office" xmlns:v="urn:schemas-microsoft-com:vml" xmlns:pvml="urn:schemas-microsoft-com:office:powerpoint" xmlns:com="http://schemas.openxmlformats.org/drawingml/2006/compatibility" xmlns:p14="http://schemas.microsoft.com/office/powerpoint/2010/main" xmlns:p15="http://schemas.microsoft.com/office/powerpoint/2012/main" xmlns:ahyp="http://schemas.microsoft.com/office/drawing/2018/hyperlinkcolor">
   <p:cSld>
     <p:spTree>
       <p:nvGrpSpPr>
-        <p:cNvPr id="154" name="Shape 154"/>
+        <p:cNvPr id="169" name="Shape 169"/>
         <p:cNvGrpSpPr/>
         <p:nvPr/>
       </p:nvGrpSpPr>
@@ -11191,7 +11547,7 @@
       </p:grpSpPr>
       <p:sp>
         <p:nvSpPr>
-          <p:cNvPr id="155" name="Google Shape;155;g255c330574c_0_61"/>
+          <p:cNvPr id="170" name="Google Shape;170;g255c330574c_0_61"/>
           <p:cNvSpPr txBox="1"/>
           <p:nvPr>
             <p:ph type="title"/>
@@ -11239,7 +11595,7 @@
       </p:sp>
       <p:sp>
         <p:nvSpPr>
-          <p:cNvPr id="156" name="Google Shape;156;g255c330574c_0_61"/>
+          <p:cNvPr id="171" name="Google Shape;171;g255c330574c_0_61"/>
           <p:cNvSpPr txBox="1"/>
           <p:nvPr>
             <p:ph idx="1" type="body"/>
@@ -11313,12 +11669,12 @@
 </p:sld>
 </file>
 
-<file path=ppt/slides/slide12.xml><?xml version="1.0" encoding="utf-8"?>
+<file path=ppt/slides/slide13.xml><?xml version="1.0" encoding="utf-8"?>
 <p:sld xmlns:a="http://schemas.openxmlformats.org/drawingml/2006/main" xmlns:r="http://schemas.openxmlformats.org/officeDocument/2006/relationships" xmlns:mc="http://schemas.openxmlformats.org/markup-compatibility/2006" xmlns:mv="urn:schemas-microsoft-com:mac:vml" xmlns:p="http://schemas.openxmlformats.org/presentationml/2006/main" xmlns:c="http://schemas.openxmlformats.org/drawingml/2006/chart" xmlns:dgm="http://schemas.openxmlformats.org/drawingml/2006/diagram" xmlns:o="urn:schemas-microsoft-com:office:office" xmlns:v="urn:schemas-microsoft-com:vml" xmlns:pvml="urn:schemas-microsoft-com:office:powerpoint" xmlns:com="http://schemas.openxmlformats.org/drawingml/2006/compatibility" xmlns:p14="http://schemas.microsoft.com/office/powerpoint/2010/main" xmlns:p15="http://schemas.microsoft.com/office/powerpoint/2012/main" xmlns:ahyp="http://schemas.microsoft.com/office/drawing/2018/hyperlinkcolor">
   <p:cSld>
     <p:spTree>
       <p:nvGrpSpPr>
-        <p:cNvPr id="160" name="Shape 160"/>
+        <p:cNvPr id="175" name="Shape 175"/>
         <p:cNvGrpSpPr/>
         <p:nvPr/>
       </p:nvGrpSpPr>
@@ -11332,7 +11688,7 @@
       </p:grpSpPr>
       <p:sp>
         <p:nvSpPr>
-          <p:cNvPr id="161" name="Google Shape;161;g255c330574c_0_11"/>
+          <p:cNvPr id="176" name="Google Shape;176;g255c330574c_0_11"/>
           <p:cNvSpPr txBox="1"/>
           <p:nvPr>
             <p:ph type="title"/>
@@ -11380,7 +11736,7 @@
       </p:sp>
       <p:sp>
         <p:nvSpPr>
-          <p:cNvPr id="162" name="Google Shape;162;g255c330574c_0_11"/>
+          <p:cNvPr id="177" name="Google Shape;177;g255c330574c_0_11"/>
           <p:cNvSpPr txBox="1"/>
           <p:nvPr>
             <p:ph idx="1" type="body"/>
@@ -11600,7 +11956,7 @@
       </p:sp>
       <p:pic>
         <p:nvPicPr>
-          <p:cNvPr id="163" name="Google Shape;163;g255c330574c_0_11"/>
+          <p:cNvPr id="178" name="Google Shape;178;g255c330574c_0_11"/>
           <p:cNvPicPr preferRelativeResize="0"/>
           <p:nvPr/>
         </p:nvPicPr>
@@ -11633,12 +11989,12 @@
 </p:sld>
 </file>
 
-<file path=ppt/slides/slide13.xml><?xml version="1.0" encoding="utf-8"?>
+<file path=ppt/slides/slide14.xml><?xml version="1.0" encoding="utf-8"?>
 <p:sld xmlns:a="http://schemas.openxmlformats.org/drawingml/2006/main" xmlns:r="http://schemas.openxmlformats.org/officeDocument/2006/relationships" xmlns:mc="http://schemas.openxmlformats.org/markup-compatibility/2006" xmlns:mv="urn:schemas-microsoft-com:mac:vml" xmlns:p="http://schemas.openxmlformats.org/presentationml/2006/main" xmlns:c="http://schemas.openxmlformats.org/drawingml/2006/chart" xmlns:dgm="http://schemas.openxmlformats.org/drawingml/2006/diagram" xmlns:o="urn:schemas-microsoft-com:office:office" xmlns:v="urn:schemas-microsoft-com:vml" xmlns:pvml="urn:schemas-microsoft-com:office:powerpoint" xmlns:com="http://schemas.openxmlformats.org/drawingml/2006/compatibility" xmlns:p14="http://schemas.microsoft.com/office/powerpoint/2010/main" xmlns:p15="http://schemas.microsoft.com/office/powerpoint/2012/main" xmlns:ahyp="http://schemas.microsoft.com/office/drawing/2018/hyperlinkcolor">
   <p:cSld>
     <p:spTree>
       <p:nvGrpSpPr>
-        <p:cNvPr id="167" name="Shape 167"/>
+        <p:cNvPr id="182" name="Shape 182"/>
         <p:cNvGrpSpPr/>
         <p:nvPr/>
       </p:nvGrpSpPr>
@@ -11652,7 +12008,7 @@
       </p:grpSpPr>
       <p:sp>
         <p:nvSpPr>
-          <p:cNvPr id="168" name="Google Shape;168;p10"/>
+          <p:cNvPr id="183" name="Google Shape;183;p10"/>
           <p:cNvSpPr txBox="1"/>
           <p:nvPr/>
         </p:nvSpPr>
@@ -11926,7 +12282,7 @@
       </p:sp>
       <p:pic>
         <p:nvPicPr>
-          <p:cNvPr id="169" name="Google Shape;169;p10"/>
+          <p:cNvPr id="184" name="Google Shape;184;p10"/>
           <p:cNvPicPr preferRelativeResize="0"/>
           <p:nvPr/>
         </p:nvPicPr>
@@ -11953,7 +12309,7 @@
       </p:pic>
       <p:pic>
         <p:nvPicPr>
-          <p:cNvPr id="170" name="Google Shape;170;p10"/>
+          <p:cNvPr id="185" name="Google Shape;185;p10"/>
           <p:cNvPicPr preferRelativeResize="0"/>
           <p:nvPr/>
         </p:nvPicPr>
@@ -11980,7 +12336,7 @@
       </p:pic>
       <p:pic>
         <p:nvPicPr>
-          <p:cNvPr id="171" name="Google Shape;171;p10"/>
+          <p:cNvPr id="186" name="Google Shape;186;p10"/>
           <p:cNvPicPr preferRelativeResize="0"/>
           <p:nvPr/>
         </p:nvPicPr>
@@ -12007,7 +12363,7 @@
       </p:pic>
       <p:pic>
         <p:nvPicPr>
-          <p:cNvPr id="172" name="Google Shape;172;p10"/>
+          <p:cNvPr id="187" name="Google Shape;187;p10"/>
           <p:cNvPicPr preferRelativeResize="0"/>
           <p:nvPr/>
         </p:nvPicPr>
@@ -12034,7 +12390,7 @@
       </p:pic>
       <p:sp>
         <p:nvSpPr>
-          <p:cNvPr id="173" name="Google Shape;173;p10"/>
+          <p:cNvPr id="188" name="Google Shape;188;p10"/>
           <p:cNvSpPr txBox="1"/>
           <p:nvPr>
             <p:ph type="title"/>
@@ -12088,12 +12444,12 @@
 </p:sld>
 </file>
 
-<file path=ppt/slides/slide14.xml><?xml version="1.0" encoding="utf-8"?>
+<file path=ppt/slides/slide15.xml><?xml version="1.0" encoding="utf-8"?>
 <p:sld xmlns:a="http://schemas.openxmlformats.org/drawingml/2006/main" xmlns:r="http://schemas.openxmlformats.org/officeDocument/2006/relationships" xmlns:mc="http://schemas.openxmlformats.org/markup-compatibility/2006" xmlns:mv="urn:schemas-microsoft-com:mac:vml" xmlns:p="http://schemas.openxmlformats.org/presentationml/2006/main" xmlns:c="http://schemas.openxmlformats.org/drawingml/2006/chart" xmlns:dgm="http://schemas.openxmlformats.org/drawingml/2006/diagram" xmlns:o="urn:schemas-microsoft-com:office:office" xmlns:v="urn:schemas-microsoft-com:vml" xmlns:pvml="urn:schemas-microsoft-com:office:powerpoint" xmlns:com="http://schemas.openxmlformats.org/drawingml/2006/compatibility" xmlns:p14="http://schemas.microsoft.com/office/powerpoint/2010/main" xmlns:p15="http://schemas.microsoft.com/office/powerpoint/2012/main" xmlns:ahyp="http://schemas.microsoft.com/office/drawing/2018/hyperlinkcolor">
   <p:cSld>
     <p:spTree>
       <p:nvGrpSpPr>
-        <p:cNvPr id="177" name="Shape 177"/>
+        <p:cNvPr id="192" name="Shape 192"/>
         <p:cNvGrpSpPr/>
         <p:nvPr/>
       </p:nvGrpSpPr>
@@ -12107,7 +12463,7 @@
       </p:grpSpPr>
       <p:sp>
         <p:nvSpPr>
-          <p:cNvPr id="178" name="Google Shape;178;p12"/>
+          <p:cNvPr id="193" name="Google Shape;193;p12"/>
           <p:cNvSpPr txBox="1"/>
           <p:nvPr>
             <p:ph type="title"/>
@@ -12155,7 +12511,7 @@
       </p:sp>
       <p:sp>
         <p:nvSpPr>
-          <p:cNvPr id="179" name="Google Shape;179;p12"/>
+          <p:cNvPr id="194" name="Google Shape;194;p12"/>
           <p:cNvSpPr txBox="1"/>
           <p:nvPr>
             <p:ph idx="1" type="body"/>
@@ -13153,7 +13509,7 @@
             </a:pPr>
             <a:r>
               <a:rPr lang="en" sz="2000"/>
-              <a:t>Practice installing packages, tidying data, saving files and plotting.</a:t>
+              <a:t>Practice installing packages, tidying data, plotting and saving files.</a:t>
             </a:r>
             <a:endParaRPr sz="2000"/>
           </a:p>
@@ -14418,6 +14774,495 @@
   <p:clrMapOvr>
     <a:masterClrMapping/>
   </p:clrMapOvr>
+  <p:timing>
+    <p:tnLst>
+      <p:par>
+        <p:cTn dur="indefinite" nodeType="tmRoot" restart="never">
+          <p:childTnLst>
+            <p:seq concurrent="1" nextAc="seek">
+              <p:cTn dur="indefinite" id="2" nodeType="mainSeq">
+                <p:childTnLst>
+                  <p:par>
+                    <p:cTn fill="hold">
+                      <p:stCondLst>
+                        <p:cond delay="indefinite"/>
+                      </p:stCondLst>
+                      <p:childTnLst>
+                        <p:par>
+                          <p:cTn fill="hold">
+                            <p:stCondLst>
+                              <p:cond delay="0"/>
+                            </p:stCondLst>
+                            <p:childTnLst>
+                              <p:par>
+                                <p:cTn fill="hold" nodeType="clickEffect" presetClass="entr" presetID="1" presetSubtype="0">
+                                  <p:stCondLst>
+                                    <p:cond delay="0"/>
+                                  </p:stCondLst>
+                                  <p:childTnLst>
+                                    <p:set>
+                                      <p:cBhvr>
+                                        <p:cTn dur="1" fill="hold">
+                                          <p:stCondLst>
+                                            <p:cond delay="0"/>
+                                          </p:stCondLst>
+                                        </p:cTn>
+                                        <p:tgtEl>
+                                          <p:spTgt spid="95"/>
+                                        </p:tgtEl>
+                                        <p:attrNameLst>
+                                          <p:attrName>style.visibility</p:attrName>
+                                        </p:attrNameLst>
+                                      </p:cBhvr>
+                                      <p:to>
+                                        <p:strVal val="visible"/>
+                                      </p:to>
+                                    </p:set>
+                                  </p:childTnLst>
+                                </p:cTn>
+                              </p:par>
+                              <p:par>
+                                <p:cTn fill="hold" nodeType="withEffect" presetClass="entr" presetID="1" presetSubtype="0">
+                                  <p:stCondLst>
+                                    <p:cond delay="0"/>
+                                  </p:stCondLst>
+                                  <p:childTnLst>
+                                    <p:set>
+                                      <p:cBhvr>
+                                        <p:cTn dur="1" fill="hold">
+                                          <p:stCondLst>
+                                            <p:cond delay="0"/>
+                                          </p:stCondLst>
+                                        </p:cTn>
+                                        <p:tgtEl>
+                                          <p:spTgt spid="98"/>
+                                        </p:tgtEl>
+                                        <p:attrNameLst>
+                                          <p:attrName>style.visibility</p:attrName>
+                                        </p:attrNameLst>
+                                      </p:cBhvr>
+                                      <p:to>
+                                        <p:strVal val="visible"/>
+                                      </p:to>
+                                    </p:set>
+                                  </p:childTnLst>
+                                </p:cTn>
+                              </p:par>
+                              <p:par>
+                                <p:cTn fill="hold" nodeType="withEffect" presetClass="entr" presetID="1" presetSubtype="0">
+                                  <p:stCondLst>
+                                    <p:cond delay="0"/>
+                                  </p:stCondLst>
+                                  <p:childTnLst>
+                                    <p:set>
+                                      <p:cBhvr>
+                                        <p:cTn dur="1" fill="hold">
+                                          <p:stCondLst>
+                                            <p:cond delay="0"/>
+                                          </p:stCondLst>
+                                        </p:cTn>
+                                        <p:tgtEl>
+                                          <p:spTgt spid="99"/>
+                                        </p:tgtEl>
+                                        <p:attrNameLst>
+                                          <p:attrName>style.visibility</p:attrName>
+                                        </p:attrNameLst>
+                                      </p:cBhvr>
+                                      <p:to>
+                                        <p:strVal val="visible"/>
+                                      </p:to>
+                                    </p:set>
+                                  </p:childTnLst>
+                                </p:cTn>
+                              </p:par>
+                              <p:par>
+                                <p:cTn fill="hold" nodeType="withEffect" presetClass="entr" presetID="1" presetSubtype="0">
+                                  <p:stCondLst>
+                                    <p:cond delay="0"/>
+                                  </p:stCondLst>
+                                  <p:childTnLst>
+                                    <p:set>
+                                      <p:cBhvr>
+                                        <p:cTn dur="1" fill="hold">
+                                          <p:stCondLst>
+                                            <p:cond delay="0"/>
+                                          </p:stCondLst>
+                                        </p:cTn>
+                                        <p:tgtEl>
+                                          <p:spTgt spid="100"/>
+                                        </p:tgtEl>
+                                        <p:attrNameLst>
+                                          <p:attrName>style.visibility</p:attrName>
+                                        </p:attrNameLst>
+                                      </p:cBhvr>
+                                      <p:to>
+                                        <p:strVal val="visible"/>
+                                      </p:to>
+                                    </p:set>
+                                  </p:childTnLst>
+                                </p:cTn>
+                              </p:par>
+                              <p:par>
+                                <p:cTn fill="hold" nodeType="withEffect" presetClass="entr" presetID="1" presetSubtype="0">
+                                  <p:stCondLst>
+                                    <p:cond delay="0"/>
+                                  </p:stCondLst>
+                                  <p:childTnLst>
+                                    <p:set>
+                                      <p:cBhvr>
+                                        <p:cTn dur="1" fill="hold">
+                                          <p:stCondLst>
+                                            <p:cond delay="0"/>
+                                          </p:stCondLst>
+                                        </p:cTn>
+                                        <p:tgtEl>
+                                          <p:spTgt spid="103"/>
+                                        </p:tgtEl>
+                                        <p:attrNameLst>
+                                          <p:attrName>style.visibility</p:attrName>
+                                        </p:attrNameLst>
+                                      </p:cBhvr>
+                                      <p:to>
+                                        <p:strVal val="visible"/>
+                                      </p:to>
+                                    </p:set>
+                                  </p:childTnLst>
+                                </p:cTn>
+                              </p:par>
+                            </p:childTnLst>
+                          </p:cTn>
+                        </p:par>
+                      </p:childTnLst>
+                    </p:cTn>
+                  </p:par>
+                  <p:par>
+                    <p:cTn fill="hold">
+                      <p:stCondLst>
+                        <p:cond delay="indefinite"/>
+                      </p:stCondLst>
+                      <p:childTnLst>
+                        <p:par>
+                          <p:cTn fill="hold">
+                            <p:stCondLst>
+                              <p:cond delay="0"/>
+                            </p:stCondLst>
+                            <p:childTnLst>
+                              <p:par>
+                                <p:cTn fill="hold" nodeType="clickEffect" presetClass="entr" presetID="1" presetSubtype="0">
+                                  <p:stCondLst>
+                                    <p:cond delay="0"/>
+                                  </p:stCondLst>
+                                  <p:childTnLst>
+                                    <p:set>
+                                      <p:cBhvr>
+                                        <p:cTn dur="1" fill="hold">
+                                          <p:stCondLst>
+                                            <p:cond delay="0"/>
+                                          </p:stCondLst>
+                                        </p:cTn>
+                                        <p:tgtEl>
+                                          <p:spTgt spid="105"/>
+                                        </p:tgtEl>
+                                        <p:attrNameLst>
+                                          <p:attrName>style.visibility</p:attrName>
+                                        </p:attrNameLst>
+                                      </p:cBhvr>
+                                      <p:to>
+                                        <p:strVal val="visible"/>
+                                      </p:to>
+                                    </p:set>
+                                  </p:childTnLst>
+                                </p:cTn>
+                              </p:par>
+                              <p:par>
+                                <p:cTn fill="hold" nodeType="withEffect" presetClass="entr" presetID="1" presetSubtype="0">
+                                  <p:stCondLst>
+                                    <p:cond delay="0"/>
+                                  </p:stCondLst>
+                                  <p:childTnLst>
+                                    <p:set>
+                                      <p:cBhvr>
+                                        <p:cTn dur="1" fill="hold">
+                                          <p:stCondLst>
+                                            <p:cond delay="0"/>
+                                          </p:stCondLst>
+                                        </p:cTn>
+                                        <p:tgtEl>
+                                          <p:spTgt spid="106"/>
+                                        </p:tgtEl>
+                                        <p:attrNameLst>
+                                          <p:attrName>style.visibility</p:attrName>
+                                        </p:attrNameLst>
+                                      </p:cBhvr>
+                                      <p:to>
+                                        <p:strVal val="visible"/>
+                                      </p:to>
+                                    </p:set>
+                                  </p:childTnLst>
+                                </p:cTn>
+                              </p:par>
+                              <p:par>
+                                <p:cTn fill="hold" nodeType="withEffect" presetClass="entr" presetID="1" presetSubtype="0">
+                                  <p:stCondLst>
+                                    <p:cond delay="0"/>
+                                  </p:stCondLst>
+                                  <p:childTnLst>
+                                    <p:set>
+                                      <p:cBhvr>
+                                        <p:cTn dur="1" fill="hold">
+                                          <p:stCondLst>
+                                            <p:cond delay="0"/>
+                                          </p:stCondLst>
+                                        </p:cTn>
+                                        <p:tgtEl>
+                                          <p:spTgt spid="107"/>
+                                        </p:tgtEl>
+                                        <p:attrNameLst>
+                                          <p:attrName>style.visibility</p:attrName>
+                                        </p:attrNameLst>
+                                      </p:cBhvr>
+                                      <p:to>
+                                        <p:strVal val="visible"/>
+                                      </p:to>
+                                    </p:set>
+                                  </p:childTnLst>
+                                </p:cTn>
+                              </p:par>
+                              <p:par>
+                                <p:cTn fill="hold" nodeType="withEffect" presetClass="entr" presetID="1" presetSubtype="0">
+                                  <p:stCondLst>
+                                    <p:cond delay="0"/>
+                                  </p:stCondLst>
+                                  <p:childTnLst>
+                                    <p:set>
+                                      <p:cBhvr>
+                                        <p:cTn dur="1" fill="hold">
+                                          <p:stCondLst>
+                                            <p:cond delay="0"/>
+                                          </p:stCondLst>
+                                        </p:cTn>
+                                        <p:tgtEl>
+                                          <p:spTgt spid="109"/>
+                                        </p:tgtEl>
+                                        <p:attrNameLst>
+                                          <p:attrName>style.visibility</p:attrName>
+                                        </p:attrNameLst>
+                                      </p:cBhvr>
+                                      <p:to>
+                                        <p:strVal val="visible"/>
+                                      </p:to>
+                                    </p:set>
+                                  </p:childTnLst>
+                                </p:cTn>
+                              </p:par>
+                            </p:childTnLst>
+                          </p:cTn>
+                        </p:par>
+                      </p:childTnLst>
+                    </p:cTn>
+                  </p:par>
+                  <p:par>
+                    <p:cTn fill="hold">
+                      <p:stCondLst>
+                        <p:cond delay="indefinite"/>
+                      </p:stCondLst>
+                      <p:childTnLst>
+                        <p:par>
+                          <p:cTn fill="hold">
+                            <p:stCondLst>
+                              <p:cond delay="0"/>
+                            </p:stCondLst>
+                            <p:childTnLst>
+                              <p:par>
+                                <p:cTn fill="hold" nodeType="clickEffect" presetClass="entr" presetID="1" presetSubtype="0">
+                                  <p:stCondLst>
+                                    <p:cond delay="0"/>
+                                  </p:stCondLst>
+                                  <p:childTnLst>
+                                    <p:set>
+                                      <p:cBhvr>
+                                        <p:cTn dur="1" fill="hold">
+                                          <p:stCondLst>
+                                            <p:cond delay="0"/>
+                                          </p:stCondLst>
+                                        </p:cTn>
+                                        <p:tgtEl>
+                                          <p:spTgt spid="96"/>
+                                        </p:tgtEl>
+                                        <p:attrNameLst>
+                                          <p:attrName>style.visibility</p:attrName>
+                                        </p:attrNameLst>
+                                      </p:cBhvr>
+                                      <p:to>
+                                        <p:strVal val="visible"/>
+                                      </p:to>
+                                    </p:set>
+                                  </p:childTnLst>
+                                </p:cTn>
+                              </p:par>
+                              <p:par>
+                                <p:cTn fill="hold" nodeType="withEffect" presetClass="entr" presetID="1" presetSubtype="0">
+                                  <p:stCondLst>
+                                    <p:cond delay="0"/>
+                                  </p:stCondLst>
+                                  <p:childTnLst>
+                                    <p:set>
+                                      <p:cBhvr>
+                                        <p:cTn dur="1" fill="hold">
+                                          <p:stCondLst>
+                                            <p:cond delay="0"/>
+                                          </p:stCondLst>
+                                        </p:cTn>
+                                        <p:tgtEl>
+                                          <p:spTgt spid="97"/>
+                                        </p:tgtEl>
+                                        <p:attrNameLst>
+                                          <p:attrName>style.visibility</p:attrName>
+                                        </p:attrNameLst>
+                                      </p:cBhvr>
+                                      <p:to>
+                                        <p:strVal val="visible"/>
+                                      </p:to>
+                                    </p:set>
+                                  </p:childTnLst>
+                                </p:cTn>
+                              </p:par>
+                              <p:par>
+                                <p:cTn fill="hold" nodeType="withEffect" presetClass="entr" presetID="1" presetSubtype="0">
+                                  <p:stCondLst>
+                                    <p:cond delay="0"/>
+                                  </p:stCondLst>
+                                  <p:childTnLst>
+                                    <p:set>
+                                      <p:cBhvr>
+                                        <p:cTn dur="1" fill="hold">
+                                          <p:stCondLst>
+                                            <p:cond delay="0"/>
+                                          </p:stCondLst>
+                                        </p:cTn>
+                                        <p:tgtEl>
+                                          <p:spTgt spid="101"/>
+                                        </p:tgtEl>
+                                        <p:attrNameLst>
+                                          <p:attrName>style.visibility</p:attrName>
+                                        </p:attrNameLst>
+                                      </p:cBhvr>
+                                      <p:to>
+                                        <p:strVal val="visible"/>
+                                      </p:to>
+                                    </p:set>
+                                  </p:childTnLst>
+                                </p:cTn>
+                              </p:par>
+                              <p:par>
+                                <p:cTn fill="hold" nodeType="withEffect" presetClass="entr" presetID="1" presetSubtype="0">
+                                  <p:stCondLst>
+                                    <p:cond delay="0"/>
+                                  </p:stCondLst>
+                                  <p:childTnLst>
+                                    <p:set>
+                                      <p:cBhvr>
+                                        <p:cTn dur="1" fill="hold">
+                                          <p:stCondLst>
+                                            <p:cond delay="0"/>
+                                          </p:stCondLst>
+                                        </p:cTn>
+                                        <p:tgtEl>
+                                          <p:spTgt spid="102"/>
+                                        </p:tgtEl>
+                                        <p:attrNameLst>
+                                          <p:attrName>style.visibility</p:attrName>
+                                        </p:attrNameLst>
+                                      </p:cBhvr>
+                                      <p:to>
+                                        <p:strVal val="visible"/>
+                                      </p:to>
+                                    </p:set>
+                                  </p:childTnLst>
+                                </p:cTn>
+                              </p:par>
+                              <p:par>
+                                <p:cTn fill="hold" nodeType="withEffect" presetClass="entr" presetID="1" presetSubtype="0">
+                                  <p:stCondLst>
+                                    <p:cond delay="0"/>
+                                  </p:stCondLst>
+                                  <p:childTnLst>
+                                    <p:set>
+                                      <p:cBhvr>
+                                        <p:cTn dur="1" fill="hold">
+                                          <p:stCondLst>
+                                            <p:cond delay="0"/>
+                                          </p:stCondLst>
+                                        </p:cTn>
+                                        <p:tgtEl>
+                                          <p:spTgt spid="108"/>
+                                        </p:tgtEl>
+                                        <p:attrNameLst>
+                                          <p:attrName>style.visibility</p:attrName>
+                                        </p:attrNameLst>
+                                      </p:cBhvr>
+                                      <p:to>
+                                        <p:strVal val="visible"/>
+                                      </p:to>
+                                    </p:set>
+                                  </p:childTnLst>
+                                </p:cTn>
+                              </p:par>
+                              <p:par>
+                                <p:cTn fill="hold" nodeType="withEffect" presetClass="entr" presetID="1" presetSubtype="0">
+                                  <p:stCondLst>
+                                    <p:cond delay="0"/>
+                                  </p:stCondLst>
+                                  <p:childTnLst>
+                                    <p:set>
+                                      <p:cBhvr>
+                                        <p:cTn dur="1" fill="hold">
+                                          <p:stCondLst>
+                                            <p:cond delay="0"/>
+                                          </p:stCondLst>
+                                        </p:cTn>
+                                        <p:tgtEl>
+                                          <p:spTgt spid="104"/>
+                                        </p:tgtEl>
+                                        <p:attrNameLst>
+                                          <p:attrName>style.visibility</p:attrName>
+                                        </p:attrNameLst>
+                                      </p:cBhvr>
+                                      <p:to>
+                                        <p:strVal val="visible"/>
+                                      </p:to>
+                                    </p:set>
+                                  </p:childTnLst>
+                                </p:cTn>
+                              </p:par>
+                            </p:childTnLst>
+                          </p:cTn>
+                        </p:par>
+                      </p:childTnLst>
+                    </p:cTn>
+                  </p:par>
+                </p:childTnLst>
+              </p:cTn>
+              <p:prevCondLst>
+                <p:cond evt="onPrev">
+                  <p:tgtEl>
+                    <p:sldTgt/>
+                  </p:tgtEl>
+                </p:cond>
+              </p:prevCondLst>
+              <p:nextCondLst>
+                <p:cond evt="onNext">
+                  <p:tgtEl>
+                    <p:sldTgt/>
+                  </p:tgtEl>
+                </p:cond>
+              </p:nextCondLst>
+            </p:seq>
+          </p:childTnLst>
+        </p:cTn>
+      </p:par>
+    </p:tnLst>
+  </p:timing>
 </p:sld>
 </file>
 
@@ -14526,527 +15371,797 @@
           </a:effectLst>
         </p:spPr>
       </p:pic>
-      <p:sp>
-        <p:nvSpPr>
+      <p:grpSp>
+        <p:nvGrpSpPr>
           <p:cNvPr id="116" name="Google Shape;116;p5"/>
-          <p:cNvSpPr/>
+          <p:cNvGrpSpPr/>
           <p:nvPr/>
-        </p:nvSpPr>
-        <p:spPr>
+        </p:nvGrpSpPr>
+        <p:grpSpPr>
           <a:xfrm>
             <a:off x="597477" y="3199250"/>
-            <a:ext cx="4244100" cy="1670700"/>
+            <a:ext cx="4244100" cy="2022050"/>
+            <a:chOff x="597477" y="3199250"/>
+            <a:chExt cx="4244100" cy="2022050"/>
           </a:xfrm>
-          <a:prstGeom prst="rect">
-            <a:avLst/>
-          </a:prstGeom>
-          <a:noFill/>
-          <a:ln cap="flat" cmpd="sng" w="19050">
-            <a:solidFill>
-              <a:srgbClr val="CC0000"/>
-            </a:solidFill>
-            <a:prstDash val="solid"/>
-            <a:round/>
-            <a:headEnd len="sm" w="sm" type="none"/>
-            <a:tailEnd len="sm" w="sm" type="none"/>
-          </a:ln>
-        </p:spPr>
-        <p:txBody>
-          <a:bodyPr anchorCtr="0" anchor="ctr" bIns="91425" lIns="91425" spcFirstLastPara="1" rIns="91425" wrap="square" tIns="91425">
-            <a:noAutofit/>
-          </a:bodyPr>
-          <a:lstStyle/>
-          <a:p>
-            <a:pPr indent="0" lvl="0" marL="0" marR="0" rtl="0" algn="l">
-              <a:lnSpc>
-                <a:spcPct val="100000"/>
-              </a:lnSpc>
-              <a:spcBef>
-                <a:spcPts val="0"/>
-              </a:spcBef>
-              <a:spcAft>
-                <a:spcPts val="0"/>
-              </a:spcAft>
-              <a:buClr>
-                <a:srgbClr val="000000"/>
-              </a:buClr>
-              <a:buSzPts val="1400"/>
-              <a:buFont typeface="Arial"/>
-              <a:buNone/>
-            </a:pPr>
-            <a:r>
-              <a:t/>
-            </a:r>
-            <a:endParaRPr b="0" i="0" sz="1400" u="none" cap="none" strike="noStrike">
+        </p:grpSpPr>
+        <p:sp>
+          <p:nvSpPr>
+            <p:cNvPr id="117" name="Google Shape;117;p5"/>
+            <p:cNvSpPr/>
+            <p:nvPr/>
+          </p:nvSpPr>
+          <p:spPr>
+            <a:xfrm>
+              <a:off x="597477" y="3199250"/>
+              <a:ext cx="4244100" cy="1670700"/>
+            </a:xfrm>
+            <a:prstGeom prst="rect">
+              <a:avLst/>
+            </a:prstGeom>
+            <a:noFill/>
+            <a:ln cap="flat" cmpd="sng" w="19050">
               <a:solidFill>
-                <a:srgbClr val="000000"/>
+                <a:srgbClr val="CC0000"/>
               </a:solidFill>
-              <a:latin typeface="Arial"/>
-              <a:ea typeface="Arial"/>
-              <a:cs typeface="Arial"/>
-              <a:sym typeface="Arial"/>
-            </a:endParaRPr>
-          </a:p>
-        </p:txBody>
-      </p:sp>
-      <p:sp>
-        <p:nvSpPr>
-          <p:cNvPr id="117" name="Google Shape;117;p5"/>
-          <p:cNvSpPr txBox="1"/>
-          <p:nvPr/>
-        </p:nvSpPr>
-        <p:spPr>
-          <a:xfrm>
-            <a:off x="609950" y="4807300"/>
-            <a:ext cx="2139900" cy="414000"/>
-          </a:xfrm>
-          <a:prstGeom prst="rect">
-            <a:avLst/>
-          </a:prstGeom>
-          <a:noFill/>
-          <a:ln>
-            <a:noFill/>
-          </a:ln>
-        </p:spPr>
-        <p:txBody>
-          <a:bodyPr anchorCtr="0" anchor="t" bIns="91425" lIns="91425" spcFirstLastPara="1" rIns="91425" wrap="square" tIns="91425">
-            <a:noAutofit/>
-          </a:bodyPr>
-          <a:lstStyle/>
-          <a:p>
-            <a:pPr indent="0" lvl="0" marL="0" marR="0" rtl="0" algn="ctr">
-              <a:lnSpc>
-                <a:spcPct val="100000"/>
-              </a:lnSpc>
-              <a:spcBef>
-                <a:spcPts val="0"/>
-              </a:spcBef>
-              <a:spcAft>
-                <a:spcPts val="0"/>
-              </a:spcAft>
-              <a:buClr>
-                <a:srgbClr val="000000"/>
-              </a:buClr>
-              <a:buSzPts val="1400"/>
-              <a:buFont typeface="Arial"/>
-              <a:buNone/>
-            </a:pPr>
-            <a:r>
-              <a:rPr b="0" i="0" lang="en" sz="1400" u="none" cap="none" strike="noStrike">
-                <a:solidFill>
-                  <a:srgbClr val="5B0F00"/>
+              <a:prstDash val="solid"/>
+              <a:round/>
+              <a:headEnd len="sm" w="sm" type="none"/>
+              <a:tailEnd len="sm" w="sm" type="none"/>
+            </a:ln>
+          </p:spPr>
+          <p:txBody>
+            <a:bodyPr anchorCtr="0" anchor="ctr" bIns="91425" lIns="91425" spcFirstLastPara="1" rIns="91425" wrap="square" tIns="91425">
+              <a:noAutofit/>
+            </a:bodyPr>
+            <a:lstStyle/>
+            <a:p>
+              <a:pPr indent="0" lvl="0" marL="0" marR="0" rtl="0" algn="l">
+                <a:lnSpc>
+                  <a:spcPct val="100000"/>
+                </a:lnSpc>
+                <a:spcBef>
+                  <a:spcPts val="0"/>
+                </a:spcBef>
+                <a:spcAft>
+                  <a:spcPts val="0"/>
+                </a:spcAft>
+                <a:buClr>
+                  <a:srgbClr val="000000"/>
+                </a:buClr>
+                <a:buSzPts val="1400"/>
+                <a:buFont typeface="Arial"/>
+                <a:buNone/>
+              </a:pPr>
+              <a:r>
+                <a:t/>
+              </a:r>
+              <a:endParaRPr b="0" i="0" sz="1400" u="none" cap="none" strike="noStrike">
+                <a:solidFill>
+                  <a:srgbClr val="000000"/>
                 </a:solidFill>
                 <a:latin typeface="Arial"/>
                 <a:ea typeface="Arial"/>
                 <a:cs typeface="Arial"/>
                 <a:sym typeface="Arial"/>
-              </a:rPr>
-              <a:t>R console, Terminal</a:t>
-            </a:r>
-            <a:endParaRPr b="0" i="0" sz="1400" u="none" cap="none" strike="noStrike">
-              <a:solidFill>
-                <a:srgbClr val="5B0F00"/>
-              </a:solidFill>
-              <a:latin typeface="Arial"/>
-              <a:ea typeface="Arial"/>
-              <a:cs typeface="Arial"/>
-              <a:sym typeface="Arial"/>
-            </a:endParaRPr>
-          </a:p>
-        </p:txBody>
-      </p:sp>
-      <p:sp>
-        <p:nvSpPr>
-          <p:cNvPr id="118" name="Google Shape;118;p5"/>
-          <p:cNvSpPr txBox="1"/>
-          <p:nvPr/>
-        </p:nvSpPr>
-        <p:spPr>
-          <a:xfrm>
-            <a:off x="5837075" y="4807300"/>
-            <a:ext cx="2940900" cy="414000"/>
-          </a:xfrm>
-          <a:prstGeom prst="rect">
-            <a:avLst/>
-          </a:prstGeom>
-          <a:noFill/>
-          <a:ln>
+              </a:endParaRPr>
+            </a:p>
+          </p:txBody>
+        </p:sp>
+        <p:sp>
+          <p:nvSpPr>
+            <p:cNvPr id="118" name="Google Shape;118;p5"/>
+            <p:cNvSpPr txBox="1"/>
+            <p:nvPr/>
+          </p:nvSpPr>
+          <p:spPr>
+            <a:xfrm>
+              <a:off x="609950" y="4807300"/>
+              <a:ext cx="2139900" cy="414000"/>
+            </a:xfrm>
+            <a:prstGeom prst="rect">
+              <a:avLst/>
+            </a:prstGeom>
             <a:noFill/>
-          </a:ln>
-        </p:spPr>
-        <p:txBody>
-          <a:bodyPr anchorCtr="0" anchor="t" bIns="91425" lIns="91425" spcFirstLastPara="1" rIns="91425" wrap="square" tIns="91425">
-            <a:noAutofit/>
-          </a:bodyPr>
-          <a:lstStyle/>
-          <a:p>
-            <a:pPr indent="0" lvl="0" marL="0" marR="0" rtl="0" algn="ctr">
-              <a:lnSpc>
-                <a:spcPct val="100000"/>
-              </a:lnSpc>
-              <a:spcBef>
-                <a:spcPts val="0"/>
-              </a:spcBef>
-              <a:spcAft>
-                <a:spcPts val="0"/>
-              </a:spcAft>
-              <a:buClr>
-                <a:srgbClr val="000000"/>
-              </a:buClr>
-              <a:buSzPts val="1400"/>
-              <a:buFont typeface="Arial"/>
-              <a:buNone/>
-            </a:pPr>
-            <a:r>
-              <a:rPr b="0" i="0" lang="en" sz="1400" u="none" cap="none" strike="noStrike">
-                <a:solidFill>
-                  <a:srgbClr val="5B0F00"/>
+            <a:ln>
+              <a:noFill/>
+            </a:ln>
+          </p:spPr>
+          <p:txBody>
+            <a:bodyPr anchorCtr="0" anchor="t" bIns="91425" lIns="91425" spcFirstLastPara="1" rIns="91425" wrap="square" tIns="91425">
+              <a:noAutofit/>
+            </a:bodyPr>
+            <a:lstStyle/>
+            <a:p>
+              <a:pPr indent="0" lvl="0" marL="0" marR="0" rtl="0" algn="ctr">
+                <a:lnSpc>
+                  <a:spcPct val="100000"/>
+                </a:lnSpc>
+                <a:spcBef>
+                  <a:spcPts val="0"/>
+                </a:spcBef>
+                <a:spcAft>
+                  <a:spcPts val="0"/>
+                </a:spcAft>
+                <a:buClr>
+                  <a:srgbClr val="000000"/>
+                </a:buClr>
+                <a:buSzPts val="1400"/>
+                <a:buFont typeface="Arial"/>
+                <a:buNone/>
+              </a:pPr>
+              <a:r>
+                <a:rPr b="0" i="0" lang="en" sz="1400" u="none" cap="none" strike="noStrike">
+                  <a:solidFill>
+                    <a:srgbClr val="CC0000"/>
+                  </a:solidFill>
+                  <a:latin typeface="Arial"/>
+                  <a:ea typeface="Arial"/>
+                  <a:cs typeface="Arial"/>
+                  <a:sym typeface="Arial"/>
+                </a:rPr>
+                <a:t>R console, Terminal</a:t>
+              </a:r>
+              <a:endParaRPr b="0" i="0" sz="1400" u="none" cap="none" strike="noStrike">
+                <a:solidFill>
+                  <a:srgbClr val="CC0000"/>
                 </a:solidFill>
                 <a:latin typeface="Arial"/>
                 <a:ea typeface="Arial"/>
                 <a:cs typeface="Arial"/>
                 <a:sym typeface="Arial"/>
-              </a:rPr>
-              <a:t>Directories, Plots, Packages...</a:t>
-            </a:r>
-            <a:endParaRPr b="0" i="0" sz="1400" u="none" cap="none" strike="noStrike">
+              </a:endParaRPr>
+            </a:p>
+          </p:txBody>
+        </p:sp>
+      </p:grpSp>
+      <p:grpSp>
+        <p:nvGrpSpPr>
+          <p:cNvPr id="119" name="Google Shape;119;p5"/>
+          <p:cNvGrpSpPr/>
+          <p:nvPr/>
+        </p:nvGrpSpPr>
+        <p:grpSpPr>
+          <a:xfrm>
+            <a:off x="599175" y="362850"/>
+            <a:ext cx="4240800" cy="2773100"/>
+            <a:chOff x="599175" y="362850"/>
+            <a:chExt cx="4240800" cy="2773100"/>
+          </a:xfrm>
+        </p:grpSpPr>
+        <p:sp>
+          <p:nvSpPr>
+            <p:cNvPr id="120" name="Google Shape;120;p5"/>
+            <p:cNvSpPr/>
+            <p:nvPr/>
+          </p:nvSpPr>
+          <p:spPr>
+            <a:xfrm>
+              <a:off x="599175" y="1093850"/>
+              <a:ext cx="4240800" cy="2042100"/>
+            </a:xfrm>
+            <a:prstGeom prst="rect">
+              <a:avLst/>
+            </a:prstGeom>
+            <a:noFill/>
+            <a:ln cap="flat" cmpd="sng" w="19050">
               <a:solidFill>
-                <a:srgbClr val="5B0F00"/>
+                <a:srgbClr val="CC0000"/>
               </a:solidFill>
-              <a:latin typeface="Arial"/>
-              <a:ea typeface="Arial"/>
-              <a:cs typeface="Arial"/>
-              <a:sym typeface="Arial"/>
-            </a:endParaRPr>
-          </a:p>
-        </p:txBody>
-      </p:sp>
-      <p:sp>
-        <p:nvSpPr>
-          <p:cNvPr id="119" name="Google Shape;119;p5"/>
-          <p:cNvSpPr/>
-          <p:nvPr/>
-        </p:nvSpPr>
-        <p:spPr>
-          <a:xfrm>
-            <a:off x="599175" y="1093850"/>
-            <a:ext cx="4240800" cy="2042100"/>
-          </a:xfrm>
-          <a:prstGeom prst="rect">
-            <a:avLst/>
-          </a:prstGeom>
-          <a:noFill/>
-          <a:ln cap="flat" cmpd="sng" w="19050">
-            <a:solidFill>
-              <a:srgbClr val="CC0000"/>
-            </a:solidFill>
-            <a:prstDash val="solid"/>
-            <a:round/>
-            <a:headEnd len="sm" w="sm" type="none"/>
-            <a:tailEnd len="sm" w="sm" type="none"/>
-          </a:ln>
-        </p:spPr>
-        <p:txBody>
-          <a:bodyPr anchorCtr="0" anchor="ctr" bIns="91425" lIns="91425" spcFirstLastPara="1" rIns="91425" wrap="square" tIns="91425">
-            <a:noAutofit/>
-          </a:bodyPr>
-          <a:lstStyle/>
-          <a:p>
-            <a:pPr indent="0" lvl="0" marL="0" marR="0" rtl="0" algn="l">
-              <a:lnSpc>
-                <a:spcPct val="100000"/>
-              </a:lnSpc>
-              <a:spcBef>
-                <a:spcPts val="0"/>
-              </a:spcBef>
-              <a:spcAft>
-                <a:spcPts val="0"/>
-              </a:spcAft>
-              <a:buClr>
-                <a:srgbClr val="000000"/>
-              </a:buClr>
-              <a:buSzPts val="1400"/>
-              <a:buFont typeface="Arial"/>
-              <a:buNone/>
-            </a:pPr>
-            <a:r>
-              <a:t/>
-            </a:r>
-            <a:endParaRPr b="0" i="0" sz="1400" u="none" cap="none" strike="noStrike">
-              <a:solidFill>
-                <a:srgbClr val="000000"/>
-              </a:solidFill>
-              <a:latin typeface="Arial"/>
-              <a:ea typeface="Arial"/>
-              <a:cs typeface="Arial"/>
-              <a:sym typeface="Arial"/>
-            </a:endParaRPr>
-          </a:p>
-        </p:txBody>
-      </p:sp>
-      <p:sp>
-        <p:nvSpPr>
-          <p:cNvPr id="120" name="Google Shape;120;p5"/>
-          <p:cNvSpPr txBox="1"/>
-          <p:nvPr/>
-        </p:nvSpPr>
-        <p:spPr>
-          <a:xfrm>
-            <a:off x="609950" y="362850"/>
-            <a:ext cx="3416700" cy="265200"/>
-          </a:xfrm>
-          <a:prstGeom prst="rect">
-            <a:avLst/>
-          </a:prstGeom>
-          <a:noFill/>
-          <a:ln>
-            <a:noFill/>
-          </a:ln>
-        </p:spPr>
-        <p:txBody>
-          <a:bodyPr anchorCtr="0" anchor="t" bIns="91425" lIns="91425" spcFirstLastPara="1" rIns="91425" wrap="square" tIns="91425">
-            <a:noAutofit/>
-          </a:bodyPr>
-          <a:lstStyle/>
-          <a:p>
-            <a:pPr indent="0" lvl="0" marL="0" marR="0" rtl="0" algn="ctr">
-              <a:lnSpc>
-                <a:spcPct val="100000"/>
-              </a:lnSpc>
-              <a:spcBef>
-                <a:spcPts val="0"/>
-              </a:spcBef>
-              <a:spcAft>
-                <a:spcPts val="0"/>
-              </a:spcAft>
-              <a:buClr>
-                <a:srgbClr val="000000"/>
-              </a:buClr>
-              <a:buSzPts val="1400"/>
-              <a:buFont typeface="Arial"/>
-              <a:buNone/>
-            </a:pPr>
-            <a:r>
-              <a:rPr b="0" i="0" lang="en" sz="1400" u="none" cap="none" strike="noStrike">
-                <a:solidFill>
-                  <a:srgbClr val="5B0F00"/>
+              <a:prstDash val="solid"/>
+              <a:round/>
+              <a:headEnd len="sm" w="sm" type="none"/>
+              <a:tailEnd len="sm" w="sm" type="none"/>
+            </a:ln>
+          </p:spPr>
+          <p:txBody>
+            <a:bodyPr anchorCtr="0" anchor="ctr" bIns="91425" lIns="91425" spcFirstLastPara="1" rIns="91425" wrap="square" tIns="91425">
+              <a:noAutofit/>
+            </a:bodyPr>
+            <a:lstStyle/>
+            <a:p>
+              <a:pPr indent="0" lvl="0" marL="0" marR="0" rtl="0" algn="l">
+                <a:lnSpc>
+                  <a:spcPct val="100000"/>
+                </a:lnSpc>
+                <a:spcBef>
+                  <a:spcPts val="0"/>
+                </a:spcBef>
+                <a:spcAft>
+                  <a:spcPts val="0"/>
+                </a:spcAft>
+                <a:buClr>
+                  <a:srgbClr val="000000"/>
+                </a:buClr>
+                <a:buSzPts val="1400"/>
+                <a:buFont typeface="Arial"/>
+                <a:buNone/>
+              </a:pPr>
+              <a:r>
+                <a:t/>
+              </a:r>
+              <a:endParaRPr b="0" i="0" sz="1400" u="none" cap="none" strike="noStrike">
+                <a:solidFill>
+                  <a:srgbClr val="000000"/>
                 </a:solidFill>
                 <a:latin typeface="Arial"/>
                 <a:ea typeface="Arial"/>
                 <a:cs typeface="Arial"/>
                 <a:sym typeface="Arial"/>
-              </a:rPr>
-              <a:t>R scripts, R markdown, R notebooks</a:t>
-            </a:r>
-            <a:endParaRPr b="0" i="0" sz="1400" u="none" cap="none" strike="noStrike">
-              <a:solidFill>
-                <a:srgbClr val="5B0F00"/>
-              </a:solidFill>
-              <a:latin typeface="Arial"/>
-              <a:ea typeface="Arial"/>
-              <a:cs typeface="Arial"/>
-              <a:sym typeface="Arial"/>
-            </a:endParaRPr>
-          </a:p>
-        </p:txBody>
-      </p:sp>
-      <p:sp>
-        <p:nvSpPr>
-          <p:cNvPr id="121" name="Google Shape;121;p5"/>
-          <p:cNvSpPr txBox="1"/>
-          <p:nvPr/>
-        </p:nvSpPr>
-        <p:spPr>
-          <a:xfrm>
-            <a:off x="4730775" y="394275"/>
-            <a:ext cx="3808500" cy="305400"/>
-          </a:xfrm>
-          <a:prstGeom prst="rect">
-            <a:avLst/>
-          </a:prstGeom>
-          <a:noFill/>
-          <a:ln>
+              </a:endParaRPr>
+            </a:p>
+          </p:txBody>
+        </p:sp>
+        <p:sp>
+          <p:nvSpPr>
+            <p:cNvPr id="121" name="Google Shape;121;p5"/>
+            <p:cNvSpPr txBox="1"/>
+            <p:nvPr/>
+          </p:nvSpPr>
+          <p:spPr>
+            <a:xfrm>
+              <a:off x="609950" y="362850"/>
+              <a:ext cx="3416700" cy="265200"/>
+            </a:xfrm>
+            <a:prstGeom prst="rect">
+              <a:avLst/>
+            </a:prstGeom>
             <a:noFill/>
-          </a:ln>
-        </p:spPr>
-        <p:txBody>
-          <a:bodyPr anchorCtr="0" anchor="t" bIns="91425" lIns="91425" spcFirstLastPara="1" rIns="91425" wrap="square" tIns="91425">
-            <a:noAutofit/>
-          </a:bodyPr>
-          <a:lstStyle/>
-          <a:p>
-            <a:pPr indent="0" lvl="0" marL="0" marR="0" rtl="0" algn="ctr">
-              <a:lnSpc>
-                <a:spcPct val="100000"/>
-              </a:lnSpc>
-              <a:spcBef>
-                <a:spcPts val="0"/>
-              </a:spcBef>
-              <a:spcAft>
-                <a:spcPts val="0"/>
-              </a:spcAft>
-              <a:buClr>
-                <a:srgbClr val="000000"/>
-              </a:buClr>
-              <a:buSzPts val="1400"/>
-              <a:buFont typeface="Arial"/>
-              <a:buNone/>
-            </a:pPr>
-            <a:r>
-              <a:rPr b="0" i="0" lang="en" sz="1400" u="none" cap="none" strike="noStrike">
-                <a:solidFill>
-                  <a:srgbClr val="5B0F00"/>
+            <a:ln>
+              <a:noFill/>
+            </a:ln>
+          </p:spPr>
+          <p:txBody>
+            <a:bodyPr anchorCtr="0" anchor="t" bIns="91425" lIns="91425" spcFirstLastPara="1" rIns="91425" wrap="square" tIns="91425">
+              <a:noAutofit/>
+            </a:bodyPr>
+            <a:lstStyle/>
+            <a:p>
+              <a:pPr indent="0" lvl="0" marL="0" marR="0" rtl="0" algn="ctr">
+                <a:lnSpc>
+                  <a:spcPct val="100000"/>
+                </a:lnSpc>
+                <a:spcBef>
+                  <a:spcPts val="0"/>
+                </a:spcBef>
+                <a:spcAft>
+                  <a:spcPts val="0"/>
+                </a:spcAft>
+                <a:buClr>
+                  <a:srgbClr val="000000"/>
+                </a:buClr>
+                <a:buSzPts val="1400"/>
+                <a:buFont typeface="Arial"/>
+                <a:buNone/>
+              </a:pPr>
+              <a:r>
+                <a:rPr b="0" i="0" lang="en" sz="1400" u="none" cap="none" strike="noStrike">
+                  <a:solidFill>
+                    <a:srgbClr val="CC0000"/>
+                  </a:solidFill>
+                  <a:latin typeface="Arial"/>
+                  <a:ea typeface="Arial"/>
+                  <a:cs typeface="Arial"/>
+                  <a:sym typeface="Arial"/>
+                </a:rPr>
+                <a:t>R scripts, R markdown, R notebooks</a:t>
+              </a:r>
+              <a:endParaRPr b="0" i="0" sz="1400" u="none" cap="none" strike="noStrike">
+                <a:solidFill>
+                  <a:srgbClr val="CC0000"/>
                 </a:solidFill>
                 <a:latin typeface="Arial"/>
                 <a:ea typeface="Arial"/>
                 <a:cs typeface="Arial"/>
                 <a:sym typeface="Arial"/>
-              </a:rPr>
-              <a:t>Summary of all the data loaded in Rstudio</a:t>
-            </a:r>
-            <a:endParaRPr b="0" i="0" sz="1400" u="none" cap="none" strike="noStrike">
+              </a:endParaRPr>
+            </a:p>
+          </p:txBody>
+        </p:sp>
+      </p:grpSp>
+      <p:grpSp>
+        <p:nvGrpSpPr>
+          <p:cNvPr id="122" name="Google Shape;122;p5"/>
+          <p:cNvGrpSpPr/>
+          <p:nvPr/>
+        </p:nvGrpSpPr>
+        <p:grpSpPr>
+          <a:xfrm>
+            <a:off x="4730775" y="394275"/>
+            <a:ext cx="3808500" cy="1919375"/>
+            <a:chOff x="4730775" y="394275"/>
+            <a:chExt cx="3808500" cy="1919375"/>
+          </a:xfrm>
+        </p:grpSpPr>
+        <p:sp>
+          <p:nvSpPr>
+            <p:cNvPr id="123" name="Google Shape;123;p5"/>
+            <p:cNvSpPr txBox="1"/>
+            <p:nvPr/>
+          </p:nvSpPr>
+          <p:spPr>
+            <a:xfrm>
+              <a:off x="4730775" y="394275"/>
+              <a:ext cx="3808500" cy="305400"/>
+            </a:xfrm>
+            <a:prstGeom prst="rect">
+              <a:avLst/>
+            </a:prstGeom>
+            <a:noFill/>
+            <a:ln>
+              <a:noFill/>
+            </a:ln>
+          </p:spPr>
+          <p:txBody>
+            <a:bodyPr anchorCtr="0" anchor="t" bIns="91425" lIns="91425" spcFirstLastPara="1" rIns="91425" wrap="square" tIns="91425">
+              <a:noAutofit/>
+            </a:bodyPr>
+            <a:lstStyle/>
+            <a:p>
+              <a:pPr indent="0" lvl="0" marL="0" marR="0" rtl="0" algn="ctr">
+                <a:lnSpc>
+                  <a:spcPct val="100000"/>
+                </a:lnSpc>
+                <a:spcBef>
+                  <a:spcPts val="0"/>
+                </a:spcBef>
+                <a:spcAft>
+                  <a:spcPts val="0"/>
+                </a:spcAft>
+                <a:buClr>
+                  <a:srgbClr val="000000"/>
+                </a:buClr>
+                <a:buSzPts val="1400"/>
+                <a:buFont typeface="Arial"/>
+                <a:buNone/>
+              </a:pPr>
+              <a:r>
+                <a:rPr b="0" i="0" lang="en" sz="1400" u="none" cap="none" strike="noStrike">
+                  <a:solidFill>
+                    <a:srgbClr val="CC0000"/>
+                  </a:solidFill>
+                  <a:latin typeface="Arial"/>
+                  <a:ea typeface="Arial"/>
+                  <a:cs typeface="Arial"/>
+                  <a:sym typeface="Arial"/>
+                </a:rPr>
+                <a:t>Summary of all the data loaded in Rstudio</a:t>
+              </a:r>
+              <a:endParaRPr b="0" i="0" sz="1400" u="none" cap="none" strike="noStrike">
+                <a:solidFill>
+                  <a:srgbClr val="CC0000"/>
+                </a:solidFill>
+                <a:latin typeface="Arial"/>
+                <a:ea typeface="Arial"/>
+                <a:cs typeface="Arial"/>
+                <a:sym typeface="Arial"/>
+              </a:endParaRPr>
+            </a:p>
+          </p:txBody>
+        </p:sp>
+        <p:sp>
+          <p:nvSpPr>
+            <p:cNvPr id="124" name="Google Shape;124;p5"/>
+            <p:cNvSpPr/>
+            <p:nvPr/>
+          </p:nvSpPr>
+          <p:spPr>
+            <a:xfrm>
+              <a:off x="4866375" y="1093850"/>
+              <a:ext cx="3668400" cy="1219800"/>
+            </a:xfrm>
+            <a:prstGeom prst="rect">
+              <a:avLst/>
+            </a:prstGeom>
+            <a:noFill/>
+            <a:ln cap="flat" cmpd="sng" w="19050">
               <a:solidFill>
-                <a:srgbClr val="5B0F00"/>
+                <a:srgbClr val="CC0000"/>
               </a:solidFill>
-              <a:latin typeface="Arial"/>
-              <a:ea typeface="Arial"/>
-              <a:cs typeface="Arial"/>
-              <a:sym typeface="Arial"/>
-            </a:endParaRPr>
-          </a:p>
-        </p:txBody>
-      </p:sp>
-      <p:sp>
-        <p:nvSpPr>
-          <p:cNvPr id="122" name="Google Shape;122;p5"/>
-          <p:cNvSpPr/>
+              <a:prstDash val="solid"/>
+              <a:round/>
+              <a:headEnd len="sm" w="sm" type="none"/>
+              <a:tailEnd len="sm" w="sm" type="none"/>
+            </a:ln>
+          </p:spPr>
+          <p:txBody>
+            <a:bodyPr anchorCtr="0" anchor="ctr" bIns="91425" lIns="91425" spcFirstLastPara="1" rIns="91425" wrap="square" tIns="91425">
+              <a:noAutofit/>
+            </a:bodyPr>
+            <a:lstStyle/>
+            <a:p>
+              <a:pPr indent="0" lvl="0" marL="0" marR="0" rtl="0" algn="l">
+                <a:lnSpc>
+                  <a:spcPct val="100000"/>
+                </a:lnSpc>
+                <a:spcBef>
+                  <a:spcPts val="0"/>
+                </a:spcBef>
+                <a:spcAft>
+                  <a:spcPts val="0"/>
+                </a:spcAft>
+                <a:buClr>
+                  <a:srgbClr val="000000"/>
+                </a:buClr>
+                <a:buSzPts val="1400"/>
+                <a:buFont typeface="Arial"/>
+                <a:buNone/>
+              </a:pPr>
+              <a:r>
+                <a:t/>
+              </a:r>
+              <a:endParaRPr b="0" i="0" sz="1400" u="none" cap="none" strike="noStrike">
+                <a:solidFill>
+                  <a:srgbClr val="000000"/>
+                </a:solidFill>
+                <a:latin typeface="Arial"/>
+                <a:ea typeface="Arial"/>
+                <a:cs typeface="Arial"/>
+                <a:sym typeface="Arial"/>
+              </a:endParaRPr>
+            </a:p>
+          </p:txBody>
+        </p:sp>
+      </p:grpSp>
+      <p:grpSp>
+        <p:nvGrpSpPr>
+          <p:cNvPr id="125" name="Google Shape;125;p5"/>
+          <p:cNvGrpSpPr/>
           <p:nvPr/>
-        </p:nvSpPr>
-        <p:spPr>
-          <a:xfrm>
-            <a:off x="4866375" y="1093850"/>
-            <a:ext cx="3668400" cy="1219800"/>
-          </a:xfrm>
-          <a:prstGeom prst="rect">
-            <a:avLst/>
-          </a:prstGeom>
-          <a:noFill/>
-          <a:ln cap="flat" cmpd="sng" w="19050">
-            <a:solidFill>
-              <a:srgbClr val="CC0000"/>
-            </a:solidFill>
-            <a:prstDash val="solid"/>
-            <a:round/>
-            <a:headEnd len="sm" w="sm" type="none"/>
-            <a:tailEnd len="sm" w="sm" type="none"/>
-          </a:ln>
-        </p:spPr>
-        <p:txBody>
-          <a:bodyPr anchorCtr="0" anchor="ctr" bIns="91425" lIns="91425" spcFirstLastPara="1" rIns="91425" wrap="square" tIns="91425">
-            <a:noAutofit/>
-          </a:bodyPr>
-          <a:lstStyle/>
-          <a:p>
-            <a:pPr indent="0" lvl="0" marL="0" marR="0" rtl="0" algn="l">
-              <a:lnSpc>
-                <a:spcPct val="100000"/>
-              </a:lnSpc>
-              <a:spcBef>
-                <a:spcPts val="0"/>
-              </a:spcBef>
-              <a:spcAft>
-                <a:spcPts val="0"/>
-              </a:spcAft>
-              <a:buClr>
-                <a:srgbClr val="000000"/>
-              </a:buClr>
-              <a:buSzPts val="1400"/>
-              <a:buFont typeface="Arial"/>
-              <a:buNone/>
-            </a:pPr>
-            <a:r>
-              <a:t/>
-            </a:r>
-            <a:endParaRPr b="0" i="0" sz="1400" u="none" cap="none" strike="noStrike">
-              <a:solidFill>
-                <a:srgbClr val="000000"/>
-              </a:solidFill>
-              <a:latin typeface="Arial"/>
-              <a:ea typeface="Arial"/>
-              <a:cs typeface="Arial"/>
-              <a:sym typeface="Arial"/>
-            </a:endParaRPr>
-          </a:p>
-        </p:txBody>
-      </p:sp>
-      <p:sp>
-        <p:nvSpPr>
-          <p:cNvPr id="123" name="Google Shape;123;p5"/>
-          <p:cNvSpPr/>
-          <p:nvPr/>
-        </p:nvSpPr>
-        <p:spPr>
+        </p:nvGrpSpPr>
+        <p:grpSpPr>
           <a:xfrm>
             <a:off x="4866375" y="2375075"/>
-            <a:ext cx="3668400" cy="2494800"/>
+            <a:ext cx="3911600" cy="2846225"/>
+            <a:chOff x="4866375" y="2375075"/>
+            <a:chExt cx="3911600" cy="2846225"/>
           </a:xfrm>
-          <a:prstGeom prst="rect">
-            <a:avLst/>
-          </a:prstGeom>
-          <a:noFill/>
-          <a:ln cap="flat" cmpd="sng" w="19050">
-            <a:solidFill>
-              <a:srgbClr val="CC0000"/>
-            </a:solidFill>
-            <a:prstDash val="solid"/>
-            <a:round/>
-            <a:headEnd len="sm" w="sm" type="none"/>
-            <a:tailEnd len="sm" w="sm" type="none"/>
-          </a:ln>
-        </p:spPr>
-        <p:txBody>
-          <a:bodyPr anchorCtr="0" anchor="ctr" bIns="91425" lIns="91425" spcFirstLastPara="1" rIns="91425" wrap="square" tIns="91425">
-            <a:noAutofit/>
-          </a:bodyPr>
-          <a:lstStyle/>
-          <a:p>
-            <a:pPr indent="0" lvl="0" marL="0" marR="0" rtl="0" algn="l">
-              <a:lnSpc>
-                <a:spcPct val="100000"/>
-              </a:lnSpc>
-              <a:spcBef>
-                <a:spcPts val="0"/>
-              </a:spcBef>
-              <a:spcAft>
-                <a:spcPts val="0"/>
-              </a:spcAft>
-              <a:buClr>
-                <a:srgbClr val="000000"/>
-              </a:buClr>
-              <a:buSzPts val="1400"/>
-              <a:buFont typeface="Arial"/>
-              <a:buNone/>
-            </a:pPr>
-            <a:r>
-              <a:t/>
-            </a:r>
-            <a:endParaRPr b="0" i="0" sz="1400" u="none" cap="none" strike="noStrike">
+        </p:grpSpPr>
+        <p:sp>
+          <p:nvSpPr>
+            <p:cNvPr id="126" name="Google Shape;126;p5"/>
+            <p:cNvSpPr txBox="1"/>
+            <p:nvPr/>
+          </p:nvSpPr>
+          <p:spPr>
+            <a:xfrm>
+              <a:off x="5837075" y="4807300"/>
+              <a:ext cx="2940900" cy="414000"/>
+            </a:xfrm>
+            <a:prstGeom prst="rect">
+              <a:avLst/>
+            </a:prstGeom>
+            <a:noFill/>
+            <a:ln>
+              <a:noFill/>
+            </a:ln>
+          </p:spPr>
+          <p:txBody>
+            <a:bodyPr anchorCtr="0" anchor="t" bIns="91425" lIns="91425" spcFirstLastPara="1" rIns="91425" wrap="square" tIns="91425">
+              <a:noAutofit/>
+            </a:bodyPr>
+            <a:lstStyle/>
+            <a:p>
+              <a:pPr indent="0" lvl="0" marL="0" marR="0" rtl="0" algn="ctr">
+                <a:lnSpc>
+                  <a:spcPct val="100000"/>
+                </a:lnSpc>
+                <a:spcBef>
+                  <a:spcPts val="0"/>
+                </a:spcBef>
+                <a:spcAft>
+                  <a:spcPts val="0"/>
+                </a:spcAft>
+                <a:buClr>
+                  <a:srgbClr val="000000"/>
+                </a:buClr>
+                <a:buSzPts val="1400"/>
+                <a:buFont typeface="Arial"/>
+                <a:buNone/>
+              </a:pPr>
+              <a:r>
+                <a:rPr b="0" i="0" lang="en" sz="1400" u="none" cap="none" strike="noStrike">
+                  <a:solidFill>
+                    <a:srgbClr val="CC0000"/>
+                  </a:solidFill>
+                  <a:latin typeface="Arial"/>
+                  <a:ea typeface="Arial"/>
+                  <a:cs typeface="Arial"/>
+                  <a:sym typeface="Arial"/>
+                </a:rPr>
+                <a:t>Directories, Plots, Packages...</a:t>
+              </a:r>
+              <a:endParaRPr b="0" i="0" sz="1400" u="none" cap="none" strike="noStrike">
+                <a:solidFill>
+                  <a:srgbClr val="CC0000"/>
+                </a:solidFill>
+                <a:latin typeface="Arial"/>
+                <a:ea typeface="Arial"/>
+                <a:cs typeface="Arial"/>
+                <a:sym typeface="Arial"/>
+              </a:endParaRPr>
+            </a:p>
+          </p:txBody>
+        </p:sp>
+        <p:sp>
+          <p:nvSpPr>
+            <p:cNvPr id="127" name="Google Shape;127;p5"/>
+            <p:cNvSpPr/>
+            <p:nvPr/>
+          </p:nvSpPr>
+          <p:spPr>
+            <a:xfrm>
+              <a:off x="4866375" y="2375075"/>
+              <a:ext cx="3668400" cy="2494800"/>
+            </a:xfrm>
+            <a:prstGeom prst="rect">
+              <a:avLst/>
+            </a:prstGeom>
+            <a:noFill/>
+            <a:ln cap="flat" cmpd="sng" w="19050">
               <a:solidFill>
-                <a:srgbClr val="000000"/>
+                <a:srgbClr val="CC0000"/>
               </a:solidFill>
-              <a:latin typeface="Arial"/>
-              <a:ea typeface="Arial"/>
-              <a:cs typeface="Arial"/>
-              <a:sym typeface="Arial"/>
-            </a:endParaRPr>
-          </a:p>
-        </p:txBody>
-      </p:sp>
+              <a:prstDash val="solid"/>
+              <a:round/>
+              <a:headEnd len="sm" w="sm" type="none"/>
+              <a:tailEnd len="sm" w="sm" type="none"/>
+            </a:ln>
+          </p:spPr>
+          <p:txBody>
+            <a:bodyPr anchorCtr="0" anchor="ctr" bIns="91425" lIns="91425" spcFirstLastPara="1" rIns="91425" wrap="square" tIns="91425">
+              <a:noAutofit/>
+            </a:bodyPr>
+            <a:lstStyle/>
+            <a:p>
+              <a:pPr indent="0" lvl="0" marL="0" marR="0" rtl="0" algn="l">
+                <a:lnSpc>
+                  <a:spcPct val="100000"/>
+                </a:lnSpc>
+                <a:spcBef>
+                  <a:spcPts val="0"/>
+                </a:spcBef>
+                <a:spcAft>
+                  <a:spcPts val="0"/>
+                </a:spcAft>
+                <a:buClr>
+                  <a:srgbClr val="000000"/>
+                </a:buClr>
+                <a:buSzPts val="1400"/>
+                <a:buFont typeface="Arial"/>
+                <a:buNone/>
+              </a:pPr>
+              <a:r>
+                <a:t/>
+              </a:r>
+              <a:endParaRPr b="0" i="0" sz="1400" u="none" cap="none" strike="noStrike">
+                <a:solidFill>
+                  <a:srgbClr val="000000"/>
+                </a:solidFill>
+                <a:latin typeface="Arial"/>
+                <a:ea typeface="Arial"/>
+                <a:cs typeface="Arial"/>
+                <a:sym typeface="Arial"/>
+              </a:endParaRPr>
+            </a:p>
+          </p:txBody>
+        </p:sp>
+      </p:grpSp>
     </p:spTree>
   </p:cSld>
   <p:clrMapOvr>
     <a:masterClrMapping/>
   </p:clrMapOvr>
+  <p:timing>
+    <p:tnLst>
+      <p:par>
+        <p:cTn dur="indefinite" nodeType="tmRoot" restart="never">
+          <p:childTnLst>
+            <p:seq concurrent="1" nextAc="seek">
+              <p:cTn dur="indefinite" id="2" nodeType="mainSeq">
+                <p:childTnLst>
+                  <p:par>
+                    <p:cTn fill="hold">
+                      <p:stCondLst>
+                        <p:cond delay="indefinite"/>
+                      </p:stCondLst>
+                      <p:childTnLst>
+                        <p:par>
+                          <p:cTn fill="hold">
+                            <p:stCondLst>
+                              <p:cond delay="0"/>
+                            </p:stCondLst>
+                            <p:childTnLst>
+                              <p:par>
+                                <p:cTn fill="hold" nodeType="clickEffect" presetClass="entr" presetID="1" presetSubtype="0">
+                                  <p:stCondLst>
+                                    <p:cond delay="0"/>
+                                  </p:stCondLst>
+                                  <p:childTnLst>
+                                    <p:set>
+                                      <p:cBhvr>
+                                        <p:cTn dur="1" fill="hold">
+                                          <p:stCondLst>
+                                            <p:cond delay="0"/>
+                                          </p:stCondLst>
+                                        </p:cTn>
+                                        <p:tgtEl>
+                                          <p:spTgt spid="116"/>
+                                        </p:tgtEl>
+                                        <p:attrNameLst>
+                                          <p:attrName>style.visibility</p:attrName>
+                                        </p:attrNameLst>
+                                      </p:cBhvr>
+                                      <p:to>
+                                        <p:strVal val="visible"/>
+                                      </p:to>
+                                    </p:set>
+                                  </p:childTnLst>
+                                </p:cTn>
+                              </p:par>
+                            </p:childTnLst>
+                          </p:cTn>
+                        </p:par>
+                      </p:childTnLst>
+                    </p:cTn>
+                  </p:par>
+                  <p:par>
+                    <p:cTn fill="hold">
+                      <p:stCondLst>
+                        <p:cond delay="indefinite"/>
+                      </p:stCondLst>
+                      <p:childTnLst>
+                        <p:par>
+                          <p:cTn fill="hold">
+                            <p:stCondLst>
+                              <p:cond delay="0"/>
+                            </p:stCondLst>
+                            <p:childTnLst>
+                              <p:par>
+                                <p:cTn fill="hold" nodeType="clickEffect" presetClass="entr" presetID="1" presetSubtype="0">
+                                  <p:stCondLst>
+                                    <p:cond delay="0"/>
+                                  </p:stCondLst>
+                                  <p:childTnLst>
+                                    <p:set>
+                                      <p:cBhvr>
+                                        <p:cTn dur="1" fill="hold">
+                                          <p:stCondLst>
+                                            <p:cond delay="0"/>
+                                          </p:stCondLst>
+                                        </p:cTn>
+                                        <p:tgtEl>
+                                          <p:spTgt spid="119"/>
+                                        </p:tgtEl>
+                                        <p:attrNameLst>
+                                          <p:attrName>style.visibility</p:attrName>
+                                        </p:attrNameLst>
+                                      </p:cBhvr>
+                                      <p:to>
+                                        <p:strVal val="visible"/>
+                                      </p:to>
+                                    </p:set>
+                                  </p:childTnLst>
+                                </p:cTn>
+                              </p:par>
+                            </p:childTnLst>
+                          </p:cTn>
+                        </p:par>
+                      </p:childTnLst>
+                    </p:cTn>
+                  </p:par>
+                  <p:par>
+                    <p:cTn fill="hold">
+                      <p:stCondLst>
+                        <p:cond delay="indefinite"/>
+                      </p:stCondLst>
+                      <p:childTnLst>
+                        <p:par>
+                          <p:cTn fill="hold">
+                            <p:stCondLst>
+                              <p:cond delay="0"/>
+                            </p:stCondLst>
+                            <p:childTnLst>
+                              <p:par>
+                                <p:cTn fill="hold" nodeType="clickEffect" presetClass="entr" presetID="1" presetSubtype="0">
+                                  <p:stCondLst>
+                                    <p:cond delay="0"/>
+                                  </p:stCondLst>
+                                  <p:childTnLst>
+                                    <p:set>
+                                      <p:cBhvr>
+                                        <p:cTn dur="1" fill="hold">
+                                          <p:stCondLst>
+                                            <p:cond delay="0"/>
+                                          </p:stCondLst>
+                                        </p:cTn>
+                                        <p:tgtEl>
+                                          <p:spTgt spid="125"/>
+                                        </p:tgtEl>
+                                        <p:attrNameLst>
+                                          <p:attrName>style.visibility</p:attrName>
+                                        </p:attrNameLst>
+                                      </p:cBhvr>
+                                      <p:to>
+                                        <p:strVal val="visible"/>
+                                      </p:to>
+                                    </p:set>
+                                  </p:childTnLst>
+                                </p:cTn>
+                              </p:par>
+                            </p:childTnLst>
+                          </p:cTn>
+                        </p:par>
+                      </p:childTnLst>
+                    </p:cTn>
+                  </p:par>
+                  <p:par>
+                    <p:cTn fill="hold">
+                      <p:stCondLst>
+                        <p:cond delay="indefinite"/>
+                      </p:stCondLst>
+                      <p:childTnLst>
+                        <p:par>
+                          <p:cTn fill="hold">
+                            <p:stCondLst>
+                              <p:cond delay="0"/>
+                            </p:stCondLst>
+                            <p:childTnLst>
+                              <p:par>
+                                <p:cTn fill="hold" nodeType="clickEffect" presetClass="entr" presetID="1" presetSubtype="0">
+                                  <p:stCondLst>
+                                    <p:cond delay="0"/>
+                                  </p:stCondLst>
+                                  <p:childTnLst>
+                                    <p:set>
+                                      <p:cBhvr>
+                                        <p:cTn dur="1" fill="hold">
+                                          <p:stCondLst>
+                                            <p:cond delay="0"/>
+                                          </p:stCondLst>
+                                        </p:cTn>
+                                        <p:tgtEl>
+                                          <p:spTgt spid="122"/>
+                                        </p:tgtEl>
+                                        <p:attrNameLst>
+                                          <p:attrName>style.visibility</p:attrName>
+                                        </p:attrNameLst>
+                                      </p:cBhvr>
+                                      <p:to>
+                                        <p:strVal val="visible"/>
+                                      </p:to>
+                                    </p:set>
+                                  </p:childTnLst>
+                                </p:cTn>
+                              </p:par>
+                            </p:childTnLst>
+                          </p:cTn>
+                        </p:par>
+                      </p:childTnLst>
+                    </p:cTn>
+                  </p:par>
+                </p:childTnLst>
+              </p:cTn>
+              <p:prevCondLst>
+                <p:cond evt="onPrev">
+                  <p:tgtEl>
+                    <p:sldTgt/>
+                  </p:tgtEl>
+                </p:cond>
+              </p:prevCondLst>
+              <p:nextCondLst>
+                <p:cond evt="onNext">
+                  <p:tgtEl>
+                    <p:sldTgt/>
+                  </p:tgtEl>
+                </p:cond>
+              </p:nextCondLst>
+            </p:seq>
+          </p:childTnLst>
+        </p:cTn>
+      </p:par>
+    </p:tnLst>
+  </p:timing>
 </p:sld>
 </file>
 
@@ -15055,7 +16170,7 @@
   <p:cSld>
     <p:spTree>
       <p:nvGrpSpPr>
-        <p:cNvPr id="127" name="Shape 127"/>
+        <p:cNvPr id="131" name="Shape 131"/>
         <p:cNvGrpSpPr/>
         <p:nvPr/>
       </p:nvGrpSpPr>
@@ -15069,7 +16184,7 @@
       </p:grpSpPr>
       <p:sp>
         <p:nvSpPr>
-          <p:cNvPr id="128" name="Google Shape;128;g276e2b878a6_0_7"/>
+          <p:cNvPr id="132" name="Google Shape;132;g276e2b878a6_0_7"/>
           <p:cNvSpPr txBox="1"/>
           <p:nvPr>
             <p:ph type="title"/>
@@ -15117,7 +16232,7 @@
       </p:sp>
       <p:sp>
         <p:nvSpPr>
-          <p:cNvPr id="129" name="Google Shape;129;g276e2b878a6_0_7"/>
+          <p:cNvPr id="133" name="Google Shape;133;g276e2b878a6_0_7"/>
           <p:cNvSpPr txBox="1"/>
           <p:nvPr/>
         </p:nvSpPr>
@@ -15221,7 +16336,7 @@
       </p:sp>
       <p:pic>
         <p:nvPicPr>
-          <p:cNvPr id="130" name="Google Shape;130;g276e2b878a6_0_7"/>
+          <p:cNvPr id="134" name="Google Shape;134;g276e2b878a6_0_7"/>
           <p:cNvPicPr preferRelativeResize="0"/>
           <p:nvPr/>
         </p:nvPicPr>
@@ -15255,7 +16370,7 @@
       </p:pic>
       <p:pic>
         <p:nvPicPr>
-          <p:cNvPr id="131" name="Google Shape;131;g276e2b878a6_0_7"/>
+          <p:cNvPr id="135" name="Google Shape;135;g276e2b878a6_0_7"/>
           <p:cNvPicPr preferRelativeResize="0"/>
           <p:nvPr/>
         </p:nvPicPr>
@@ -15289,7 +16404,7 @@
       </p:pic>
       <p:pic>
         <p:nvPicPr>
-          <p:cNvPr id="132" name="Google Shape;132;g276e2b878a6_0_7"/>
+          <p:cNvPr id="136" name="Google Shape;136;g276e2b878a6_0_7"/>
           <p:cNvPicPr preferRelativeResize="0"/>
           <p:nvPr/>
         </p:nvPicPr>
@@ -15323,7 +16438,7 @@
       </p:pic>
       <p:pic>
         <p:nvPicPr>
-          <p:cNvPr id="133" name="Google Shape;133;g276e2b878a6_0_7"/>
+          <p:cNvPr id="137" name="Google Shape;137;g276e2b878a6_0_7"/>
           <p:cNvPicPr preferRelativeResize="0"/>
           <p:nvPr/>
         </p:nvPicPr>
@@ -15357,7 +16472,7 @@
       </p:pic>
       <p:pic>
         <p:nvPicPr>
-          <p:cNvPr id="134" name="Google Shape;134;g276e2b878a6_0_7"/>
+          <p:cNvPr id="138" name="Google Shape;138;g276e2b878a6_0_7"/>
           <p:cNvPicPr preferRelativeResize="0"/>
           <p:nvPr/>
         </p:nvPicPr>
@@ -15402,7 +16517,7 @@
   <p:cSld>
     <p:spTree>
       <p:nvGrpSpPr>
-        <p:cNvPr id="138" name="Shape 138"/>
+        <p:cNvPr id="142" name="Shape 142"/>
         <p:cNvGrpSpPr/>
         <p:nvPr/>
       </p:nvGrpSpPr>
@@ -15416,7 +16531,7 @@
       </p:grpSpPr>
       <p:sp>
         <p:nvSpPr>
-          <p:cNvPr id="139" name="Google Shape;139;p6"/>
+          <p:cNvPr id="143" name="Google Shape;143;g36ee14835eb_0_4"/>
           <p:cNvSpPr txBox="1"/>
           <p:nvPr>
             <p:ph type="title"/>
@@ -15424,8 +16539,46 @@
         </p:nvSpPr>
         <p:spPr>
           <a:xfrm>
-            <a:off x="311700" y="219900"/>
+            <a:off x="311700" y="445025"/>
             <a:ext cx="8520600" cy="572700"/>
+          </a:xfrm>
+          <a:prstGeom prst="rect">
+            <a:avLst/>
+          </a:prstGeom>
+        </p:spPr>
+        <p:txBody>
+          <a:bodyPr anchorCtr="0" anchor="t" bIns="91425" lIns="91425" spcFirstLastPara="1" rIns="91425" wrap="square" tIns="91425">
+            <a:normAutofit fontScale="90000"/>
+          </a:bodyPr>
+          <a:lstStyle/>
+          <a:p>
+            <a:pPr indent="0" lvl="0" marL="0" rtl="0" algn="l">
+              <a:spcBef>
+                <a:spcPts val="0"/>
+              </a:spcBef>
+              <a:spcAft>
+                <a:spcPts val="0"/>
+              </a:spcAft>
+              <a:buNone/>
+            </a:pPr>
+            <a:r>
+              <a:rPr lang="en"/>
+              <a:t>Installation demo</a:t>
+            </a:r>
+            <a:endParaRPr/>
+          </a:p>
+        </p:txBody>
+      </p:sp>
+      <p:sp>
+        <p:nvSpPr>
+          <p:cNvPr id="144" name="Google Shape;144;g36ee14835eb_0_4"/>
+          <p:cNvSpPr txBox="1"/>
+          <p:nvPr/>
+        </p:nvSpPr>
+        <p:spPr>
+          <a:xfrm>
+            <a:off x="1974900" y="4681800"/>
+            <a:ext cx="5194200" cy="400200"/>
           </a:xfrm>
           <a:prstGeom prst="rect">
             <a:avLst/>
@@ -15437,47 +16590,295 @@
         </p:spPr>
         <p:txBody>
           <a:bodyPr anchorCtr="0" anchor="t" bIns="91425" lIns="91425" spcFirstLastPara="1" rIns="91425" wrap="square" tIns="91425">
-            <a:normAutofit fontScale="90000"/>
+            <a:spAutoFit/>
           </a:bodyPr>
           <a:lstStyle/>
           <a:p>
             <a:pPr indent="0" lvl="0" marL="0" rtl="0" algn="ctr">
-              <a:lnSpc>
-                <a:spcPct val="100000"/>
-              </a:lnSpc>
-              <a:spcBef>
-                <a:spcPts val="0"/>
-              </a:spcBef>
-              <a:spcAft>
-                <a:spcPts val="0"/>
-              </a:spcAft>
-              <a:buClr>
-                <a:srgbClr val="000000"/>
-              </a:buClr>
-              <a:buSzPct val="111111"/>
-              <a:buFont typeface="Arial"/>
+              <a:spcBef>
+                <a:spcPts val="0"/>
+              </a:spcBef>
+              <a:spcAft>
+                <a:spcPts val="0"/>
+              </a:spcAft>
               <a:buNone/>
             </a:pPr>
             <a:r>
-              <a:rPr lang="en"/>
-              <a:t>R you ready to learn some R?</a:t>
+              <a:rPr lang="en" u="sng">
+                <a:solidFill>
+                  <a:schemeClr val="accent1"/>
+                </a:solidFill>
+                <a:hlinkClick r:id="rId3">
+                  <a:extLst>
+                    <a:ext uri="{A12FA001-AC4F-418D-AE19-62706E023703}">
+                      <ahyp:hlinkClr val="tx"/>
+                    </a:ext>
+                  </a:extLst>
+                </a:hlinkClick>
+              </a:rPr>
+              <a:t>https://github.com/jhollist/dadjokeapi</a:t>
             </a:r>
-            <a:endParaRPr b="1"/>
+            <a:endParaRPr>
+              <a:solidFill>
+                <a:schemeClr val="accent1"/>
+              </a:solidFill>
+            </a:endParaRPr>
           </a:p>
         </p:txBody>
       </p:sp>
       <p:sp>
         <p:nvSpPr>
-          <p:cNvPr id="140" name="Google Shape;140;p6"/>
-          <p:cNvSpPr txBox="1"/>
-          <p:nvPr>
-            <p:ph idx="1" type="body"/>
-          </p:nvPr>
+          <p:cNvPr id="145" name="Google Shape;145;g36ee14835eb_0_4"/>
+          <p:cNvSpPr/>
+          <p:nvPr/>
         </p:nvSpPr>
         <p:spPr>
           <a:xfrm>
-            <a:off x="311700" y="1152475"/>
-            <a:ext cx="8832300" cy="3416400"/>
+            <a:off x="2308500" y="3116138"/>
+            <a:ext cx="4527000" cy="751800"/>
+          </a:xfrm>
+          <a:prstGeom prst="rect">
+            <a:avLst/>
+          </a:prstGeom>
+          <a:solidFill>
+            <a:schemeClr val="lt2"/>
+          </a:solidFill>
+          <a:ln cap="flat" cmpd="sng" w="9525">
+            <a:solidFill>
+              <a:srgbClr val="999999"/>
+            </a:solidFill>
+            <a:prstDash val="solid"/>
+            <a:round/>
+            <a:headEnd len="sm" w="sm" type="none"/>
+            <a:tailEnd len="sm" w="sm" type="none"/>
+          </a:ln>
+          <a:effectLst>
+            <a:outerShdw blurRad="57150" rotWithShape="0" algn="bl" dir="5400000" dist="19050">
+              <a:srgbClr val="000000">
+                <a:alpha val="50000"/>
+              </a:srgbClr>
+            </a:outerShdw>
+          </a:effectLst>
+        </p:spPr>
+        <p:txBody>
+          <a:bodyPr anchorCtr="0" anchor="ctr" bIns="91425" lIns="91425" spcFirstLastPara="1" rIns="91425" wrap="square" tIns="91425">
+            <a:noAutofit/>
+          </a:bodyPr>
+          <a:lstStyle/>
+          <a:p>
+            <a:pPr indent="0" lvl="0" marL="0" rtl="0" algn="l">
+              <a:spcBef>
+                <a:spcPts val="0"/>
+              </a:spcBef>
+              <a:spcAft>
+                <a:spcPts val="0"/>
+              </a:spcAft>
+              <a:buNone/>
+            </a:pPr>
+            <a:r>
+              <a:rPr lang="en">
+                <a:solidFill>
+                  <a:srgbClr val="666666"/>
+                </a:solidFill>
+                <a:latin typeface="Consolas"/>
+                <a:ea typeface="Consolas"/>
+                <a:cs typeface="Consolas"/>
+                <a:sym typeface="Consolas"/>
+              </a:rPr>
+              <a:t># Now we can install the Dad Joke API package from CRAN</a:t>
+            </a:r>
+            <a:endParaRPr>
+              <a:solidFill>
+                <a:srgbClr val="666666"/>
+              </a:solidFill>
+              <a:latin typeface="Consolas"/>
+              <a:ea typeface="Consolas"/>
+              <a:cs typeface="Consolas"/>
+              <a:sym typeface="Consolas"/>
+            </a:endParaRPr>
+          </a:p>
+          <a:p>
+            <a:pPr indent="0" lvl="0" marL="0" rtl="0" algn="l">
+              <a:spcBef>
+                <a:spcPts val="0"/>
+              </a:spcBef>
+              <a:spcAft>
+                <a:spcPts val="0"/>
+              </a:spcAft>
+              <a:buNone/>
+            </a:pPr>
+            <a:r>
+              <a:rPr lang="en">
+                <a:latin typeface="Consolas"/>
+                <a:ea typeface="Consolas"/>
+                <a:cs typeface="Consolas"/>
+                <a:sym typeface="Consolas"/>
+              </a:rPr>
+              <a:t>install.packages(</a:t>
+            </a:r>
+            <a:r>
+              <a:rPr lang="en">
+                <a:solidFill>
+                  <a:schemeClr val="accent1"/>
+                </a:solidFill>
+                <a:latin typeface="Consolas"/>
+                <a:ea typeface="Consolas"/>
+                <a:cs typeface="Consolas"/>
+                <a:sym typeface="Consolas"/>
+              </a:rPr>
+              <a:t>"dadjokeapi"</a:t>
+            </a:r>
+            <a:r>
+              <a:rPr lang="en">
+                <a:latin typeface="Consolas"/>
+                <a:ea typeface="Consolas"/>
+                <a:cs typeface="Consolas"/>
+                <a:sym typeface="Consolas"/>
+              </a:rPr>
+              <a:t>)</a:t>
+            </a:r>
+            <a:endParaRPr>
+              <a:latin typeface="Consolas"/>
+              <a:ea typeface="Consolas"/>
+              <a:cs typeface="Consolas"/>
+              <a:sym typeface="Consolas"/>
+            </a:endParaRPr>
+          </a:p>
+        </p:txBody>
+      </p:sp>
+      <p:sp>
+        <p:nvSpPr>
+          <p:cNvPr id="146" name="Google Shape;146;g36ee14835eb_0_4"/>
+          <p:cNvSpPr/>
+          <p:nvPr/>
+        </p:nvSpPr>
+        <p:spPr>
+          <a:xfrm>
+            <a:off x="2308500" y="3998725"/>
+            <a:ext cx="4527000" cy="635700"/>
+          </a:xfrm>
+          <a:prstGeom prst="rect">
+            <a:avLst/>
+          </a:prstGeom>
+          <a:solidFill>
+            <a:schemeClr val="lt2"/>
+          </a:solidFill>
+          <a:ln cap="flat" cmpd="sng" w="9525">
+            <a:solidFill>
+              <a:srgbClr val="999999"/>
+            </a:solidFill>
+            <a:prstDash val="solid"/>
+            <a:round/>
+            <a:headEnd len="sm" w="sm" type="none"/>
+            <a:tailEnd len="sm" w="sm" type="none"/>
+          </a:ln>
+          <a:effectLst>
+            <a:outerShdw blurRad="57150" rotWithShape="0" algn="bl" dir="5400000" dist="19050">
+              <a:srgbClr val="000000">
+                <a:alpha val="50000"/>
+              </a:srgbClr>
+            </a:outerShdw>
+          </a:effectLst>
+        </p:spPr>
+        <p:txBody>
+          <a:bodyPr anchorCtr="0" anchor="ctr" bIns="91425" lIns="91425" spcFirstLastPara="1" rIns="91425" wrap="square" tIns="91425">
+            <a:noAutofit/>
+          </a:bodyPr>
+          <a:lstStyle/>
+          <a:p>
+            <a:pPr indent="0" lvl="0" marL="0" rtl="0" algn="l">
+              <a:spcBef>
+                <a:spcPts val="0"/>
+              </a:spcBef>
+              <a:spcAft>
+                <a:spcPts val="0"/>
+              </a:spcAft>
+              <a:buNone/>
+            </a:pPr>
+            <a:r>
+              <a:rPr lang="en">
+                <a:solidFill>
+                  <a:srgbClr val="666666"/>
+                </a:solidFill>
+                <a:latin typeface="Consolas"/>
+                <a:ea typeface="Consolas"/>
+                <a:cs typeface="Consolas"/>
+                <a:sym typeface="Consolas"/>
+              </a:rPr>
+              <a:t># This is a basic prompt to get a joke :)</a:t>
+            </a:r>
+            <a:endParaRPr>
+              <a:solidFill>
+                <a:srgbClr val="666666"/>
+              </a:solidFill>
+              <a:latin typeface="Consolas"/>
+              <a:ea typeface="Consolas"/>
+              <a:cs typeface="Consolas"/>
+              <a:sym typeface="Consolas"/>
+            </a:endParaRPr>
+          </a:p>
+          <a:p>
+            <a:pPr indent="0" lvl="0" marL="0" rtl="0" algn="l">
+              <a:spcBef>
+                <a:spcPts val="0"/>
+              </a:spcBef>
+              <a:spcAft>
+                <a:spcPts val="0"/>
+              </a:spcAft>
+              <a:buNone/>
+            </a:pPr>
+            <a:r>
+              <a:rPr lang="en">
+                <a:solidFill>
+                  <a:srgbClr val="674EA7"/>
+                </a:solidFill>
+                <a:latin typeface="Consolas"/>
+                <a:ea typeface="Consolas"/>
+                <a:cs typeface="Consolas"/>
+                <a:sym typeface="Consolas"/>
+              </a:rPr>
+              <a:t>dadjokeapi</a:t>
+            </a:r>
+            <a:r>
+              <a:rPr lang="en">
+                <a:solidFill>
+                  <a:srgbClr val="E69138"/>
+                </a:solidFill>
+                <a:latin typeface="Consolas"/>
+                <a:ea typeface="Consolas"/>
+                <a:cs typeface="Consolas"/>
+                <a:sym typeface="Consolas"/>
+              </a:rPr>
+              <a:t>::</a:t>
+            </a:r>
+            <a:r>
+              <a:rPr lang="en">
+                <a:latin typeface="Consolas"/>
+                <a:ea typeface="Consolas"/>
+                <a:cs typeface="Consolas"/>
+                <a:sym typeface="Consolas"/>
+              </a:rPr>
+              <a:t>groan()</a:t>
+            </a:r>
+            <a:endParaRPr>
+              <a:latin typeface="Consolas"/>
+              <a:ea typeface="Consolas"/>
+              <a:cs typeface="Consolas"/>
+              <a:sym typeface="Consolas"/>
+            </a:endParaRPr>
+          </a:p>
+        </p:txBody>
+      </p:sp>
+      <p:sp>
+        <p:nvSpPr>
+          <p:cNvPr id="147" name="Google Shape;147;g36ee14835eb_0_4"/>
+          <p:cNvSpPr txBox="1"/>
+          <p:nvPr/>
+        </p:nvSpPr>
+        <p:spPr>
+          <a:xfrm>
+            <a:off x="1590900" y="1017725"/>
+            <a:ext cx="5962200" cy="461700"/>
           </a:xfrm>
           <a:prstGeom prst="rect">
             <a:avLst/>
@@ -15489,162 +16890,253 @@
         </p:spPr>
         <p:txBody>
           <a:bodyPr anchorCtr="0" anchor="t" bIns="91425" lIns="91425" spcFirstLastPara="1" rIns="91425" wrap="square" tIns="91425">
-            <a:normAutofit/>
+            <a:spAutoFit/>
           </a:bodyPr>
           <a:lstStyle/>
           <a:p>
-            <a:pPr indent="-355600" lvl="0" marL="457200" rtl="0" algn="l">
-              <a:lnSpc>
-                <a:spcPct val="115000"/>
-              </a:lnSpc>
-              <a:spcBef>
-                <a:spcPts val="0"/>
-              </a:spcBef>
-              <a:spcAft>
-                <a:spcPts val="0"/>
-              </a:spcAft>
-              <a:buSzPts val="2000"/>
-              <a:buChar char="●"/>
+            <a:pPr indent="0" lvl="0" marL="0" rtl="0" algn="l">
+              <a:spcBef>
+                <a:spcPts val="0"/>
+              </a:spcBef>
+              <a:spcAft>
+                <a:spcPts val="0"/>
+              </a:spcAft>
+              <a:buNone/>
             </a:pPr>
             <a:r>
-              <a:rPr lang="en" sz="2000"/>
-              <a:t>Let’s go over the </a:t>
+              <a:rPr lang="en" sz="1800">
+                <a:solidFill>
+                  <a:schemeClr val="dk2"/>
+                </a:solidFill>
+              </a:rPr>
+              <a:t>In an R console, we will install </a:t>
             </a:r>
             <a:r>
-              <a:rPr lang="en" sz="2000">
-                <a:solidFill>
-                  <a:srgbClr val="1155CC"/>
+              <a:rPr lang="en" sz="1800">
+                <a:solidFill>
+                  <a:schemeClr val="dk2"/>
                 </a:solidFill>
                 <a:latin typeface="Consolas"/>
                 <a:ea typeface="Consolas"/>
                 <a:cs typeface="Consolas"/>
                 <a:sym typeface="Consolas"/>
               </a:rPr>
-              <a:t>Day6_worksheet1_Introduction_to_R.md </a:t>
+              <a:t>dadjokeapi</a:t>
             </a:r>
             <a:r>
-              <a:rPr lang="en" sz="2000"/>
-              <a:t>worksheet:</a:t>
+              <a:rPr lang="en" sz="1800">
+                <a:solidFill>
+                  <a:schemeClr val="dk2"/>
+                </a:solidFill>
+              </a:rPr>
+              <a:t>!</a:t>
             </a:r>
-            <a:endParaRPr sz="2000"/>
-          </a:p>
-          <a:p>
-            <a:pPr indent="-355600" lvl="1" marL="914400" rtl="0" algn="l">
-              <a:lnSpc>
-                <a:spcPct val="115000"/>
-              </a:lnSpc>
-              <a:spcBef>
-                <a:spcPts val="0"/>
-              </a:spcBef>
-              <a:spcAft>
-                <a:spcPts val="0"/>
-              </a:spcAft>
-              <a:buSzPts val="2000"/>
-              <a:buChar char="○"/>
-            </a:pPr>
-            <a:r>
-              <a:rPr lang="en" sz="2000"/>
-              <a:t>Introduction to R in the terminal</a:t>
-            </a:r>
-            <a:endParaRPr sz="2000"/>
-          </a:p>
-          <a:p>
-            <a:pPr indent="-355600" lvl="1" marL="914400" rtl="0" algn="l">
-              <a:lnSpc>
-                <a:spcPct val="115000"/>
-              </a:lnSpc>
-              <a:spcBef>
-                <a:spcPts val="0"/>
-              </a:spcBef>
-              <a:spcAft>
-                <a:spcPts val="0"/>
-              </a:spcAft>
-              <a:buSzPts val="2000"/>
-              <a:buChar char="○"/>
-            </a:pPr>
-            <a:r>
-              <a:rPr lang="en" sz="2000"/>
-              <a:t>Learn basic R commands</a:t>
-            </a:r>
-            <a:endParaRPr sz="2000"/>
+            <a:endParaRPr sz="1800">
+              <a:solidFill>
+                <a:schemeClr val="dk2"/>
+              </a:solidFill>
+            </a:endParaRPr>
           </a:p>
         </p:txBody>
       </p:sp>
       <p:sp>
         <p:nvSpPr>
-          <p:cNvPr id="141" name="Google Shape;141;p6"/>
-          <p:cNvSpPr txBox="1"/>
-          <p:nvPr>
-            <p:ph idx="1" type="body"/>
-          </p:nvPr>
+          <p:cNvPr id="148" name="Google Shape;148;g36ee14835eb_0_4"/>
+          <p:cNvSpPr/>
+          <p:nvPr/>
         </p:nvSpPr>
         <p:spPr>
           <a:xfrm>
-            <a:off x="3398550" y="4640400"/>
-            <a:ext cx="2346900" cy="495900"/>
+            <a:off x="2308500" y="1596688"/>
+            <a:ext cx="4527000" cy="635700"/>
           </a:xfrm>
           <a:prstGeom prst="rect">
             <a:avLst/>
           </a:prstGeom>
-          <a:noFill/>
-          <a:ln>
-            <a:noFill/>
+          <a:solidFill>
+            <a:schemeClr val="lt2"/>
+          </a:solidFill>
+          <a:ln cap="flat" cmpd="sng" w="9525">
+            <a:solidFill>
+              <a:srgbClr val="999999"/>
+            </a:solidFill>
+            <a:prstDash val="solid"/>
+            <a:round/>
+            <a:headEnd len="sm" w="sm" type="none"/>
+            <a:tailEnd len="sm" w="sm" type="none"/>
           </a:ln>
+          <a:effectLst>
+            <a:outerShdw blurRad="57150" rotWithShape="0" algn="bl" dir="5400000" dist="19050">
+              <a:srgbClr val="000000">
+                <a:alpha val="50000"/>
+              </a:srgbClr>
+            </a:outerShdw>
+          </a:effectLst>
         </p:spPr>
         <p:txBody>
-          <a:bodyPr anchorCtr="0" anchor="t" bIns="91425" lIns="91425" spcFirstLastPara="1" rIns="91425" wrap="square" tIns="91425">
-            <a:normAutofit/>
+          <a:bodyPr anchorCtr="0" anchor="ctr" bIns="91425" lIns="91425" spcFirstLastPara="1" rIns="91425" wrap="square" tIns="91425">
+            <a:noAutofit/>
           </a:bodyPr>
           <a:lstStyle/>
           <a:p>
-            <a:pPr indent="0" lvl="0" marL="0" rtl="0" algn="ctr">
-              <a:lnSpc>
-                <a:spcPct val="115000"/>
-              </a:lnSpc>
-              <a:spcBef>
-                <a:spcPts val="0"/>
-              </a:spcBef>
-              <a:spcAft>
-                <a:spcPts val="1200"/>
-              </a:spcAft>
-              <a:buSzPts val="1800"/>
+            <a:pPr indent="0" lvl="0" marL="0" rtl="0" algn="l">
+              <a:spcBef>
+                <a:spcPts val="0"/>
+              </a:spcBef>
+              <a:spcAft>
+                <a:spcPts val="0"/>
+              </a:spcAft>
               <a:buNone/>
             </a:pPr>
             <a:r>
-              <a:rPr lang="en"/>
-              <a:t>R console</a:t>
+              <a:rPr lang="en">
+                <a:solidFill>
+                  <a:srgbClr val="666666"/>
+                </a:solidFill>
+                <a:latin typeface="Consolas"/>
+                <a:ea typeface="Consolas"/>
+                <a:cs typeface="Consolas"/>
+                <a:sym typeface="Consolas"/>
+              </a:rPr>
+              <a:t># First, we will load R</a:t>
             </a:r>
-            <a:endParaRPr/>
+            <a:endParaRPr>
+              <a:solidFill>
+                <a:srgbClr val="666666"/>
+              </a:solidFill>
+              <a:latin typeface="Consolas"/>
+              <a:ea typeface="Consolas"/>
+              <a:cs typeface="Consolas"/>
+              <a:sym typeface="Consolas"/>
+            </a:endParaRPr>
+          </a:p>
+          <a:p>
+            <a:pPr indent="0" lvl="0" marL="0" rtl="0" algn="l">
+              <a:spcBef>
+                <a:spcPts val="0"/>
+              </a:spcBef>
+              <a:spcAft>
+                <a:spcPts val="0"/>
+              </a:spcAft>
+              <a:buNone/>
+            </a:pPr>
+            <a:r>
+              <a:rPr lang="en">
+                <a:latin typeface="Consolas"/>
+                <a:ea typeface="Consolas"/>
+                <a:cs typeface="Consolas"/>
+                <a:sym typeface="Consolas"/>
+              </a:rPr>
+              <a:t>module load R/4.3.1</a:t>
+            </a:r>
+            <a:endParaRPr>
+              <a:latin typeface="Consolas"/>
+              <a:ea typeface="Consolas"/>
+              <a:cs typeface="Consolas"/>
+              <a:sym typeface="Consolas"/>
+            </a:endParaRPr>
           </a:p>
         </p:txBody>
       </p:sp>
-      <p:pic>
-        <p:nvPicPr>
-          <p:cNvPr id="142" name="Google Shape;142;p6"/>
-          <p:cNvPicPr preferRelativeResize="0"/>
+      <p:sp>
+        <p:nvSpPr>
+          <p:cNvPr id="149" name="Google Shape;149;g36ee14835eb_0_4"/>
+          <p:cNvSpPr/>
           <p:nvPr/>
-        </p:nvPicPr>
-        <p:blipFill rotWithShape="1">
-          <a:blip r:embed="rId3">
-            <a:alphaModFix/>
-          </a:blip>
-          <a:srcRect b="0" l="0" r="0" t="0"/>
-          <a:stretch/>
-        </p:blipFill>
+        </p:nvSpPr>
         <p:spPr>
           <a:xfrm>
-            <a:off x="3249225" y="2627825"/>
-            <a:ext cx="2645556" cy="2012567"/>
+            <a:off x="2308500" y="2349650"/>
+            <a:ext cx="4527000" cy="635700"/>
           </a:xfrm>
           <a:prstGeom prst="rect">
             <a:avLst/>
           </a:prstGeom>
-          <a:noFill/>
-          <a:ln>
-            <a:noFill/>
+          <a:solidFill>
+            <a:schemeClr val="lt2"/>
+          </a:solidFill>
+          <a:ln cap="flat" cmpd="sng" w="9525">
+            <a:solidFill>
+              <a:srgbClr val="999999"/>
+            </a:solidFill>
+            <a:prstDash val="solid"/>
+            <a:round/>
+            <a:headEnd len="sm" w="sm" type="none"/>
+            <a:tailEnd len="sm" w="sm" type="none"/>
           </a:ln>
+          <a:effectLst>
+            <a:outerShdw blurRad="57150" rotWithShape="0" algn="bl" dir="5400000" dist="19050">
+              <a:srgbClr val="000000">
+                <a:alpha val="50000"/>
+              </a:srgbClr>
+            </a:outerShdw>
+          </a:effectLst>
         </p:spPr>
-      </p:pic>
+        <p:txBody>
+          <a:bodyPr anchorCtr="0" anchor="ctr" bIns="91425" lIns="91425" spcFirstLastPara="1" rIns="91425" wrap="square" tIns="91425">
+            <a:noAutofit/>
+          </a:bodyPr>
+          <a:lstStyle/>
+          <a:p>
+            <a:pPr indent="0" lvl="0" marL="0" rtl="0" algn="l">
+              <a:spcBef>
+                <a:spcPts val="0"/>
+              </a:spcBef>
+              <a:spcAft>
+                <a:spcPts val="0"/>
+              </a:spcAft>
+              <a:buNone/>
+            </a:pPr>
+            <a:r>
+              <a:rPr lang="en">
+                <a:solidFill>
+                  <a:srgbClr val="666666"/>
+                </a:solidFill>
+                <a:latin typeface="Consolas"/>
+                <a:ea typeface="Consolas"/>
+                <a:cs typeface="Consolas"/>
+                <a:sym typeface="Consolas"/>
+              </a:rPr>
+              <a:t># In the terminal, we launch R console</a:t>
+            </a:r>
+            <a:endParaRPr>
+              <a:solidFill>
+                <a:srgbClr val="666666"/>
+              </a:solidFill>
+              <a:latin typeface="Consolas"/>
+              <a:ea typeface="Consolas"/>
+              <a:cs typeface="Consolas"/>
+              <a:sym typeface="Consolas"/>
+            </a:endParaRPr>
+          </a:p>
+          <a:p>
+            <a:pPr indent="0" lvl="0" marL="0" rtl="0" algn="l">
+              <a:spcBef>
+                <a:spcPts val="0"/>
+              </a:spcBef>
+              <a:spcAft>
+                <a:spcPts val="0"/>
+              </a:spcAft>
+              <a:buNone/>
+            </a:pPr>
+            <a:r>
+              <a:rPr lang="en">
+                <a:latin typeface="Consolas"/>
+                <a:ea typeface="Consolas"/>
+                <a:cs typeface="Consolas"/>
+                <a:sym typeface="Consolas"/>
+              </a:rPr>
+              <a:t>$ R</a:t>
+            </a:r>
+            <a:endParaRPr>
+              <a:latin typeface="Consolas"/>
+              <a:ea typeface="Consolas"/>
+              <a:cs typeface="Consolas"/>
+              <a:sym typeface="Consolas"/>
+            </a:endParaRPr>
+          </a:p>
+        </p:txBody>
+      </p:sp>
     </p:spTree>
   </p:cSld>
   <p:clrMapOvr>
@@ -15654,6 +17146,285 @@
 </file>
 
 <file path=ppt/theme/theme1.xml><?xml version="1.0" encoding="utf-8"?>
+<a:theme xmlns:a="http://schemas.openxmlformats.org/drawingml/2006/main" xmlns:r="http://schemas.openxmlformats.org/officeDocument/2006/relationships" name="Simple Light">
+  <a:themeElements>
+    <a:clrScheme name="Simple Light">
+      <a:dk1>
+        <a:srgbClr val="000000"/>
+      </a:dk1>
+      <a:lt1>
+        <a:srgbClr val="FFFFFF"/>
+      </a:lt1>
+      <a:dk2>
+        <a:srgbClr val="595959"/>
+      </a:dk2>
+      <a:lt2>
+        <a:srgbClr val="EEEEEE"/>
+      </a:lt2>
+      <a:accent1>
+        <a:srgbClr val="4285F4"/>
+      </a:accent1>
+      <a:accent2>
+        <a:srgbClr val="212121"/>
+      </a:accent2>
+      <a:accent3>
+        <a:srgbClr val="78909C"/>
+      </a:accent3>
+      <a:accent4>
+        <a:srgbClr val="FFAB40"/>
+      </a:accent4>
+      <a:accent5>
+        <a:srgbClr val="0097A7"/>
+      </a:accent5>
+      <a:accent6>
+        <a:srgbClr val="EEFF41"/>
+      </a:accent6>
+      <a:hlink>
+        <a:srgbClr val="0097A7"/>
+      </a:hlink>
+      <a:folHlink>
+        <a:srgbClr val="0097A7"/>
+      </a:folHlink>
+    </a:clrScheme>
+    <a:fontScheme name="Office">
+      <a:majorFont>
+        <a:latin typeface="Arial"/>
+        <a:ea typeface=""/>
+        <a:cs typeface=""/>
+        <a:font script="Jpan" typeface="ＭＳ Ｐゴシック"/>
+        <a:font script="Hang" typeface="맑은 고딕"/>
+        <a:font script="Hans" typeface="宋体"/>
+        <a:font script="Hant" typeface="新細明體"/>
+        <a:font script="Arab" typeface="Times New Roman"/>
+        <a:font script="Hebr" typeface="Times New Roman"/>
+        <a:font script="Thai" typeface="Angsana New"/>
+        <a:font script="Ethi" typeface="Nyala"/>
+        <a:font script="Beng" typeface="Vrinda"/>
+        <a:font script="Gujr" typeface="Shruti"/>
+        <a:font script="Khmr" typeface="MoolBoran"/>
+        <a:font script="Knda" typeface="Tunga"/>
+        <a:font script="Guru" typeface="Raavi"/>
+        <a:font script="Cans" typeface="Euphemia"/>
+        <a:font script="Cher" typeface="Plantagenet Cherokee"/>
+        <a:font script="Yiii" typeface="Microsoft Yi Baiti"/>
+        <a:font script="Tibt" typeface="Microsoft Himalaya"/>
+        <a:font script="Thaa" typeface="MV Boli"/>
+        <a:font script="Deva" typeface="Mangal"/>
+        <a:font script="Telu" typeface="Gautami"/>
+        <a:font script="Taml" typeface="Latha"/>
+        <a:font script="Syrc" typeface="Estrangelo Edessa"/>
+        <a:font script="Orya" typeface="Kalinga"/>
+        <a:font script="Mlym" typeface="Kartika"/>
+        <a:font script="Laoo" typeface="DokChampa"/>
+        <a:font script="Sinh" typeface="Iskoola Pota"/>
+        <a:font script="Mong" typeface="Mongolian Baiti"/>
+        <a:font script="Viet" typeface="Times New Roman"/>
+        <a:font script="Uigh" typeface="Microsoft Uighur"/>
+        <a:font script="Geor" typeface="Sylfaen"/>
+      </a:majorFont>
+      <a:minorFont>
+        <a:latin typeface="Arial"/>
+        <a:ea typeface=""/>
+        <a:cs typeface=""/>
+        <a:font script="Jpan" typeface="ＭＳ Ｐゴシック"/>
+        <a:font script="Hang" typeface="맑은 고딕"/>
+        <a:font script="Hans" typeface="宋体"/>
+        <a:font script="Hant" typeface="新細明體"/>
+        <a:font script="Arab" typeface="Arial"/>
+        <a:font script="Hebr" typeface="Arial"/>
+        <a:font script="Thai" typeface="Cordia New"/>
+        <a:font script="Ethi" typeface="Nyala"/>
+        <a:font script="Beng" typeface="Vrinda"/>
+        <a:font script="Gujr" typeface="Shruti"/>
+        <a:font script="Khmr" typeface="DaunPenh"/>
+        <a:font script="Knda" typeface="Tunga"/>
+        <a:font script="Guru" typeface="Raavi"/>
+        <a:font script="Cans" typeface="Euphemia"/>
+        <a:font script="Cher" typeface="Plantagenet Cherokee"/>
+        <a:font script="Yiii" typeface="Microsoft Yi Baiti"/>
+        <a:font script="Tibt" typeface="Microsoft Himalaya"/>
+        <a:font script="Thaa" typeface="MV Boli"/>
+        <a:font script="Deva" typeface="Mangal"/>
+        <a:font script="Telu" typeface="Gautami"/>
+        <a:font script="Taml" typeface="Latha"/>
+        <a:font script="Syrc" typeface="Estrangelo Edessa"/>
+        <a:font script="Orya" typeface="Kalinga"/>
+        <a:font script="Mlym" typeface="Kartika"/>
+        <a:font script="Laoo" typeface="DokChampa"/>
+        <a:font script="Sinh" typeface="Iskoola Pota"/>
+        <a:font script="Mong" typeface="Mongolian Baiti"/>
+        <a:font script="Viet" typeface="Arial"/>
+        <a:font script="Uigh" typeface="Microsoft Uighur"/>
+        <a:font script="Geor" typeface="Sylfaen"/>
+      </a:minorFont>
+    </a:fontScheme>
+    <a:fmtScheme name="Office">
+      <a:fillStyleLst>
+        <a:solidFill>
+          <a:schemeClr val="phClr"/>
+        </a:solidFill>
+        <a:gradFill rotWithShape="1">
+          <a:gsLst>
+            <a:gs pos="0">
+              <a:schemeClr val="phClr">
+                <a:tint val="50000"/>
+                <a:satMod val="300000"/>
+              </a:schemeClr>
+            </a:gs>
+            <a:gs pos="35000">
+              <a:schemeClr val="phClr">
+                <a:tint val="37000"/>
+                <a:satMod val="300000"/>
+              </a:schemeClr>
+            </a:gs>
+            <a:gs pos="100000">
+              <a:schemeClr val="phClr">
+                <a:tint val="15000"/>
+                <a:satMod val="350000"/>
+              </a:schemeClr>
+            </a:gs>
+          </a:gsLst>
+          <a:lin ang="16200000" scaled="1"/>
+        </a:gradFill>
+        <a:gradFill rotWithShape="1">
+          <a:gsLst>
+            <a:gs pos="0">
+              <a:schemeClr val="phClr">
+                <a:tint val="100000"/>
+                <a:shade val="100000"/>
+                <a:satMod val="130000"/>
+              </a:schemeClr>
+            </a:gs>
+            <a:gs pos="100000">
+              <a:schemeClr val="phClr">
+                <a:tint val="50000"/>
+                <a:shade val="100000"/>
+                <a:satMod val="350000"/>
+              </a:schemeClr>
+            </a:gs>
+          </a:gsLst>
+          <a:lin ang="16200000" scaled="0"/>
+        </a:gradFill>
+      </a:fillStyleLst>
+      <a:lnStyleLst>
+        <a:ln w="9525" cap="flat" cmpd="sng" algn="ctr">
+          <a:solidFill>
+            <a:schemeClr val="phClr">
+              <a:shade val="95000"/>
+              <a:satMod val="105000"/>
+            </a:schemeClr>
+          </a:solidFill>
+          <a:prstDash val="solid"/>
+        </a:ln>
+        <a:ln w="25400" cap="flat" cmpd="sng" algn="ctr">
+          <a:solidFill>
+            <a:schemeClr val="phClr"/>
+          </a:solidFill>
+          <a:prstDash val="solid"/>
+        </a:ln>
+        <a:ln w="38100" cap="flat" cmpd="sng" algn="ctr">
+          <a:solidFill>
+            <a:schemeClr val="phClr"/>
+          </a:solidFill>
+          <a:prstDash val="solid"/>
+        </a:ln>
+      </a:lnStyleLst>
+      <a:effectStyleLst>
+        <a:effectStyle>
+          <a:effectLst>
+            <a:outerShdw blurRad="40000" dist="20000" dir="5400000" rotWithShape="0">
+              <a:srgbClr val="000000">
+                <a:alpha val="38000"/>
+              </a:srgbClr>
+            </a:outerShdw>
+          </a:effectLst>
+        </a:effectStyle>
+        <a:effectStyle>
+          <a:effectLst>
+            <a:outerShdw blurRad="40000" dist="23000" dir="5400000" rotWithShape="0">
+              <a:srgbClr val="000000">
+                <a:alpha val="35000"/>
+              </a:srgbClr>
+            </a:outerShdw>
+          </a:effectLst>
+        </a:effectStyle>
+        <a:effectStyle>
+          <a:effectLst>
+            <a:outerShdw blurRad="40000" dist="23000" dir="5400000" rotWithShape="0">
+              <a:srgbClr val="000000">
+                <a:alpha val="35000"/>
+              </a:srgbClr>
+            </a:outerShdw>
+          </a:effectLst>
+          <a:scene3d>
+            <a:camera prst="orthographicFront">
+              <a:rot lat="0" lon="0" rev="0"/>
+            </a:camera>
+            <a:lightRig rig="threePt" dir="t">
+              <a:rot lat="0" lon="0" rev="1200000"/>
+            </a:lightRig>
+          </a:scene3d>
+          <a:sp3d>
+            <a:bevelT w="63500" h="25400"/>
+          </a:sp3d>
+        </a:effectStyle>
+      </a:effectStyleLst>
+      <a:bgFillStyleLst>
+        <a:solidFill>
+          <a:schemeClr val="phClr"/>
+        </a:solidFill>
+        <a:gradFill rotWithShape="1">
+          <a:gsLst>
+            <a:gs pos="0">
+              <a:schemeClr val="phClr">
+                <a:tint val="40000"/>
+                <a:satMod val="350000"/>
+              </a:schemeClr>
+            </a:gs>
+            <a:gs pos="40000">
+              <a:schemeClr val="phClr">
+                <a:tint val="45000"/>
+                <a:shade val="99000"/>
+                <a:satMod val="350000"/>
+              </a:schemeClr>
+            </a:gs>
+            <a:gs pos="100000">
+              <a:schemeClr val="phClr">
+                <a:shade val="20000"/>
+                <a:satMod val="255000"/>
+              </a:schemeClr>
+            </a:gs>
+          </a:gsLst>
+          <a:path path="circle">
+            <a:fillToRect l="50000" t="-80000" r="50000" b="180000"/>
+          </a:path>
+        </a:gradFill>
+        <a:gradFill rotWithShape="1">
+          <a:gsLst>
+            <a:gs pos="0">
+              <a:schemeClr val="phClr">
+                <a:tint val="80000"/>
+                <a:satMod val="300000"/>
+              </a:schemeClr>
+            </a:gs>
+            <a:gs pos="100000">
+              <a:schemeClr val="phClr">
+                <a:shade val="30000"/>
+                <a:satMod val="200000"/>
+              </a:schemeClr>
+            </a:gs>
+          </a:gsLst>
+          <a:path path="circle">
+            <a:fillToRect l="50000" t="50000" r="50000" b="50000"/>
+          </a:path>
+        </a:gradFill>
+      </a:bgFillStyleLst>
+    </a:fmtScheme>
+  </a:themeElements>
+</a:theme>
+</file>
+
+<file path=ppt/theme/theme2.xml><?xml version="1.0" encoding="utf-8"?>
 <a:theme xmlns:a="http://schemas.openxmlformats.org/drawingml/2006/main" xmlns:r="http://schemas.openxmlformats.org/officeDocument/2006/relationships">
   <a:themeElements>
     <a:clrScheme name="Default">
@@ -15930,283 +17701,4 @@
     </a:fmtScheme>
   </a:themeElements>
 </a:theme>
-</file>
-
-<file path=ppt/theme/theme2.xml><?xml version="1.0" encoding="utf-8"?>
-<a:theme xmlns:a="http://schemas.openxmlformats.org/drawingml/2006/main" xmlns:r="http://schemas.openxmlformats.org/officeDocument/2006/relationships" name="Simple Light">
-  <a:themeElements>
-    <a:clrScheme name="Simple Light">
-      <a:dk1>
-        <a:srgbClr val="000000"/>
-      </a:dk1>
-      <a:lt1>
-        <a:srgbClr val="FFFFFF"/>
-      </a:lt1>
-      <a:dk2>
-        <a:srgbClr val="595959"/>
-      </a:dk2>
-      <a:lt2>
-        <a:srgbClr val="EEEEEE"/>
-      </a:lt2>
-      <a:accent1>
-        <a:srgbClr val="4285F4"/>
-      </a:accent1>
-      <a:accent2>
-        <a:srgbClr val="212121"/>
-      </a:accent2>
-      <a:accent3>
-        <a:srgbClr val="78909C"/>
-      </a:accent3>
-      <a:accent4>
-        <a:srgbClr val="FFAB40"/>
-      </a:accent4>
-      <a:accent5>
-        <a:srgbClr val="0097A7"/>
-      </a:accent5>
-      <a:accent6>
-        <a:srgbClr val="EEFF41"/>
-      </a:accent6>
-      <a:hlink>
-        <a:srgbClr val="0097A7"/>
-      </a:hlink>
-      <a:folHlink>
-        <a:srgbClr val="0097A7"/>
-      </a:folHlink>
-    </a:clrScheme>
-    <a:fontScheme name="Office">
-      <a:majorFont>
-        <a:latin typeface="Arial"/>
-        <a:ea typeface=""/>
-        <a:cs typeface=""/>
-        <a:font script="Jpan" typeface="ＭＳ Ｐゴシック"/>
-        <a:font script="Hang" typeface="맑은 고딕"/>
-        <a:font script="Hans" typeface="宋体"/>
-        <a:font script="Hant" typeface="新細明體"/>
-        <a:font script="Arab" typeface="Times New Roman"/>
-        <a:font script="Hebr" typeface="Times New Roman"/>
-        <a:font script="Thai" typeface="Angsana New"/>
-        <a:font script="Ethi" typeface="Nyala"/>
-        <a:font script="Beng" typeface="Vrinda"/>
-        <a:font script="Gujr" typeface="Shruti"/>
-        <a:font script="Khmr" typeface="MoolBoran"/>
-        <a:font script="Knda" typeface="Tunga"/>
-        <a:font script="Guru" typeface="Raavi"/>
-        <a:font script="Cans" typeface="Euphemia"/>
-        <a:font script="Cher" typeface="Plantagenet Cherokee"/>
-        <a:font script="Yiii" typeface="Microsoft Yi Baiti"/>
-        <a:font script="Tibt" typeface="Microsoft Himalaya"/>
-        <a:font script="Thaa" typeface="MV Boli"/>
-        <a:font script="Deva" typeface="Mangal"/>
-        <a:font script="Telu" typeface="Gautami"/>
-        <a:font script="Taml" typeface="Latha"/>
-        <a:font script="Syrc" typeface="Estrangelo Edessa"/>
-        <a:font script="Orya" typeface="Kalinga"/>
-        <a:font script="Mlym" typeface="Kartika"/>
-        <a:font script="Laoo" typeface="DokChampa"/>
-        <a:font script="Sinh" typeface="Iskoola Pota"/>
-        <a:font script="Mong" typeface="Mongolian Baiti"/>
-        <a:font script="Viet" typeface="Times New Roman"/>
-        <a:font script="Uigh" typeface="Microsoft Uighur"/>
-        <a:font script="Geor" typeface="Sylfaen"/>
-      </a:majorFont>
-      <a:minorFont>
-        <a:latin typeface="Arial"/>
-        <a:ea typeface=""/>
-        <a:cs typeface=""/>
-        <a:font script="Jpan" typeface="ＭＳ Ｐゴシック"/>
-        <a:font script="Hang" typeface="맑은 고딕"/>
-        <a:font script="Hans" typeface="宋体"/>
-        <a:font script="Hant" typeface="新細明體"/>
-        <a:font script="Arab" typeface="Arial"/>
-        <a:font script="Hebr" typeface="Arial"/>
-        <a:font script="Thai" typeface="Cordia New"/>
-        <a:font script="Ethi" typeface="Nyala"/>
-        <a:font script="Beng" typeface="Vrinda"/>
-        <a:font script="Gujr" typeface="Shruti"/>
-        <a:font script="Khmr" typeface="DaunPenh"/>
-        <a:font script="Knda" typeface="Tunga"/>
-        <a:font script="Guru" typeface="Raavi"/>
-        <a:font script="Cans" typeface="Euphemia"/>
-        <a:font script="Cher" typeface="Plantagenet Cherokee"/>
-        <a:font script="Yiii" typeface="Microsoft Yi Baiti"/>
-        <a:font script="Tibt" typeface="Microsoft Himalaya"/>
-        <a:font script="Thaa" typeface="MV Boli"/>
-        <a:font script="Deva" typeface="Mangal"/>
-        <a:font script="Telu" typeface="Gautami"/>
-        <a:font script="Taml" typeface="Latha"/>
-        <a:font script="Syrc" typeface="Estrangelo Edessa"/>
-        <a:font script="Orya" typeface="Kalinga"/>
-        <a:font script="Mlym" typeface="Kartika"/>
-        <a:font script="Laoo" typeface="DokChampa"/>
-        <a:font script="Sinh" typeface="Iskoola Pota"/>
-        <a:font script="Mong" typeface="Mongolian Baiti"/>
-        <a:font script="Viet" typeface="Arial"/>
-        <a:font script="Uigh" typeface="Microsoft Uighur"/>
-        <a:font script="Geor" typeface="Sylfaen"/>
-      </a:minorFont>
-    </a:fontScheme>
-    <a:fmtScheme name="Office">
-      <a:fillStyleLst>
-        <a:solidFill>
-          <a:schemeClr val="phClr"/>
-        </a:solidFill>
-        <a:gradFill rotWithShape="1">
-          <a:gsLst>
-            <a:gs pos="0">
-              <a:schemeClr val="phClr">
-                <a:tint val="50000"/>
-                <a:satMod val="300000"/>
-              </a:schemeClr>
-            </a:gs>
-            <a:gs pos="35000">
-              <a:schemeClr val="phClr">
-                <a:tint val="37000"/>
-                <a:satMod val="300000"/>
-              </a:schemeClr>
-            </a:gs>
-            <a:gs pos="100000">
-              <a:schemeClr val="phClr">
-                <a:tint val="15000"/>
-                <a:satMod val="350000"/>
-              </a:schemeClr>
-            </a:gs>
-          </a:gsLst>
-          <a:lin ang="16200000" scaled="1"/>
-        </a:gradFill>
-        <a:gradFill rotWithShape="1">
-          <a:gsLst>
-            <a:gs pos="0">
-              <a:schemeClr val="phClr">
-                <a:tint val="100000"/>
-                <a:shade val="100000"/>
-                <a:satMod val="130000"/>
-              </a:schemeClr>
-            </a:gs>
-            <a:gs pos="100000">
-              <a:schemeClr val="phClr">
-                <a:tint val="50000"/>
-                <a:shade val="100000"/>
-                <a:satMod val="350000"/>
-              </a:schemeClr>
-            </a:gs>
-          </a:gsLst>
-          <a:lin ang="16200000" scaled="0"/>
-        </a:gradFill>
-      </a:fillStyleLst>
-      <a:lnStyleLst>
-        <a:ln w="9525" cap="flat" cmpd="sng" algn="ctr">
-          <a:solidFill>
-            <a:schemeClr val="phClr">
-              <a:shade val="95000"/>
-              <a:satMod val="105000"/>
-            </a:schemeClr>
-          </a:solidFill>
-          <a:prstDash val="solid"/>
-        </a:ln>
-        <a:ln w="25400" cap="flat" cmpd="sng" algn="ctr">
-          <a:solidFill>
-            <a:schemeClr val="phClr"/>
-          </a:solidFill>
-          <a:prstDash val="solid"/>
-        </a:ln>
-        <a:ln w="38100" cap="flat" cmpd="sng" algn="ctr">
-          <a:solidFill>
-            <a:schemeClr val="phClr"/>
-          </a:solidFill>
-          <a:prstDash val="solid"/>
-        </a:ln>
-      </a:lnStyleLst>
-      <a:effectStyleLst>
-        <a:effectStyle>
-          <a:effectLst>
-            <a:outerShdw blurRad="40000" dist="20000" dir="5400000" rotWithShape="0">
-              <a:srgbClr val="000000">
-                <a:alpha val="38000"/>
-              </a:srgbClr>
-            </a:outerShdw>
-          </a:effectLst>
-        </a:effectStyle>
-        <a:effectStyle>
-          <a:effectLst>
-            <a:outerShdw blurRad="40000" dist="23000" dir="5400000" rotWithShape="0">
-              <a:srgbClr val="000000">
-                <a:alpha val="35000"/>
-              </a:srgbClr>
-            </a:outerShdw>
-          </a:effectLst>
-        </a:effectStyle>
-        <a:effectStyle>
-          <a:effectLst>
-            <a:outerShdw blurRad="40000" dist="23000" dir="5400000" rotWithShape="0">
-              <a:srgbClr val="000000">
-                <a:alpha val="35000"/>
-              </a:srgbClr>
-            </a:outerShdw>
-          </a:effectLst>
-          <a:scene3d>
-            <a:camera prst="orthographicFront">
-              <a:rot lat="0" lon="0" rev="0"/>
-            </a:camera>
-            <a:lightRig rig="threePt" dir="t">
-              <a:rot lat="0" lon="0" rev="1200000"/>
-            </a:lightRig>
-          </a:scene3d>
-          <a:sp3d>
-            <a:bevelT w="63500" h="25400"/>
-          </a:sp3d>
-        </a:effectStyle>
-      </a:effectStyleLst>
-      <a:bgFillStyleLst>
-        <a:solidFill>
-          <a:schemeClr val="phClr"/>
-        </a:solidFill>
-        <a:gradFill rotWithShape="1">
-          <a:gsLst>
-            <a:gs pos="0">
-              <a:schemeClr val="phClr">
-                <a:tint val="40000"/>
-                <a:satMod val="350000"/>
-              </a:schemeClr>
-            </a:gs>
-            <a:gs pos="40000">
-              <a:schemeClr val="phClr">
-                <a:tint val="45000"/>
-                <a:shade val="99000"/>
-                <a:satMod val="350000"/>
-              </a:schemeClr>
-            </a:gs>
-            <a:gs pos="100000">
-              <a:schemeClr val="phClr">
-                <a:shade val="20000"/>
-                <a:satMod val="255000"/>
-              </a:schemeClr>
-            </a:gs>
-          </a:gsLst>
-          <a:path path="circle">
-            <a:fillToRect l="50000" t="-80000" r="50000" b="180000"/>
-          </a:path>
-        </a:gradFill>
-        <a:gradFill rotWithShape="1">
-          <a:gsLst>
-            <a:gs pos="0">
-              <a:schemeClr val="phClr">
-                <a:tint val="80000"/>
-                <a:satMod val="300000"/>
-              </a:schemeClr>
-            </a:gs>
-            <a:gs pos="100000">
-              <a:schemeClr val="phClr">
-                <a:shade val="30000"/>
-                <a:satMod val="200000"/>
-              </a:schemeClr>
-            </a:gs>
-          </a:gsLst>
-          <a:path path="circle">
-            <a:fillToRect l="50000" t="50000" r="50000" b="50000"/>
-          </a:path>
-        </a:gradFill>
-      </a:bgFillStyleLst>
-    </a:fmtScheme>
-  </a:themeElements>
-</a:theme>
 </file>
</xml_diff>